<commit_message>
Releasing lec 16 materials
</commit_message>
<xml_diff>
--- a/tyler/meena/cs220/s21/materials/lec_15_S21.pptx
+++ b/tyler/meena/cs220/s21/materials/lec_15_S21.pptx
@@ -48,15 +48,15 @@
     <p:sldId id="293" r:id="rId39"/>
     <p:sldId id="294" r:id="rId40"/>
     <p:sldId id="295" r:id="rId41"/>
-    <p:sldId id="296" r:id="rId42"/>
-    <p:sldId id="297" r:id="rId43"/>
-    <p:sldId id="298" r:id="rId44"/>
-    <p:sldId id="299" r:id="rId45"/>
-    <p:sldId id="300" r:id="rId46"/>
-    <p:sldId id="301" r:id="rId47"/>
-    <p:sldId id="302" r:id="rId48"/>
-    <p:sldId id="303" r:id="rId49"/>
-    <p:sldId id="304" r:id="rId50"/>
+    <p:sldId id="297" r:id="rId42"/>
+    <p:sldId id="298" r:id="rId43"/>
+    <p:sldId id="299" r:id="rId44"/>
+    <p:sldId id="300" r:id="rId45"/>
+    <p:sldId id="301" r:id="rId46"/>
+    <p:sldId id="302" r:id="rId47"/>
+    <p:sldId id="303" r:id="rId48"/>
+    <p:sldId id="304" r:id="rId49"/>
+    <p:sldId id="296" r:id="rId50"/>
     <p:sldId id="305" r:id="rId51"/>
   </p:sldIdLst>
   <p:sldSz cx="13004800" cy="9753600"/>
@@ -2182,7 +2182,7 @@
           </a:ln>
           <a:extLst>
             <a:ext uri="{C572A759-6A51-4108-AA02-DFA0A04FC94B}">
-              <ma14:wrappingTextBoxFlag xmlns:ma14="http://schemas.microsoft.com/office/mac/drawingml/2011/main" xmlns:a14="http://schemas.microsoft.com/office/drawing/2010/main" xmlns:m="http://schemas.openxmlformats.org/officeDocument/2006/math" xmlns="" val="1"/>
+              <ma14:wrappingTextBoxFlag xmlns="" xmlns:m="http://schemas.openxmlformats.org/officeDocument/2006/math" xmlns:a14="http://schemas.microsoft.com/office/drawing/2010/main" xmlns:ma14="http://schemas.microsoft.com/office/mac/drawingml/2011/main" val="1"/>
             </a:ext>
           </a:extLst>
         </p:spPr>
@@ -2221,7 +2221,7 @@
           </a:ln>
           <a:extLst>
             <a:ext uri="{C572A759-6A51-4108-AA02-DFA0A04FC94B}">
-              <ma14:wrappingTextBoxFlag xmlns:ma14="http://schemas.microsoft.com/office/mac/drawingml/2011/main" xmlns:a14="http://schemas.microsoft.com/office/drawing/2010/main" xmlns:m="http://schemas.openxmlformats.org/officeDocument/2006/math" xmlns="" val="1"/>
+              <ma14:wrappingTextBoxFlag xmlns="" xmlns:m="http://schemas.openxmlformats.org/officeDocument/2006/math" xmlns:a14="http://schemas.microsoft.com/office/drawing/2010/main" xmlns:ma14="http://schemas.microsoft.com/office/mac/drawingml/2011/main" val="1"/>
             </a:ext>
           </a:extLst>
         </p:spPr>
@@ -3482,7 +3482,7 @@
           </a:ln>
           <a:extLst>
             <a:ext uri="{C572A759-6A51-4108-AA02-DFA0A04FC94B}">
-              <ma14:wrappingTextBoxFlag xmlns:ma14="http://schemas.microsoft.com/office/mac/drawingml/2011/main" xmlns:a14="http://schemas.microsoft.com/office/drawing/2010/main" xmlns:m="http://schemas.openxmlformats.org/officeDocument/2006/math" xmlns="" val="1"/>
+              <ma14:wrappingTextBoxFlag xmlns="" xmlns:m="http://schemas.openxmlformats.org/officeDocument/2006/math" xmlns:a14="http://schemas.microsoft.com/office/drawing/2010/main" xmlns:ma14="http://schemas.microsoft.com/office/mac/drawingml/2011/main" val="1"/>
             </a:ext>
           </a:extLst>
         </p:spPr>
@@ -3538,7 +3538,7 @@
           </a:ln>
           <a:extLst>
             <a:ext uri="{C572A759-6A51-4108-AA02-DFA0A04FC94B}">
-              <ma14:wrappingTextBoxFlag xmlns:ma14="http://schemas.microsoft.com/office/mac/drawingml/2011/main" xmlns:a14="http://schemas.microsoft.com/office/drawing/2010/main" xmlns:m="http://schemas.openxmlformats.org/officeDocument/2006/math" xmlns="" val="1"/>
+              <ma14:wrappingTextBoxFlag xmlns="" xmlns:m="http://schemas.openxmlformats.org/officeDocument/2006/math" xmlns:a14="http://schemas.microsoft.com/office/drawing/2010/main" xmlns:ma14="http://schemas.microsoft.com/office/mac/drawingml/2011/main" val="1"/>
             </a:ext>
           </a:extLst>
         </p:spPr>
@@ -3694,7 +3694,7 @@
           </a:ln>
           <a:extLst>
             <a:ext uri="{C572A759-6A51-4108-AA02-DFA0A04FC94B}">
-              <ma14:wrappingTextBoxFlag xmlns:ma14="http://schemas.microsoft.com/office/mac/drawingml/2011/main" xmlns:a14="http://schemas.microsoft.com/office/drawing/2010/main" xmlns:m="http://schemas.openxmlformats.org/officeDocument/2006/math" xmlns="" val="1"/>
+              <ma14:wrappingTextBoxFlag xmlns="" xmlns:m="http://schemas.openxmlformats.org/officeDocument/2006/math" xmlns:a14="http://schemas.microsoft.com/office/drawing/2010/main" xmlns:ma14="http://schemas.microsoft.com/office/mac/drawingml/2011/main" val="1"/>
             </a:ext>
           </a:extLst>
         </p:spPr>
@@ -3763,7 +3763,7 @@
           </a:ln>
           <a:extLst>
             <a:ext uri="{C572A759-6A51-4108-AA02-DFA0A04FC94B}">
-              <ma14:wrappingTextBoxFlag xmlns:ma14="http://schemas.microsoft.com/office/mac/drawingml/2011/main" xmlns:a14="http://schemas.microsoft.com/office/drawing/2010/main" xmlns:m="http://schemas.openxmlformats.org/officeDocument/2006/math" xmlns="" val="1"/>
+              <ma14:wrappingTextBoxFlag xmlns="" xmlns:m="http://schemas.openxmlformats.org/officeDocument/2006/math" xmlns:a14="http://schemas.microsoft.com/office/drawing/2010/main" xmlns:ma14="http://schemas.microsoft.com/office/mac/drawingml/2011/main" val="1"/>
             </a:ext>
           </a:extLst>
         </p:spPr>
@@ -3919,7 +3919,7 @@
           </a:ln>
           <a:extLst>
             <a:ext uri="{C572A759-6A51-4108-AA02-DFA0A04FC94B}">
-              <ma14:wrappingTextBoxFlag xmlns:ma14="http://schemas.microsoft.com/office/mac/drawingml/2011/main" xmlns:a14="http://schemas.microsoft.com/office/drawing/2010/main" xmlns:m="http://schemas.openxmlformats.org/officeDocument/2006/math" xmlns="" val="1"/>
+              <ma14:wrappingTextBoxFlag xmlns="" xmlns:m="http://schemas.openxmlformats.org/officeDocument/2006/math" xmlns:a14="http://schemas.microsoft.com/office/drawing/2010/main" xmlns:ma14="http://schemas.microsoft.com/office/mac/drawingml/2011/main" val="1"/>
             </a:ext>
           </a:extLst>
         </p:spPr>
@@ -4001,7 +4001,7 @@
           </a:ln>
           <a:extLst>
             <a:ext uri="{C572A759-6A51-4108-AA02-DFA0A04FC94B}">
-              <ma14:wrappingTextBoxFlag xmlns:ma14="http://schemas.microsoft.com/office/mac/drawingml/2011/main" xmlns:a14="http://schemas.microsoft.com/office/drawing/2010/main" xmlns:m="http://schemas.openxmlformats.org/officeDocument/2006/math" xmlns="" val="1"/>
+              <ma14:wrappingTextBoxFlag xmlns="" xmlns:m="http://schemas.openxmlformats.org/officeDocument/2006/math" xmlns:a14="http://schemas.microsoft.com/office/drawing/2010/main" xmlns:ma14="http://schemas.microsoft.com/office/mac/drawingml/2011/main" val="1"/>
             </a:ext>
           </a:extLst>
         </p:spPr>
@@ -4157,7 +4157,7 @@
           </a:ln>
           <a:extLst>
             <a:ext uri="{C572A759-6A51-4108-AA02-DFA0A04FC94B}">
-              <ma14:wrappingTextBoxFlag xmlns:ma14="http://schemas.microsoft.com/office/mac/drawingml/2011/main" xmlns:a14="http://schemas.microsoft.com/office/drawing/2010/main" xmlns:m="http://schemas.openxmlformats.org/officeDocument/2006/math" xmlns="" val="1"/>
+              <ma14:wrappingTextBoxFlag xmlns="" xmlns:m="http://schemas.openxmlformats.org/officeDocument/2006/math" xmlns:a14="http://schemas.microsoft.com/office/drawing/2010/main" xmlns:ma14="http://schemas.microsoft.com/office/mac/drawingml/2011/main" val="1"/>
             </a:ext>
           </a:extLst>
         </p:spPr>
@@ -4252,7 +4252,7 @@
           </a:ln>
           <a:extLst>
             <a:ext uri="{C572A759-6A51-4108-AA02-DFA0A04FC94B}">
-              <ma14:wrappingTextBoxFlag xmlns:ma14="http://schemas.microsoft.com/office/mac/drawingml/2011/main" xmlns:a14="http://schemas.microsoft.com/office/drawing/2010/main" xmlns:m="http://schemas.openxmlformats.org/officeDocument/2006/math" xmlns="" val="1"/>
+              <ma14:wrappingTextBoxFlag xmlns="" xmlns:m="http://schemas.openxmlformats.org/officeDocument/2006/math" xmlns:a14="http://schemas.microsoft.com/office/drawing/2010/main" xmlns:ma14="http://schemas.microsoft.com/office/mac/drawingml/2011/main" val="1"/>
             </a:ext>
           </a:extLst>
         </p:spPr>
@@ -4408,7 +4408,7 @@
           </a:ln>
           <a:extLst>
             <a:ext uri="{C572A759-6A51-4108-AA02-DFA0A04FC94B}">
-              <ma14:wrappingTextBoxFlag xmlns:ma14="http://schemas.microsoft.com/office/mac/drawingml/2011/main" xmlns:a14="http://schemas.microsoft.com/office/drawing/2010/main" xmlns:m="http://schemas.openxmlformats.org/officeDocument/2006/math" xmlns="" val="1"/>
+              <ma14:wrappingTextBoxFlag xmlns="" xmlns:m="http://schemas.openxmlformats.org/officeDocument/2006/math" xmlns:a14="http://schemas.microsoft.com/office/drawing/2010/main" xmlns:ma14="http://schemas.microsoft.com/office/mac/drawingml/2011/main" val="1"/>
             </a:ext>
           </a:extLst>
         </p:spPr>
@@ -4618,7 +4618,7 @@
           </a:ln>
           <a:extLst>
             <a:ext uri="{C572A759-6A51-4108-AA02-DFA0A04FC94B}">
-              <ma14:wrappingTextBoxFlag xmlns:ma14="http://schemas.microsoft.com/office/mac/drawingml/2011/main" xmlns:a14="http://schemas.microsoft.com/office/drawing/2010/main" xmlns:m="http://schemas.openxmlformats.org/officeDocument/2006/math" xmlns="" val="1"/>
+              <ma14:wrappingTextBoxFlag xmlns="" xmlns:m="http://schemas.openxmlformats.org/officeDocument/2006/math" xmlns:a14="http://schemas.microsoft.com/office/drawing/2010/main" xmlns:ma14="http://schemas.microsoft.com/office/mac/drawingml/2011/main" val="1"/>
             </a:ext>
           </a:extLst>
         </p:spPr>
@@ -4774,7 +4774,7 @@
           </a:ln>
           <a:extLst>
             <a:ext uri="{C572A759-6A51-4108-AA02-DFA0A04FC94B}">
-              <ma14:wrappingTextBoxFlag xmlns:ma14="http://schemas.microsoft.com/office/mac/drawingml/2011/main" xmlns:a14="http://schemas.microsoft.com/office/drawing/2010/main" xmlns:m="http://schemas.openxmlformats.org/officeDocument/2006/math" xmlns="" val="1"/>
+              <ma14:wrappingTextBoxFlag xmlns="" xmlns:m="http://schemas.openxmlformats.org/officeDocument/2006/math" xmlns:a14="http://schemas.microsoft.com/office/drawing/2010/main" xmlns:ma14="http://schemas.microsoft.com/office/mac/drawingml/2011/main" val="1"/>
             </a:ext>
           </a:extLst>
         </p:spPr>
@@ -4818,7 +4818,7 @@
           </a:ln>
           <a:extLst>
             <a:ext uri="{C572A759-6A51-4108-AA02-DFA0A04FC94B}">
-              <ma14:wrappingTextBoxFlag xmlns:ma14="http://schemas.microsoft.com/office/mac/drawingml/2011/main" xmlns:a14="http://schemas.microsoft.com/office/drawing/2010/main" xmlns:m="http://schemas.openxmlformats.org/officeDocument/2006/math" xmlns="" val="1"/>
+              <ma14:wrappingTextBoxFlag xmlns="" xmlns:m="http://schemas.openxmlformats.org/officeDocument/2006/math" xmlns:a14="http://schemas.microsoft.com/office/drawing/2010/main" xmlns:ma14="http://schemas.microsoft.com/office/mac/drawingml/2011/main" val="1"/>
             </a:ext>
           </a:extLst>
         </p:spPr>
@@ -4982,7 +4982,7 @@
           </a:ln>
           <a:extLst>
             <a:ext uri="{C572A759-6A51-4108-AA02-DFA0A04FC94B}">
-              <ma14:wrappingTextBoxFlag xmlns:ma14="http://schemas.microsoft.com/office/mac/drawingml/2011/main" xmlns:a14="http://schemas.microsoft.com/office/drawing/2010/main" xmlns:m="http://schemas.openxmlformats.org/officeDocument/2006/math" xmlns="" val="1"/>
+              <ma14:wrappingTextBoxFlag xmlns="" xmlns:m="http://schemas.openxmlformats.org/officeDocument/2006/math" xmlns:a14="http://schemas.microsoft.com/office/drawing/2010/main" xmlns:ma14="http://schemas.microsoft.com/office/mac/drawingml/2011/main" val="1"/>
             </a:ext>
           </a:extLst>
         </p:spPr>
@@ -5026,7 +5026,7 @@
           </a:ln>
           <a:extLst>
             <a:ext uri="{C572A759-6A51-4108-AA02-DFA0A04FC94B}">
-              <ma14:wrappingTextBoxFlag xmlns:ma14="http://schemas.microsoft.com/office/mac/drawingml/2011/main" xmlns:a14="http://schemas.microsoft.com/office/drawing/2010/main" xmlns:m="http://schemas.openxmlformats.org/officeDocument/2006/math" xmlns="" val="1"/>
+              <ma14:wrappingTextBoxFlag xmlns="" xmlns:m="http://schemas.openxmlformats.org/officeDocument/2006/math" xmlns:a14="http://schemas.microsoft.com/office/drawing/2010/main" xmlns:ma14="http://schemas.microsoft.com/office/mac/drawingml/2011/main" val="1"/>
             </a:ext>
           </a:extLst>
         </p:spPr>
@@ -5158,7 +5158,7 @@
           </a:ln>
           <a:extLst>
             <a:ext uri="{C572A759-6A51-4108-AA02-DFA0A04FC94B}">
-              <ma14:wrappingTextBoxFlag xmlns:ma14="http://schemas.microsoft.com/office/mac/drawingml/2011/main" xmlns:a14="http://schemas.microsoft.com/office/drawing/2010/main" xmlns:m="http://schemas.openxmlformats.org/officeDocument/2006/math" xmlns="" val="1"/>
+              <ma14:wrappingTextBoxFlag xmlns="" xmlns:m="http://schemas.openxmlformats.org/officeDocument/2006/math" xmlns:a14="http://schemas.microsoft.com/office/drawing/2010/main" xmlns:ma14="http://schemas.microsoft.com/office/mac/drawingml/2011/main" val="1"/>
             </a:ext>
           </a:extLst>
         </p:spPr>
@@ -5265,7 +5265,7 @@
           </a:ln>
           <a:extLst>
             <a:ext uri="{C572A759-6A51-4108-AA02-DFA0A04FC94B}">
-              <ma14:wrappingTextBoxFlag xmlns:ma14="http://schemas.microsoft.com/office/mac/drawingml/2011/main" xmlns:a14="http://schemas.microsoft.com/office/drawing/2010/main" xmlns:m="http://schemas.openxmlformats.org/officeDocument/2006/math" xmlns="" val="1"/>
+              <ma14:wrappingTextBoxFlag xmlns="" xmlns:m="http://schemas.openxmlformats.org/officeDocument/2006/math" xmlns:a14="http://schemas.microsoft.com/office/drawing/2010/main" xmlns:ma14="http://schemas.microsoft.com/office/mac/drawingml/2011/main" val="1"/>
             </a:ext>
           </a:extLst>
         </p:spPr>
@@ -5433,7 +5433,7 @@
           </a:ln>
           <a:extLst>
             <a:ext uri="{C572A759-6A51-4108-AA02-DFA0A04FC94B}">
-              <ma14:wrappingTextBoxFlag xmlns:ma14="http://schemas.microsoft.com/office/mac/drawingml/2011/main" xmlns:a14="http://schemas.microsoft.com/office/drawing/2010/main" xmlns:m="http://schemas.openxmlformats.org/officeDocument/2006/math" xmlns="" val="1"/>
+              <ma14:wrappingTextBoxFlag xmlns="" xmlns:m="http://schemas.openxmlformats.org/officeDocument/2006/math" xmlns:a14="http://schemas.microsoft.com/office/drawing/2010/main" xmlns:ma14="http://schemas.microsoft.com/office/mac/drawingml/2011/main" val="1"/>
             </a:ext>
           </a:extLst>
         </p:spPr>
@@ -5480,7 +5480,7 @@
           </a:ln>
           <a:extLst>
             <a:ext uri="{C572A759-6A51-4108-AA02-DFA0A04FC94B}">
-              <ma14:wrappingTextBoxFlag xmlns:ma14="http://schemas.microsoft.com/office/mac/drawingml/2011/main" xmlns:a14="http://schemas.microsoft.com/office/drawing/2010/main" xmlns:m="http://schemas.openxmlformats.org/officeDocument/2006/math" xmlns="" val="1"/>
+              <ma14:wrappingTextBoxFlag xmlns="" xmlns:m="http://schemas.openxmlformats.org/officeDocument/2006/math" xmlns:a14="http://schemas.microsoft.com/office/drawing/2010/main" xmlns:ma14="http://schemas.microsoft.com/office/mac/drawingml/2011/main" val="1"/>
             </a:ext>
           </a:extLst>
         </p:spPr>
@@ -5600,7 +5600,7 @@
           </a:ln>
           <a:extLst>
             <a:ext uri="{C572A759-6A51-4108-AA02-DFA0A04FC94B}">
-              <ma14:wrappingTextBoxFlag xmlns:ma14="http://schemas.microsoft.com/office/mac/drawingml/2011/main" xmlns:a14="http://schemas.microsoft.com/office/drawing/2010/main" xmlns:m="http://schemas.openxmlformats.org/officeDocument/2006/math" xmlns="" val="1"/>
+              <ma14:wrappingTextBoxFlag xmlns="" xmlns:m="http://schemas.openxmlformats.org/officeDocument/2006/math" xmlns:a14="http://schemas.microsoft.com/office/drawing/2010/main" xmlns:ma14="http://schemas.microsoft.com/office/mac/drawingml/2011/main" val="1"/>
             </a:ext>
           </a:extLst>
         </p:spPr>
@@ -5656,7 +5656,7 @@
           </a:ln>
           <a:extLst>
             <a:ext uri="{C572A759-6A51-4108-AA02-DFA0A04FC94B}">
-              <ma14:wrappingTextBoxFlag xmlns:ma14="http://schemas.microsoft.com/office/mac/drawingml/2011/main" xmlns:a14="http://schemas.microsoft.com/office/drawing/2010/main" xmlns:m="http://schemas.openxmlformats.org/officeDocument/2006/math" xmlns="" val="1"/>
+              <ma14:wrappingTextBoxFlag xmlns="" xmlns:m="http://schemas.openxmlformats.org/officeDocument/2006/math" xmlns:a14="http://schemas.microsoft.com/office/drawing/2010/main" xmlns:ma14="http://schemas.microsoft.com/office/mac/drawingml/2011/main" val="1"/>
             </a:ext>
           </a:extLst>
         </p:spPr>
@@ -5833,7 +5833,7 @@
           </a:ln>
           <a:extLst>
             <a:ext uri="{C572A759-6A51-4108-AA02-DFA0A04FC94B}">
-              <ma14:wrappingTextBoxFlag xmlns:ma14="http://schemas.microsoft.com/office/mac/drawingml/2011/main" xmlns:a14="http://schemas.microsoft.com/office/drawing/2010/main" xmlns:m="http://schemas.openxmlformats.org/officeDocument/2006/math" xmlns="" val="1"/>
+              <ma14:wrappingTextBoxFlag xmlns="" xmlns:m="http://schemas.openxmlformats.org/officeDocument/2006/math" xmlns:a14="http://schemas.microsoft.com/office/drawing/2010/main" xmlns:ma14="http://schemas.microsoft.com/office/mac/drawingml/2011/main" val="1"/>
             </a:ext>
           </a:extLst>
         </p:spPr>
@@ -6001,7 +6001,7 @@
           </a:ln>
           <a:extLst>
             <a:ext uri="{C572A759-6A51-4108-AA02-DFA0A04FC94B}">
-              <ma14:wrappingTextBoxFlag xmlns:ma14="http://schemas.microsoft.com/office/mac/drawingml/2011/main" xmlns:a14="http://schemas.microsoft.com/office/drawing/2010/main" xmlns:m="http://schemas.openxmlformats.org/officeDocument/2006/math" xmlns="" val="1"/>
+              <ma14:wrappingTextBoxFlag xmlns="" xmlns:m="http://schemas.openxmlformats.org/officeDocument/2006/math" xmlns:a14="http://schemas.microsoft.com/office/drawing/2010/main" xmlns:ma14="http://schemas.microsoft.com/office/mac/drawingml/2011/main" val="1"/>
             </a:ext>
           </a:extLst>
         </p:spPr>
@@ -6095,7 +6095,7 @@
           </a:ln>
           <a:extLst>
             <a:ext uri="{C572A759-6A51-4108-AA02-DFA0A04FC94B}">
-              <ma14:wrappingTextBoxFlag xmlns:ma14="http://schemas.microsoft.com/office/mac/drawingml/2011/main" xmlns:a14="http://schemas.microsoft.com/office/drawing/2010/main" xmlns:m="http://schemas.openxmlformats.org/officeDocument/2006/math" xmlns="" val="1"/>
+              <ma14:wrappingTextBoxFlag xmlns="" xmlns:m="http://schemas.openxmlformats.org/officeDocument/2006/math" xmlns:a14="http://schemas.microsoft.com/office/drawing/2010/main" xmlns:ma14="http://schemas.microsoft.com/office/mac/drawingml/2011/main" val="1"/>
             </a:ext>
           </a:extLst>
         </p:spPr>
@@ -6157,7 +6157,7 @@
           </a:ln>
           <a:extLst>
             <a:ext uri="{C572A759-6A51-4108-AA02-DFA0A04FC94B}">
-              <ma14:wrappingTextBoxFlag xmlns:ma14="http://schemas.microsoft.com/office/mac/drawingml/2011/main" xmlns:a14="http://schemas.microsoft.com/office/drawing/2010/main" xmlns:m="http://schemas.openxmlformats.org/officeDocument/2006/math" xmlns="" val="1"/>
+              <ma14:wrappingTextBoxFlag xmlns="" xmlns:m="http://schemas.openxmlformats.org/officeDocument/2006/math" xmlns:a14="http://schemas.microsoft.com/office/drawing/2010/main" xmlns:ma14="http://schemas.microsoft.com/office/mac/drawingml/2011/main" val="1"/>
             </a:ext>
           </a:extLst>
         </p:spPr>
@@ -6196,7 +6196,7 @@
           </a:ln>
           <a:extLst>
             <a:ext uri="{C572A759-6A51-4108-AA02-DFA0A04FC94B}">
-              <ma14:wrappingTextBoxFlag xmlns:ma14="http://schemas.microsoft.com/office/mac/drawingml/2011/main" xmlns:a14="http://schemas.microsoft.com/office/drawing/2010/main" xmlns:m="http://schemas.openxmlformats.org/officeDocument/2006/math" xmlns="" val="1"/>
+              <ma14:wrappingTextBoxFlag xmlns="" xmlns:m="http://schemas.openxmlformats.org/officeDocument/2006/math" xmlns:a14="http://schemas.microsoft.com/office/drawing/2010/main" xmlns:ma14="http://schemas.microsoft.com/office/mac/drawingml/2011/main" val="1"/>
             </a:ext>
           </a:extLst>
         </p:spPr>
@@ -6261,7 +6261,7 @@
           </a:ln>
           <a:extLst>
             <a:ext uri="{C572A759-6A51-4108-AA02-DFA0A04FC94B}">
-              <ma14:wrappingTextBoxFlag xmlns:ma14="http://schemas.microsoft.com/office/mac/drawingml/2011/main" xmlns:a14="http://schemas.microsoft.com/office/drawing/2010/main" xmlns:m="http://schemas.openxmlformats.org/officeDocument/2006/math" xmlns="" val="1"/>
+              <ma14:wrappingTextBoxFlag xmlns="" xmlns:m="http://schemas.openxmlformats.org/officeDocument/2006/math" xmlns:a14="http://schemas.microsoft.com/office/drawing/2010/main" xmlns:ma14="http://schemas.microsoft.com/office/mac/drawingml/2011/main" val="1"/>
             </a:ext>
           </a:extLst>
         </p:spPr>
@@ -6317,7 +6317,7 @@
           </a:ln>
           <a:extLst>
             <a:ext uri="{C572A759-6A51-4108-AA02-DFA0A04FC94B}">
-              <ma14:wrappingTextBoxFlag xmlns:ma14="http://schemas.microsoft.com/office/mac/drawingml/2011/main" xmlns:a14="http://schemas.microsoft.com/office/drawing/2010/main" xmlns:m="http://schemas.openxmlformats.org/officeDocument/2006/math" xmlns="" val="1"/>
+              <ma14:wrappingTextBoxFlag xmlns="" xmlns:m="http://schemas.openxmlformats.org/officeDocument/2006/math" xmlns:a14="http://schemas.microsoft.com/office/drawing/2010/main" xmlns:ma14="http://schemas.microsoft.com/office/mac/drawingml/2011/main" val="1"/>
             </a:ext>
           </a:extLst>
         </p:spPr>
@@ -6469,7 +6469,7 @@
           </a:ln>
           <a:extLst>
             <a:ext uri="{C572A759-6A51-4108-AA02-DFA0A04FC94B}">
-              <ma14:wrappingTextBoxFlag xmlns:ma14="http://schemas.microsoft.com/office/mac/drawingml/2011/main" xmlns:a14="http://schemas.microsoft.com/office/drawing/2010/main" xmlns:m="http://schemas.openxmlformats.org/officeDocument/2006/math" xmlns="" val="1"/>
+              <ma14:wrappingTextBoxFlag xmlns="" xmlns:m="http://schemas.openxmlformats.org/officeDocument/2006/math" xmlns:a14="http://schemas.microsoft.com/office/drawing/2010/main" xmlns:ma14="http://schemas.microsoft.com/office/mac/drawingml/2011/main" val="1"/>
             </a:ext>
           </a:extLst>
         </p:spPr>
@@ -6551,7 +6551,7 @@
           </a:ln>
           <a:extLst>
             <a:ext uri="{C572A759-6A51-4108-AA02-DFA0A04FC94B}">
-              <ma14:wrappingTextBoxFlag xmlns:ma14="http://schemas.microsoft.com/office/mac/drawingml/2011/main" xmlns:a14="http://schemas.microsoft.com/office/drawing/2010/main" xmlns:m="http://schemas.openxmlformats.org/officeDocument/2006/math" xmlns="" val="1"/>
+              <ma14:wrappingTextBoxFlag xmlns="" xmlns:m="http://schemas.openxmlformats.org/officeDocument/2006/math" xmlns:a14="http://schemas.microsoft.com/office/drawing/2010/main" xmlns:ma14="http://schemas.microsoft.com/office/mac/drawingml/2011/main" val="1"/>
             </a:ext>
           </a:extLst>
         </p:spPr>
@@ -6854,7 +6854,7 @@
           </a:ln>
           <a:extLst>
             <a:ext uri="{C572A759-6A51-4108-AA02-DFA0A04FC94B}">
-              <ma14:wrappingTextBoxFlag xmlns:ma14="http://schemas.microsoft.com/office/mac/drawingml/2011/main" xmlns:a14="http://schemas.microsoft.com/office/drawing/2010/main" xmlns:m="http://schemas.openxmlformats.org/officeDocument/2006/math" xmlns="" val="1"/>
+              <ma14:wrappingTextBoxFlag xmlns="" xmlns:m="http://schemas.openxmlformats.org/officeDocument/2006/math" xmlns:a14="http://schemas.microsoft.com/office/drawing/2010/main" xmlns:ma14="http://schemas.microsoft.com/office/mac/drawingml/2011/main" val="1"/>
             </a:ext>
           </a:extLst>
         </p:spPr>
@@ -6917,7 +6917,7 @@
           </a:ln>
           <a:extLst>
             <a:ext uri="{C572A759-6A51-4108-AA02-DFA0A04FC94B}">
-              <ma14:wrappingTextBoxFlag xmlns:ma14="http://schemas.microsoft.com/office/mac/drawingml/2011/main" xmlns:a14="http://schemas.microsoft.com/office/drawing/2010/main" xmlns:m="http://schemas.openxmlformats.org/officeDocument/2006/math" xmlns="" val="1"/>
+              <ma14:wrappingTextBoxFlag xmlns="" xmlns:m="http://schemas.openxmlformats.org/officeDocument/2006/math" xmlns:a14="http://schemas.microsoft.com/office/drawing/2010/main" xmlns:ma14="http://schemas.microsoft.com/office/mac/drawingml/2011/main" val="1"/>
             </a:ext>
           </a:extLst>
         </p:spPr>
@@ -7025,7 +7025,7 @@
           </a:ln>
           <a:extLst>
             <a:ext uri="{C572A759-6A51-4108-AA02-DFA0A04FC94B}">
-              <ma14:wrappingTextBoxFlag xmlns:ma14="http://schemas.microsoft.com/office/mac/drawingml/2011/main" xmlns:a14="http://schemas.microsoft.com/office/drawing/2010/main" xmlns:m="http://schemas.openxmlformats.org/officeDocument/2006/math" xmlns="" val="1"/>
+              <ma14:wrappingTextBoxFlag xmlns="" xmlns:m="http://schemas.openxmlformats.org/officeDocument/2006/math" xmlns:a14="http://schemas.microsoft.com/office/drawing/2010/main" xmlns:ma14="http://schemas.microsoft.com/office/mac/drawingml/2011/main" val="1"/>
             </a:ext>
           </a:extLst>
         </p:spPr>
@@ -7185,7 +7185,7 @@
           </a:ln>
           <a:extLst>
             <a:ext uri="{C572A759-6A51-4108-AA02-DFA0A04FC94B}">
-              <ma14:wrappingTextBoxFlag xmlns:ma14="http://schemas.microsoft.com/office/mac/drawingml/2011/main" xmlns:a14="http://schemas.microsoft.com/office/drawing/2010/main" xmlns:m="http://schemas.openxmlformats.org/officeDocument/2006/math" xmlns="" val="1"/>
+              <ma14:wrappingTextBoxFlag xmlns="" xmlns:m="http://schemas.openxmlformats.org/officeDocument/2006/math" xmlns:a14="http://schemas.microsoft.com/office/drawing/2010/main" xmlns:ma14="http://schemas.microsoft.com/office/mac/drawingml/2011/main" val="1"/>
             </a:ext>
           </a:extLst>
         </p:spPr>
@@ -7279,7 +7279,7 @@
           </a:ln>
           <a:extLst>
             <a:ext uri="{C572A759-6A51-4108-AA02-DFA0A04FC94B}">
-              <ma14:wrappingTextBoxFlag xmlns:ma14="http://schemas.microsoft.com/office/mac/drawingml/2011/main" xmlns:a14="http://schemas.microsoft.com/office/drawing/2010/main" xmlns:m="http://schemas.openxmlformats.org/officeDocument/2006/math" xmlns="" val="1"/>
+              <ma14:wrappingTextBoxFlag xmlns="" xmlns:m="http://schemas.openxmlformats.org/officeDocument/2006/math" xmlns:a14="http://schemas.microsoft.com/office/drawing/2010/main" xmlns:ma14="http://schemas.microsoft.com/office/mac/drawingml/2011/main" val="1"/>
             </a:ext>
           </a:extLst>
         </p:spPr>
@@ -7413,7 +7413,7 @@
           </a:ln>
           <a:extLst>
             <a:ext uri="{C572A759-6A51-4108-AA02-DFA0A04FC94B}">
-              <ma14:wrappingTextBoxFlag xmlns:ma14="http://schemas.microsoft.com/office/mac/drawingml/2011/main" xmlns:a14="http://schemas.microsoft.com/office/drawing/2010/main" xmlns:m="http://schemas.openxmlformats.org/officeDocument/2006/math" xmlns="" val="1"/>
+              <ma14:wrappingTextBoxFlag xmlns="" xmlns:m="http://schemas.openxmlformats.org/officeDocument/2006/math" xmlns:a14="http://schemas.microsoft.com/office/drawing/2010/main" xmlns:ma14="http://schemas.microsoft.com/office/mac/drawingml/2011/main" val="1"/>
             </a:ext>
           </a:extLst>
         </p:spPr>
@@ -7486,7 +7486,7 @@
           </a:ln>
           <a:extLst>
             <a:ext uri="{C572A759-6A51-4108-AA02-DFA0A04FC94B}">
-              <ma14:wrappingTextBoxFlag xmlns:ma14="http://schemas.microsoft.com/office/mac/drawingml/2011/main" xmlns:a14="http://schemas.microsoft.com/office/drawing/2010/main" xmlns:m="http://schemas.openxmlformats.org/officeDocument/2006/math" xmlns="" val="1"/>
+              <ma14:wrappingTextBoxFlag xmlns="" xmlns:m="http://schemas.openxmlformats.org/officeDocument/2006/math" xmlns:a14="http://schemas.microsoft.com/office/drawing/2010/main" xmlns:ma14="http://schemas.microsoft.com/office/mac/drawingml/2011/main" val="1"/>
             </a:ext>
           </a:extLst>
         </p:spPr>
@@ -7568,7 +7568,7 @@
           </a:ln>
           <a:extLst>
             <a:ext uri="{C572A759-6A51-4108-AA02-DFA0A04FC94B}">
-              <ma14:wrappingTextBoxFlag xmlns:ma14="http://schemas.microsoft.com/office/mac/drawingml/2011/main" xmlns:a14="http://schemas.microsoft.com/office/drawing/2010/main" xmlns:m="http://schemas.openxmlformats.org/officeDocument/2006/math" xmlns="" val="1"/>
+              <ma14:wrappingTextBoxFlag xmlns="" xmlns:m="http://schemas.openxmlformats.org/officeDocument/2006/math" xmlns:a14="http://schemas.microsoft.com/office/drawing/2010/main" xmlns:ma14="http://schemas.microsoft.com/office/mac/drawingml/2011/main" val="1"/>
             </a:ext>
           </a:extLst>
         </p:spPr>
@@ -7728,7 +7728,7 @@
           </a:ln>
           <a:extLst>
             <a:ext uri="{C572A759-6A51-4108-AA02-DFA0A04FC94B}">
-              <ma14:wrappingTextBoxFlag xmlns:ma14="http://schemas.microsoft.com/office/mac/drawingml/2011/main" xmlns:a14="http://schemas.microsoft.com/office/drawing/2010/main" xmlns:m="http://schemas.openxmlformats.org/officeDocument/2006/math" xmlns="" val="1"/>
+              <ma14:wrappingTextBoxFlag xmlns="" xmlns:m="http://schemas.openxmlformats.org/officeDocument/2006/math" xmlns:a14="http://schemas.microsoft.com/office/drawing/2010/main" xmlns:ma14="http://schemas.microsoft.com/office/mac/drawingml/2011/main" val="1"/>
             </a:ext>
           </a:extLst>
         </p:spPr>
@@ -7823,7 +7823,7 @@
           </a:ln>
           <a:extLst>
             <a:ext uri="{C572A759-6A51-4108-AA02-DFA0A04FC94B}">
-              <ma14:wrappingTextBoxFlag xmlns:ma14="http://schemas.microsoft.com/office/mac/drawingml/2011/main" xmlns:a14="http://schemas.microsoft.com/office/drawing/2010/main" xmlns:m="http://schemas.openxmlformats.org/officeDocument/2006/math" xmlns="" val="1"/>
+              <ma14:wrappingTextBoxFlag xmlns="" xmlns:m="http://schemas.openxmlformats.org/officeDocument/2006/math" xmlns:a14="http://schemas.microsoft.com/office/drawing/2010/main" xmlns:ma14="http://schemas.microsoft.com/office/mac/drawingml/2011/main" val="1"/>
             </a:ext>
           </a:extLst>
         </p:spPr>
@@ -7983,7 +7983,7 @@
           </a:ln>
           <a:extLst>
             <a:ext uri="{C572A759-6A51-4108-AA02-DFA0A04FC94B}">
-              <ma14:wrappingTextBoxFlag xmlns:ma14="http://schemas.microsoft.com/office/mac/drawingml/2011/main" xmlns:a14="http://schemas.microsoft.com/office/drawing/2010/main" xmlns:m="http://schemas.openxmlformats.org/officeDocument/2006/math" xmlns="" val="1"/>
+              <ma14:wrappingTextBoxFlag xmlns="" xmlns:m="http://schemas.openxmlformats.org/officeDocument/2006/math" xmlns:a14="http://schemas.microsoft.com/office/drawing/2010/main" xmlns:ma14="http://schemas.microsoft.com/office/mac/drawingml/2011/main" val="1"/>
             </a:ext>
           </a:extLst>
         </p:spPr>
@@ -8091,7 +8091,7 @@
           </a:ln>
           <a:extLst>
             <a:ext uri="{C572A759-6A51-4108-AA02-DFA0A04FC94B}">
-              <ma14:wrappingTextBoxFlag xmlns:ma14="http://schemas.microsoft.com/office/mac/drawingml/2011/main" xmlns:a14="http://schemas.microsoft.com/office/drawing/2010/main" xmlns:m="http://schemas.openxmlformats.org/officeDocument/2006/math" xmlns="" val="1"/>
+              <ma14:wrappingTextBoxFlag xmlns="" xmlns:m="http://schemas.openxmlformats.org/officeDocument/2006/math" xmlns:a14="http://schemas.microsoft.com/office/drawing/2010/main" xmlns:ma14="http://schemas.microsoft.com/office/mac/drawingml/2011/main" val="1"/>
             </a:ext>
           </a:extLst>
         </p:spPr>
@@ -8251,7 +8251,7 @@
           </a:ln>
           <a:extLst>
             <a:ext uri="{C572A759-6A51-4108-AA02-DFA0A04FC94B}">
-              <ma14:wrappingTextBoxFlag xmlns:ma14="http://schemas.microsoft.com/office/mac/drawingml/2011/main" xmlns:a14="http://schemas.microsoft.com/office/drawing/2010/main" xmlns:m="http://schemas.openxmlformats.org/officeDocument/2006/math" xmlns="" val="1"/>
+              <ma14:wrappingTextBoxFlag xmlns="" xmlns:m="http://schemas.openxmlformats.org/officeDocument/2006/math" xmlns:a14="http://schemas.microsoft.com/office/drawing/2010/main" xmlns:ma14="http://schemas.microsoft.com/office/mac/drawingml/2011/main" val="1"/>
             </a:ext>
           </a:extLst>
         </p:spPr>
@@ -8401,7 +8401,7 @@
           </a:ln>
           <a:extLst>
             <a:ext uri="{C572A759-6A51-4108-AA02-DFA0A04FC94B}">
-              <ma14:wrappingTextBoxFlag xmlns:ma14="http://schemas.microsoft.com/office/mac/drawingml/2011/main" xmlns:a14="http://schemas.microsoft.com/office/drawing/2010/main" xmlns:m="http://schemas.openxmlformats.org/officeDocument/2006/math" xmlns="" val="1"/>
+              <ma14:wrappingTextBoxFlag xmlns="" xmlns:m="http://schemas.openxmlformats.org/officeDocument/2006/math" xmlns:a14="http://schemas.microsoft.com/office/drawing/2010/main" xmlns:ma14="http://schemas.microsoft.com/office/mac/drawingml/2011/main" val="1"/>
             </a:ext>
           </a:extLst>
         </p:spPr>
@@ -9192,7 +9192,7 @@
           </a:ln>
           <a:extLst>
             <a:ext uri="{C572A759-6A51-4108-AA02-DFA0A04FC94B}">
-              <ma14:wrappingTextBoxFlag xmlns:ma14="http://schemas.microsoft.com/office/mac/drawingml/2011/main" xmlns:a14="http://schemas.microsoft.com/office/drawing/2010/main" xmlns:m="http://schemas.openxmlformats.org/officeDocument/2006/math" xmlns="" val="1"/>
+              <ma14:wrappingTextBoxFlag xmlns="" xmlns:m="http://schemas.openxmlformats.org/officeDocument/2006/math" xmlns:a14="http://schemas.microsoft.com/office/drawing/2010/main" xmlns:ma14="http://schemas.microsoft.com/office/mac/drawingml/2011/main" val="1"/>
             </a:ext>
           </a:extLst>
         </p:spPr>
@@ -9243,7 +9243,7 @@
           </a:ln>
           <a:extLst>
             <a:ext uri="{C572A759-6A51-4108-AA02-DFA0A04FC94B}">
-              <ma14:wrappingTextBoxFlag xmlns:ma14="http://schemas.microsoft.com/office/mac/drawingml/2011/main" xmlns:a14="http://schemas.microsoft.com/office/drawing/2010/main" xmlns:m="http://schemas.openxmlformats.org/officeDocument/2006/math" xmlns="" val="1"/>
+              <ma14:wrappingTextBoxFlag xmlns="" xmlns:m="http://schemas.openxmlformats.org/officeDocument/2006/math" xmlns:a14="http://schemas.microsoft.com/office/drawing/2010/main" xmlns:ma14="http://schemas.microsoft.com/office/mac/drawingml/2011/main" val="1"/>
             </a:ext>
           </a:extLst>
         </p:spPr>
@@ -9291,7 +9291,7 @@
           </a:ln>
           <a:extLst>
             <a:ext uri="{C572A759-6A51-4108-AA02-DFA0A04FC94B}">
-              <ma14:wrappingTextBoxFlag xmlns:ma14="http://schemas.microsoft.com/office/mac/drawingml/2011/main" xmlns:a14="http://schemas.microsoft.com/office/drawing/2010/main" xmlns:m="http://schemas.openxmlformats.org/officeDocument/2006/math" xmlns="" val="1"/>
+              <ma14:wrappingTextBoxFlag xmlns="" xmlns:m="http://schemas.openxmlformats.org/officeDocument/2006/math" xmlns:a14="http://schemas.microsoft.com/office/drawing/2010/main" xmlns:ma14="http://schemas.microsoft.com/office/mac/drawingml/2011/main" val="1"/>
             </a:ext>
           </a:extLst>
         </p:spPr>
@@ -9339,7 +9339,7 @@
           </a:ln>
           <a:extLst>
             <a:ext uri="{C572A759-6A51-4108-AA02-DFA0A04FC94B}">
-              <ma14:wrappingTextBoxFlag xmlns:ma14="http://schemas.microsoft.com/office/mac/drawingml/2011/main" xmlns:a14="http://schemas.microsoft.com/office/drawing/2010/main" xmlns:m="http://schemas.openxmlformats.org/officeDocument/2006/math" xmlns="" val="1"/>
+              <ma14:wrappingTextBoxFlag xmlns="" xmlns:m="http://schemas.openxmlformats.org/officeDocument/2006/math" xmlns:a14="http://schemas.microsoft.com/office/drawing/2010/main" xmlns:ma14="http://schemas.microsoft.com/office/mac/drawingml/2011/main" val="1"/>
             </a:ext>
           </a:extLst>
         </p:spPr>
@@ -9390,7 +9390,7 @@
           </a:ln>
           <a:extLst>
             <a:ext uri="{C572A759-6A51-4108-AA02-DFA0A04FC94B}">
-              <ma14:wrappingTextBoxFlag xmlns:ma14="http://schemas.microsoft.com/office/mac/drawingml/2011/main" xmlns:a14="http://schemas.microsoft.com/office/drawing/2010/main" xmlns:m="http://schemas.openxmlformats.org/officeDocument/2006/math" xmlns="" val="1"/>
+              <ma14:wrappingTextBoxFlag xmlns="" xmlns:m="http://schemas.openxmlformats.org/officeDocument/2006/math" xmlns:a14="http://schemas.microsoft.com/office/drawing/2010/main" xmlns:ma14="http://schemas.microsoft.com/office/mac/drawingml/2011/main" val="1"/>
             </a:ext>
           </a:extLst>
         </p:spPr>
@@ -9441,7 +9441,7 @@
           </a:ln>
           <a:extLst>
             <a:ext uri="{C572A759-6A51-4108-AA02-DFA0A04FC94B}">
-              <ma14:wrappingTextBoxFlag xmlns:ma14="http://schemas.microsoft.com/office/mac/drawingml/2011/main" xmlns:a14="http://schemas.microsoft.com/office/drawing/2010/main" xmlns:m="http://schemas.openxmlformats.org/officeDocument/2006/math" xmlns="" val="1"/>
+              <ma14:wrappingTextBoxFlag xmlns="" xmlns:m="http://schemas.openxmlformats.org/officeDocument/2006/math" xmlns:a14="http://schemas.microsoft.com/office/drawing/2010/main" xmlns:ma14="http://schemas.microsoft.com/office/mac/drawingml/2011/main" val="1"/>
             </a:ext>
           </a:extLst>
         </p:spPr>
@@ -9492,7 +9492,7 @@
           </a:ln>
           <a:extLst>
             <a:ext uri="{C572A759-6A51-4108-AA02-DFA0A04FC94B}">
-              <ma14:wrappingTextBoxFlag xmlns:ma14="http://schemas.microsoft.com/office/mac/drawingml/2011/main" xmlns:a14="http://schemas.microsoft.com/office/drawing/2010/main" xmlns:m="http://schemas.openxmlformats.org/officeDocument/2006/math" xmlns="" val="1"/>
+              <ma14:wrappingTextBoxFlag xmlns="" xmlns:m="http://schemas.openxmlformats.org/officeDocument/2006/math" xmlns:a14="http://schemas.microsoft.com/office/drawing/2010/main" xmlns:ma14="http://schemas.microsoft.com/office/mac/drawingml/2011/main" val="1"/>
             </a:ext>
           </a:extLst>
         </p:spPr>
@@ -9537,7 +9537,7 @@
           </a:ln>
           <a:extLst>
             <a:ext uri="{C572A759-6A51-4108-AA02-DFA0A04FC94B}">
-              <ma14:wrappingTextBoxFlag xmlns:ma14="http://schemas.microsoft.com/office/mac/drawingml/2011/main" xmlns:a14="http://schemas.microsoft.com/office/drawing/2010/main" xmlns:m="http://schemas.openxmlformats.org/officeDocument/2006/math" xmlns="" val="1"/>
+              <ma14:wrappingTextBoxFlag xmlns="" xmlns:m="http://schemas.openxmlformats.org/officeDocument/2006/math" xmlns:a14="http://schemas.microsoft.com/office/drawing/2010/main" xmlns:ma14="http://schemas.microsoft.com/office/mac/drawingml/2011/main" val="1"/>
             </a:ext>
           </a:extLst>
         </p:spPr>
@@ -9675,7 +9675,7 @@
           </a:ln>
           <a:extLst>
             <a:ext uri="{C572A759-6A51-4108-AA02-DFA0A04FC94B}">
-              <ma14:wrappingTextBoxFlag xmlns:ma14="http://schemas.microsoft.com/office/mac/drawingml/2011/main" xmlns:a14="http://schemas.microsoft.com/office/drawing/2010/main" xmlns:m="http://schemas.openxmlformats.org/officeDocument/2006/math" xmlns="" val="1"/>
+              <ma14:wrappingTextBoxFlag xmlns="" xmlns:m="http://schemas.openxmlformats.org/officeDocument/2006/math" xmlns:a14="http://schemas.microsoft.com/office/drawing/2010/main" xmlns:ma14="http://schemas.microsoft.com/office/mac/drawingml/2011/main" val="1"/>
             </a:ext>
           </a:extLst>
         </p:spPr>
@@ -9719,7 +9719,7 @@
           </a:ln>
           <a:extLst>
             <a:ext uri="{C572A759-6A51-4108-AA02-DFA0A04FC94B}">
-              <ma14:wrappingTextBoxFlag xmlns:ma14="http://schemas.microsoft.com/office/mac/drawingml/2011/main" xmlns:a14="http://schemas.microsoft.com/office/drawing/2010/main" xmlns:m="http://schemas.openxmlformats.org/officeDocument/2006/math" xmlns="" val="1"/>
+              <ma14:wrappingTextBoxFlag xmlns="" xmlns:m="http://schemas.openxmlformats.org/officeDocument/2006/math" xmlns:a14="http://schemas.microsoft.com/office/drawing/2010/main" xmlns:ma14="http://schemas.microsoft.com/office/mac/drawingml/2011/main" val="1"/>
             </a:ext>
           </a:extLst>
         </p:spPr>
@@ -9763,7 +9763,7 @@
           </a:ln>
           <a:extLst>
             <a:ext uri="{C572A759-6A51-4108-AA02-DFA0A04FC94B}">
-              <ma14:wrappingTextBoxFlag xmlns:ma14="http://schemas.microsoft.com/office/mac/drawingml/2011/main" xmlns:a14="http://schemas.microsoft.com/office/drawing/2010/main" xmlns:m="http://schemas.openxmlformats.org/officeDocument/2006/math" xmlns="" val="1"/>
+              <ma14:wrappingTextBoxFlag xmlns="" xmlns:m="http://schemas.openxmlformats.org/officeDocument/2006/math" xmlns:a14="http://schemas.microsoft.com/office/drawing/2010/main" xmlns:ma14="http://schemas.microsoft.com/office/mac/drawingml/2011/main" val="1"/>
             </a:ext>
           </a:extLst>
         </p:spPr>
@@ -9839,7 +9839,7 @@
           </a:ln>
           <a:extLst>
             <a:ext uri="{C572A759-6A51-4108-AA02-DFA0A04FC94B}">
-              <ma14:wrappingTextBoxFlag xmlns:ma14="http://schemas.microsoft.com/office/mac/drawingml/2011/main" xmlns:a14="http://schemas.microsoft.com/office/drawing/2010/main" xmlns:m="http://schemas.openxmlformats.org/officeDocument/2006/math" xmlns="" val="1"/>
+              <ma14:wrappingTextBoxFlag xmlns="" xmlns:m="http://schemas.openxmlformats.org/officeDocument/2006/math" xmlns:a14="http://schemas.microsoft.com/office/drawing/2010/main" xmlns:ma14="http://schemas.microsoft.com/office/mac/drawingml/2011/main" val="1"/>
             </a:ext>
           </a:extLst>
         </p:spPr>
@@ -10151,7 +10151,7 @@
           </a:ln>
           <a:extLst>
             <a:ext uri="{C572A759-6A51-4108-AA02-DFA0A04FC94B}">
-              <ma14:wrappingTextBoxFlag xmlns:ma14="http://schemas.microsoft.com/office/mac/drawingml/2011/main" xmlns:a14="http://schemas.microsoft.com/office/drawing/2010/main" xmlns:m="http://schemas.openxmlformats.org/officeDocument/2006/math" xmlns="" val="1"/>
+              <ma14:wrappingTextBoxFlag xmlns="" xmlns:m="http://schemas.openxmlformats.org/officeDocument/2006/math" xmlns:a14="http://schemas.microsoft.com/office/drawing/2010/main" xmlns:ma14="http://schemas.microsoft.com/office/mac/drawingml/2011/main" val="1"/>
             </a:ext>
           </a:extLst>
         </p:spPr>
@@ -10195,7 +10195,7 @@
           </a:ln>
           <a:extLst>
             <a:ext uri="{C572A759-6A51-4108-AA02-DFA0A04FC94B}">
-              <ma14:wrappingTextBoxFlag xmlns:ma14="http://schemas.microsoft.com/office/mac/drawingml/2011/main" xmlns:a14="http://schemas.microsoft.com/office/drawing/2010/main" xmlns:m="http://schemas.openxmlformats.org/officeDocument/2006/math" xmlns="" val="1"/>
+              <ma14:wrappingTextBoxFlag xmlns="" xmlns:m="http://schemas.openxmlformats.org/officeDocument/2006/math" xmlns:a14="http://schemas.microsoft.com/office/drawing/2010/main" xmlns:ma14="http://schemas.microsoft.com/office/mac/drawingml/2011/main" val="1"/>
             </a:ext>
           </a:extLst>
         </p:spPr>
@@ -10239,7 +10239,7 @@
           </a:ln>
           <a:extLst>
             <a:ext uri="{C572A759-6A51-4108-AA02-DFA0A04FC94B}">
-              <ma14:wrappingTextBoxFlag xmlns:ma14="http://schemas.microsoft.com/office/mac/drawingml/2011/main" xmlns:a14="http://schemas.microsoft.com/office/drawing/2010/main" xmlns:m="http://schemas.openxmlformats.org/officeDocument/2006/math" xmlns="" val="1"/>
+              <ma14:wrappingTextBoxFlag xmlns="" xmlns:m="http://schemas.openxmlformats.org/officeDocument/2006/math" xmlns:a14="http://schemas.microsoft.com/office/drawing/2010/main" xmlns:ma14="http://schemas.microsoft.com/office/mac/drawingml/2011/main" val="1"/>
             </a:ext>
           </a:extLst>
         </p:spPr>
@@ -10327,7 +10327,7 @@
           </a:ln>
           <a:extLst>
             <a:ext uri="{C572A759-6A51-4108-AA02-DFA0A04FC94B}">
-              <ma14:wrappingTextBoxFlag xmlns:ma14="http://schemas.microsoft.com/office/mac/drawingml/2011/main" xmlns:a14="http://schemas.microsoft.com/office/drawing/2010/main" xmlns:m="http://schemas.openxmlformats.org/officeDocument/2006/math" xmlns="" val="1"/>
+              <ma14:wrappingTextBoxFlag xmlns="" xmlns:m="http://schemas.openxmlformats.org/officeDocument/2006/math" xmlns:a14="http://schemas.microsoft.com/office/drawing/2010/main" xmlns:ma14="http://schemas.microsoft.com/office/mac/drawingml/2011/main" val="1"/>
             </a:ext>
           </a:extLst>
         </p:spPr>
@@ -10514,7 +10514,7 @@
           </a:ln>
           <a:extLst>
             <a:ext uri="{C572A759-6A51-4108-AA02-DFA0A04FC94B}">
-              <ma14:wrappingTextBoxFlag xmlns:ma14="http://schemas.microsoft.com/office/mac/drawingml/2011/main" xmlns:a14="http://schemas.microsoft.com/office/drawing/2010/main" xmlns:m="http://schemas.openxmlformats.org/officeDocument/2006/math" xmlns="" val="1"/>
+              <ma14:wrappingTextBoxFlag xmlns="" xmlns:m="http://schemas.openxmlformats.org/officeDocument/2006/math" xmlns:a14="http://schemas.microsoft.com/office/drawing/2010/main" xmlns:ma14="http://schemas.microsoft.com/office/mac/drawingml/2011/main" val="1"/>
             </a:ext>
           </a:extLst>
         </p:spPr>
@@ -10558,7 +10558,7 @@
           </a:ln>
           <a:extLst>
             <a:ext uri="{C572A759-6A51-4108-AA02-DFA0A04FC94B}">
-              <ma14:wrappingTextBoxFlag xmlns:ma14="http://schemas.microsoft.com/office/mac/drawingml/2011/main" xmlns:a14="http://schemas.microsoft.com/office/drawing/2010/main" xmlns:m="http://schemas.openxmlformats.org/officeDocument/2006/math" xmlns="" val="1"/>
+              <ma14:wrappingTextBoxFlag xmlns="" xmlns:m="http://schemas.openxmlformats.org/officeDocument/2006/math" xmlns:a14="http://schemas.microsoft.com/office/drawing/2010/main" xmlns:ma14="http://schemas.microsoft.com/office/mac/drawingml/2011/main" val="1"/>
             </a:ext>
           </a:extLst>
         </p:spPr>
@@ -10602,7 +10602,7 @@
           </a:ln>
           <a:extLst>
             <a:ext uri="{C572A759-6A51-4108-AA02-DFA0A04FC94B}">
-              <ma14:wrappingTextBoxFlag xmlns:ma14="http://schemas.microsoft.com/office/mac/drawingml/2011/main" xmlns:a14="http://schemas.microsoft.com/office/drawing/2010/main" xmlns:m="http://schemas.openxmlformats.org/officeDocument/2006/math" xmlns="" val="1"/>
+              <ma14:wrappingTextBoxFlag xmlns="" xmlns:m="http://schemas.openxmlformats.org/officeDocument/2006/math" xmlns:a14="http://schemas.microsoft.com/office/drawing/2010/main" xmlns:ma14="http://schemas.microsoft.com/office/mac/drawingml/2011/main" val="1"/>
             </a:ext>
           </a:extLst>
         </p:spPr>
@@ -10685,7 +10685,7 @@
           </a:ln>
           <a:extLst>
             <a:ext uri="{C572A759-6A51-4108-AA02-DFA0A04FC94B}">
-              <ma14:wrappingTextBoxFlag xmlns:ma14="http://schemas.microsoft.com/office/mac/drawingml/2011/main" xmlns:a14="http://schemas.microsoft.com/office/drawing/2010/main" xmlns:m="http://schemas.openxmlformats.org/officeDocument/2006/math" xmlns="" val="1"/>
+              <ma14:wrappingTextBoxFlag xmlns="" xmlns:m="http://schemas.openxmlformats.org/officeDocument/2006/math" xmlns:a14="http://schemas.microsoft.com/office/drawing/2010/main" xmlns:ma14="http://schemas.microsoft.com/office/mac/drawingml/2011/main" val="1"/>
             </a:ext>
           </a:extLst>
         </p:spPr>
@@ -10867,7 +10867,7 @@
           </a:ln>
           <a:extLst>
             <a:ext uri="{C572A759-6A51-4108-AA02-DFA0A04FC94B}">
-              <ma14:wrappingTextBoxFlag xmlns:ma14="http://schemas.microsoft.com/office/mac/drawingml/2011/main" xmlns:a14="http://schemas.microsoft.com/office/drawing/2010/main" xmlns:m="http://schemas.openxmlformats.org/officeDocument/2006/math" xmlns="" val="1"/>
+              <ma14:wrappingTextBoxFlag xmlns="" xmlns:m="http://schemas.openxmlformats.org/officeDocument/2006/math" xmlns:a14="http://schemas.microsoft.com/office/drawing/2010/main" xmlns:ma14="http://schemas.microsoft.com/office/mac/drawingml/2011/main" val="1"/>
             </a:ext>
           </a:extLst>
         </p:spPr>
@@ -10911,7 +10911,7 @@
           </a:ln>
           <a:extLst>
             <a:ext uri="{C572A759-6A51-4108-AA02-DFA0A04FC94B}">
-              <ma14:wrappingTextBoxFlag xmlns:ma14="http://schemas.microsoft.com/office/mac/drawingml/2011/main" xmlns:a14="http://schemas.microsoft.com/office/drawing/2010/main" xmlns:m="http://schemas.openxmlformats.org/officeDocument/2006/math" xmlns="" val="1"/>
+              <ma14:wrappingTextBoxFlag xmlns="" xmlns:m="http://schemas.openxmlformats.org/officeDocument/2006/math" xmlns:a14="http://schemas.microsoft.com/office/drawing/2010/main" xmlns:ma14="http://schemas.microsoft.com/office/mac/drawingml/2011/main" val="1"/>
             </a:ext>
           </a:extLst>
         </p:spPr>
@@ -10955,7 +10955,7 @@
           </a:ln>
           <a:extLst>
             <a:ext uri="{C572A759-6A51-4108-AA02-DFA0A04FC94B}">
-              <ma14:wrappingTextBoxFlag xmlns:ma14="http://schemas.microsoft.com/office/mac/drawingml/2011/main" xmlns:a14="http://schemas.microsoft.com/office/drawing/2010/main" xmlns:m="http://schemas.openxmlformats.org/officeDocument/2006/math" xmlns="" val="1"/>
+              <ma14:wrappingTextBoxFlag xmlns="" xmlns:m="http://schemas.openxmlformats.org/officeDocument/2006/math" xmlns:a14="http://schemas.microsoft.com/office/drawing/2010/main" xmlns:ma14="http://schemas.microsoft.com/office/mac/drawingml/2011/main" val="1"/>
             </a:ext>
           </a:extLst>
         </p:spPr>
@@ -11071,7 +11071,7 @@
           </a:ln>
           <a:extLst>
             <a:ext uri="{C572A759-6A51-4108-AA02-DFA0A04FC94B}">
-              <ma14:wrappingTextBoxFlag xmlns:ma14="http://schemas.microsoft.com/office/mac/drawingml/2011/main" xmlns:a14="http://schemas.microsoft.com/office/drawing/2010/main" xmlns:m="http://schemas.openxmlformats.org/officeDocument/2006/math" xmlns="" val="1"/>
+              <ma14:wrappingTextBoxFlag xmlns="" xmlns:m="http://schemas.openxmlformats.org/officeDocument/2006/math" xmlns:a14="http://schemas.microsoft.com/office/drawing/2010/main" xmlns:ma14="http://schemas.microsoft.com/office/mac/drawingml/2011/main" val="1"/>
             </a:ext>
           </a:extLst>
         </p:spPr>
@@ -11286,7 +11286,7 @@
           </a:ln>
           <a:extLst>
             <a:ext uri="{C572A759-6A51-4108-AA02-DFA0A04FC94B}">
-              <ma14:wrappingTextBoxFlag xmlns:ma14="http://schemas.microsoft.com/office/mac/drawingml/2011/main" xmlns:a14="http://schemas.microsoft.com/office/drawing/2010/main" xmlns:m="http://schemas.openxmlformats.org/officeDocument/2006/math" xmlns="" val="1"/>
+              <ma14:wrappingTextBoxFlag xmlns="" xmlns:m="http://schemas.openxmlformats.org/officeDocument/2006/math" xmlns:a14="http://schemas.microsoft.com/office/drawing/2010/main" xmlns:ma14="http://schemas.microsoft.com/office/mac/drawingml/2011/main" val="1"/>
             </a:ext>
           </a:extLst>
         </p:spPr>
@@ -11330,7 +11330,7 @@
           </a:ln>
           <a:extLst>
             <a:ext uri="{C572A759-6A51-4108-AA02-DFA0A04FC94B}">
-              <ma14:wrappingTextBoxFlag xmlns:ma14="http://schemas.microsoft.com/office/mac/drawingml/2011/main" xmlns:a14="http://schemas.microsoft.com/office/drawing/2010/main" xmlns:m="http://schemas.openxmlformats.org/officeDocument/2006/math" xmlns="" val="1"/>
+              <ma14:wrappingTextBoxFlag xmlns="" xmlns:m="http://schemas.openxmlformats.org/officeDocument/2006/math" xmlns:a14="http://schemas.microsoft.com/office/drawing/2010/main" xmlns:ma14="http://schemas.microsoft.com/office/mac/drawingml/2011/main" val="1"/>
             </a:ext>
           </a:extLst>
         </p:spPr>
@@ -11374,7 +11374,7 @@
           </a:ln>
           <a:extLst>
             <a:ext uri="{C572A759-6A51-4108-AA02-DFA0A04FC94B}">
-              <ma14:wrappingTextBoxFlag xmlns:ma14="http://schemas.microsoft.com/office/mac/drawingml/2011/main" xmlns:a14="http://schemas.microsoft.com/office/drawing/2010/main" xmlns:m="http://schemas.openxmlformats.org/officeDocument/2006/math" xmlns="" val="1"/>
+              <ma14:wrappingTextBoxFlag xmlns="" xmlns:m="http://schemas.openxmlformats.org/officeDocument/2006/math" xmlns:a14="http://schemas.microsoft.com/office/drawing/2010/main" xmlns:ma14="http://schemas.microsoft.com/office/mac/drawingml/2011/main" val="1"/>
             </a:ext>
           </a:extLst>
         </p:spPr>
@@ -11462,7 +11462,7 @@
           </a:ln>
           <a:extLst>
             <a:ext uri="{C572A759-6A51-4108-AA02-DFA0A04FC94B}">
-              <ma14:wrappingTextBoxFlag xmlns:ma14="http://schemas.microsoft.com/office/mac/drawingml/2011/main" xmlns:a14="http://schemas.microsoft.com/office/drawing/2010/main" xmlns:m="http://schemas.openxmlformats.org/officeDocument/2006/math" xmlns="" val="1"/>
+              <ma14:wrappingTextBoxFlag xmlns="" xmlns:m="http://schemas.openxmlformats.org/officeDocument/2006/math" xmlns:a14="http://schemas.microsoft.com/office/drawing/2010/main" xmlns:ma14="http://schemas.microsoft.com/office/mac/drawingml/2011/main" val="1"/>
             </a:ext>
           </a:extLst>
         </p:spPr>
@@ -11743,7 +11743,7 @@
           </a:ln>
           <a:extLst>
             <a:ext uri="{C572A759-6A51-4108-AA02-DFA0A04FC94B}">
-              <ma14:wrappingTextBoxFlag xmlns:ma14="http://schemas.microsoft.com/office/mac/drawingml/2011/main" xmlns:a14="http://schemas.microsoft.com/office/drawing/2010/main" xmlns:m="http://schemas.openxmlformats.org/officeDocument/2006/math" xmlns="" val="1"/>
+              <ma14:wrappingTextBoxFlag xmlns="" xmlns:m="http://schemas.openxmlformats.org/officeDocument/2006/math" xmlns:a14="http://schemas.microsoft.com/office/drawing/2010/main" xmlns:ma14="http://schemas.microsoft.com/office/mac/drawingml/2011/main" val="1"/>
             </a:ext>
           </a:extLst>
         </p:spPr>
@@ -11778,7 +11778,7 @@
           </a:ln>
           <a:extLst>
             <a:ext uri="{C572A759-6A51-4108-AA02-DFA0A04FC94B}">
-              <ma14:wrappingTextBoxFlag xmlns:ma14="http://schemas.microsoft.com/office/mac/drawingml/2011/main" xmlns:a14="http://schemas.microsoft.com/office/drawing/2010/main" xmlns:m="http://schemas.openxmlformats.org/officeDocument/2006/math" xmlns="" val="1"/>
+              <ma14:wrappingTextBoxFlag xmlns="" xmlns:m="http://schemas.openxmlformats.org/officeDocument/2006/math" xmlns:a14="http://schemas.microsoft.com/office/drawing/2010/main" xmlns:ma14="http://schemas.microsoft.com/office/mac/drawingml/2011/main" val="1"/>
             </a:ext>
           </a:extLst>
         </p:spPr>
@@ -11813,7 +11813,7 @@
           </a:ln>
           <a:extLst>
             <a:ext uri="{C572A759-6A51-4108-AA02-DFA0A04FC94B}">
-              <ma14:wrappingTextBoxFlag xmlns:ma14="http://schemas.microsoft.com/office/mac/drawingml/2011/main" xmlns:a14="http://schemas.microsoft.com/office/drawing/2010/main" xmlns:m="http://schemas.openxmlformats.org/officeDocument/2006/math" xmlns="" val="1"/>
+              <ma14:wrappingTextBoxFlag xmlns="" xmlns:m="http://schemas.openxmlformats.org/officeDocument/2006/math" xmlns:a14="http://schemas.microsoft.com/office/drawing/2010/main" xmlns:ma14="http://schemas.microsoft.com/office/mac/drawingml/2011/main" val="1"/>
             </a:ext>
           </a:extLst>
         </p:spPr>
@@ -11963,7 +11963,7 @@
           </a:ln>
           <a:extLst>
             <a:ext uri="{C572A759-6A51-4108-AA02-DFA0A04FC94B}">
-              <ma14:wrappingTextBoxFlag xmlns:ma14="http://schemas.microsoft.com/office/mac/drawingml/2011/main" xmlns:a14="http://schemas.microsoft.com/office/drawing/2010/main" xmlns:m="http://schemas.openxmlformats.org/officeDocument/2006/math" xmlns="" val="1"/>
+              <ma14:wrappingTextBoxFlag xmlns="" xmlns:m="http://schemas.openxmlformats.org/officeDocument/2006/math" xmlns:a14="http://schemas.microsoft.com/office/drawing/2010/main" xmlns:ma14="http://schemas.microsoft.com/office/mac/drawingml/2011/main" val="1"/>
             </a:ext>
           </a:extLst>
         </p:spPr>
@@ -12001,7 +12001,7 @@
           </a:ln>
           <a:extLst>
             <a:ext uri="{C572A759-6A51-4108-AA02-DFA0A04FC94B}">
-              <ma14:wrappingTextBoxFlag xmlns:ma14="http://schemas.microsoft.com/office/mac/drawingml/2011/main" xmlns:a14="http://schemas.microsoft.com/office/drawing/2010/main" xmlns:m="http://schemas.openxmlformats.org/officeDocument/2006/math" xmlns="" val="1"/>
+              <ma14:wrappingTextBoxFlag xmlns="" xmlns:m="http://schemas.openxmlformats.org/officeDocument/2006/math" xmlns:a14="http://schemas.microsoft.com/office/drawing/2010/main" xmlns:ma14="http://schemas.microsoft.com/office/mac/drawingml/2011/main" val="1"/>
             </a:ext>
           </a:extLst>
         </p:spPr>
@@ -12039,7 +12039,7 @@
           </a:ln>
           <a:extLst>
             <a:ext uri="{C572A759-6A51-4108-AA02-DFA0A04FC94B}">
-              <ma14:wrappingTextBoxFlag xmlns:ma14="http://schemas.microsoft.com/office/mac/drawingml/2011/main" xmlns:a14="http://schemas.microsoft.com/office/drawing/2010/main" xmlns:m="http://schemas.openxmlformats.org/officeDocument/2006/math" xmlns="" val="1"/>
+              <ma14:wrappingTextBoxFlag xmlns="" xmlns:m="http://schemas.openxmlformats.org/officeDocument/2006/math" xmlns:a14="http://schemas.microsoft.com/office/drawing/2010/main" xmlns:ma14="http://schemas.microsoft.com/office/mac/drawingml/2011/main" val="1"/>
             </a:ext>
           </a:extLst>
         </p:spPr>
@@ -12074,7 +12074,7 @@
           </a:ln>
           <a:extLst>
             <a:ext uri="{C572A759-6A51-4108-AA02-DFA0A04FC94B}">
-              <ma14:wrappingTextBoxFlag xmlns:ma14="http://schemas.microsoft.com/office/mac/drawingml/2011/main" xmlns:a14="http://schemas.microsoft.com/office/drawing/2010/main" xmlns:m="http://schemas.openxmlformats.org/officeDocument/2006/math" xmlns="" val="1"/>
+              <ma14:wrappingTextBoxFlag xmlns="" xmlns:m="http://schemas.openxmlformats.org/officeDocument/2006/math" xmlns:a14="http://schemas.microsoft.com/office/drawing/2010/main" xmlns:ma14="http://schemas.microsoft.com/office/mac/drawingml/2011/main" val="1"/>
             </a:ext>
           </a:extLst>
         </p:spPr>
@@ -12203,7 +12203,7 @@
           </a:ln>
           <a:extLst>
             <a:ext uri="{C572A759-6A51-4108-AA02-DFA0A04FC94B}">
-              <ma14:wrappingTextBoxFlag xmlns:ma14="http://schemas.microsoft.com/office/mac/drawingml/2011/main" xmlns:a14="http://schemas.microsoft.com/office/drawing/2010/main" xmlns:m="http://schemas.openxmlformats.org/officeDocument/2006/math" xmlns="" val="1"/>
+              <ma14:wrappingTextBoxFlag xmlns="" xmlns:m="http://schemas.openxmlformats.org/officeDocument/2006/math" xmlns:a14="http://schemas.microsoft.com/office/drawing/2010/main" xmlns:ma14="http://schemas.microsoft.com/office/mac/drawingml/2011/main" val="1"/>
             </a:ext>
           </a:extLst>
         </p:spPr>
@@ -12424,7 +12424,7 @@
           </a:ln>
           <a:extLst>
             <a:ext uri="{C572A759-6A51-4108-AA02-DFA0A04FC94B}">
-              <ma14:wrappingTextBoxFlag xmlns:ma14="http://schemas.microsoft.com/office/mac/drawingml/2011/main" xmlns:a14="http://schemas.microsoft.com/office/drawing/2010/main" xmlns:m="http://schemas.openxmlformats.org/officeDocument/2006/math" xmlns="" val="1"/>
+              <ma14:wrappingTextBoxFlag xmlns="" xmlns:m="http://schemas.openxmlformats.org/officeDocument/2006/math" xmlns:a14="http://schemas.microsoft.com/office/drawing/2010/main" xmlns:ma14="http://schemas.microsoft.com/office/mac/drawingml/2011/main" val="1"/>
             </a:ext>
           </a:extLst>
         </p:spPr>
@@ -12574,7 +12574,7 @@
           </a:ln>
           <a:extLst>
             <a:ext uri="{C572A759-6A51-4108-AA02-DFA0A04FC94B}">
-              <ma14:wrappingTextBoxFlag xmlns:ma14="http://schemas.microsoft.com/office/mac/drawingml/2011/main" xmlns:a14="http://schemas.microsoft.com/office/drawing/2010/main" xmlns:m="http://schemas.openxmlformats.org/officeDocument/2006/math" xmlns="" val="1"/>
+              <ma14:wrappingTextBoxFlag xmlns="" xmlns:m="http://schemas.openxmlformats.org/officeDocument/2006/math" xmlns:a14="http://schemas.microsoft.com/office/drawing/2010/main" xmlns:ma14="http://schemas.microsoft.com/office/mac/drawingml/2011/main" val="1"/>
             </a:ext>
           </a:extLst>
         </p:spPr>
@@ -12613,7 +12613,7 @@
           </a:ln>
           <a:extLst>
             <a:ext uri="{C572A759-6A51-4108-AA02-DFA0A04FC94B}">
-              <ma14:wrappingTextBoxFlag xmlns:ma14="http://schemas.microsoft.com/office/mac/drawingml/2011/main" xmlns:a14="http://schemas.microsoft.com/office/drawing/2010/main" xmlns:m="http://schemas.openxmlformats.org/officeDocument/2006/math" xmlns="" val="1"/>
+              <ma14:wrappingTextBoxFlag xmlns="" xmlns:m="http://schemas.openxmlformats.org/officeDocument/2006/math" xmlns:a14="http://schemas.microsoft.com/office/drawing/2010/main" xmlns:ma14="http://schemas.microsoft.com/office/mac/drawingml/2011/main" val="1"/>
             </a:ext>
           </a:extLst>
         </p:spPr>
@@ -12714,7 +12714,7 @@
           </a:ln>
           <a:extLst>
             <a:ext uri="{C572A759-6A51-4108-AA02-DFA0A04FC94B}">
-              <ma14:wrappingTextBoxFlag xmlns:ma14="http://schemas.microsoft.com/office/mac/drawingml/2011/main" xmlns:a14="http://schemas.microsoft.com/office/drawing/2010/main" xmlns:m="http://schemas.openxmlformats.org/officeDocument/2006/math" xmlns="" val="1"/>
+              <ma14:wrappingTextBoxFlag xmlns="" xmlns:m="http://schemas.openxmlformats.org/officeDocument/2006/math" xmlns:a14="http://schemas.microsoft.com/office/drawing/2010/main" xmlns:ma14="http://schemas.microsoft.com/office/mac/drawingml/2011/main" val="1"/>
             </a:ext>
           </a:extLst>
         </p:spPr>
@@ -12895,7 +12895,7 @@
           </a:ln>
           <a:extLst>
             <a:ext uri="{C572A759-6A51-4108-AA02-DFA0A04FC94B}">
-              <ma14:wrappingTextBoxFlag xmlns:ma14="http://schemas.microsoft.com/office/mac/drawingml/2011/main" xmlns:a14="http://schemas.microsoft.com/office/drawing/2010/main" xmlns:m="http://schemas.openxmlformats.org/officeDocument/2006/math" xmlns="" val="1"/>
+              <ma14:wrappingTextBoxFlag xmlns="" xmlns:m="http://schemas.openxmlformats.org/officeDocument/2006/math" xmlns:a14="http://schemas.microsoft.com/office/drawing/2010/main" xmlns:ma14="http://schemas.microsoft.com/office/mac/drawingml/2011/main" val="1"/>
             </a:ext>
           </a:extLst>
         </p:spPr>
@@ -13003,7 +13003,7 @@
           </a:ln>
           <a:extLst>
             <a:ext uri="{C572A759-6A51-4108-AA02-DFA0A04FC94B}">
-              <ma14:wrappingTextBoxFlag xmlns:ma14="http://schemas.microsoft.com/office/mac/drawingml/2011/main" xmlns:a14="http://schemas.microsoft.com/office/drawing/2010/main" xmlns:m="http://schemas.openxmlformats.org/officeDocument/2006/math" xmlns="" val="1"/>
+              <ma14:wrappingTextBoxFlag xmlns="" xmlns:m="http://schemas.openxmlformats.org/officeDocument/2006/math" xmlns:a14="http://schemas.microsoft.com/office/drawing/2010/main" xmlns:ma14="http://schemas.microsoft.com/office/mac/drawingml/2011/main" val="1"/>
             </a:ext>
           </a:extLst>
         </p:spPr>
@@ -13575,7 +13575,7 @@
           </a:ln>
           <a:extLst>
             <a:ext uri="{C572A759-6A51-4108-AA02-DFA0A04FC94B}">
-              <ma14:wrappingTextBoxFlag xmlns:ma14="http://schemas.microsoft.com/office/mac/drawingml/2011/main" xmlns:a14="http://schemas.microsoft.com/office/drawing/2010/main" xmlns:m="http://schemas.openxmlformats.org/officeDocument/2006/math" xmlns="" val="1"/>
+              <ma14:wrappingTextBoxFlag xmlns="" xmlns:m="http://schemas.openxmlformats.org/officeDocument/2006/math" xmlns:a14="http://schemas.microsoft.com/office/drawing/2010/main" xmlns:ma14="http://schemas.microsoft.com/office/mac/drawingml/2011/main" val="1"/>
             </a:ext>
           </a:extLst>
         </p:spPr>
@@ -13614,7 +13614,7 @@
           </a:ln>
           <a:extLst>
             <a:ext uri="{C572A759-6A51-4108-AA02-DFA0A04FC94B}">
-              <ma14:wrappingTextBoxFlag xmlns:ma14="http://schemas.microsoft.com/office/mac/drawingml/2011/main" xmlns:a14="http://schemas.microsoft.com/office/drawing/2010/main" xmlns:m="http://schemas.openxmlformats.org/officeDocument/2006/math" xmlns="" val="1"/>
+              <ma14:wrappingTextBoxFlag xmlns="" xmlns:m="http://schemas.openxmlformats.org/officeDocument/2006/math" xmlns:a14="http://schemas.microsoft.com/office/drawing/2010/main" xmlns:ma14="http://schemas.microsoft.com/office/mac/drawingml/2011/main" val="1"/>
             </a:ext>
           </a:extLst>
         </p:spPr>
@@ -13653,7 +13653,7 @@
           </a:ln>
           <a:extLst>
             <a:ext uri="{C572A759-6A51-4108-AA02-DFA0A04FC94B}">
-              <ma14:wrappingTextBoxFlag xmlns:ma14="http://schemas.microsoft.com/office/mac/drawingml/2011/main" xmlns:a14="http://schemas.microsoft.com/office/drawing/2010/main" xmlns:m="http://schemas.openxmlformats.org/officeDocument/2006/math" xmlns="" val="1"/>
+              <ma14:wrappingTextBoxFlag xmlns="" xmlns:m="http://schemas.openxmlformats.org/officeDocument/2006/math" xmlns:a14="http://schemas.microsoft.com/office/drawing/2010/main" xmlns:ma14="http://schemas.microsoft.com/office/mac/drawingml/2011/main" val="1"/>
             </a:ext>
           </a:extLst>
         </p:spPr>
@@ -13696,7 +13696,7 @@
           </a:ln>
           <a:extLst>
             <a:ext uri="{C572A759-6A51-4108-AA02-DFA0A04FC94B}">
-              <ma14:wrappingTextBoxFlag xmlns:ma14="http://schemas.microsoft.com/office/mac/drawingml/2011/main" xmlns:a14="http://schemas.microsoft.com/office/drawing/2010/main" xmlns:m="http://schemas.openxmlformats.org/officeDocument/2006/math" xmlns="" val="1"/>
+              <ma14:wrappingTextBoxFlag xmlns="" xmlns:m="http://schemas.openxmlformats.org/officeDocument/2006/math" xmlns:a14="http://schemas.microsoft.com/office/drawing/2010/main" xmlns:ma14="http://schemas.microsoft.com/office/mac/drawingml/2011/main" val="1"/>
             </a:ext>
           </a:extLst>
         </p:spPr>
@@ -13739,7 +13739,7 @@
           </a:ln>
           <a:extLst>
             <a:ext uri="{C572A759-6A51-4108-AA02-DFA0A04FC94B}">
-              <ma14:wrappingTextBoxFlag xmlns:ma14="http://schemas.microsoft.com/office/mac/drawingml/2011/main" xmlns:a14="http://schemas.microsoft.com/office/drawing/2010/main" xmlns:m="http://schemas.openxmlformats.org/officeDocument/2006/math" xmlns="" val="1"/>
+              <ma14:wrappingTextBoxFlag xmlns="" xmlns:m="http://schemas.openxmlformats.org/officeDocument/2006/math" xmlns:a14="http://schemas.microsoft.com/office/drawing/2010/main" xmlns:ma14="http://schemas.microsoft.com/office/mac/drawingml/2011/main" val="1"/>
             </a:ext>
           </a:extLst>
         </p:spPr>
@@ -13804,7 +13804,7 @@
           </a:ln>
           <a:extLst>
             <a:ext uri="{C572A759-6A51-4108-AA02-DFA0A04FC94B}">
-              <ma14:wrappingTextBoxFlag xmlns:ma14="http://schemas.microsoft.com/office/mac/drawingml/2011/main" xmlns:a14="http://schemas.microsoft.com/office/drawing/2010/main" xmlns:m="http://schemas.openxmlformats.org/officeDocument/2006/math" xmlns="" val="1"/>
+              <ma14:wrappingTextBoxFlag xmlns="" xmlns:m="http://schemas.openxmlformats.org/officeDocument/2006/math" xmlns:a14="http://schemas.microsoft.com/office/drawing/2010/main" xmlns:ma14="http://schemas.microsoft.com/office/mac/drawingml/2011/main" val="1"/>
             </a:ext>
           </a:extLst>
         </p:spPr>
@@ -13866,7 +13866,7 @@
           </a:ln>
           <a:extLst>
             <a:ext uri="{C572A759-6A51-4108-AA02-DFA0A04FC94B}">
-              <ma14:wrappingTextBoxFlag xmlns:ma14="http://schemas.microsoft.com/office/mac/drawingml/2011/main" xmlns:a14="http://schemas.microsoft.com/office/drawing/2010/main" xmlns:m="http://schemas.openxmlformats.org/officeDocument/2006/math" xmlns="" val="1"/>
+              <ma14:wrappingTextBoxFlag xmlns="" xmlns:m="http://schemas.openxmlformats.org/officeDocument/2006/math" xmlns:a14="http://schemas.microsoft.com/office/drawing/2010/main" xmlns:ma14="http://schemas.microsoft.com/office/mac/drawingml/2011/main" val="1"/>
             </a:ext>
           </a:extLst>
         </p:spPr>
@@ -13919,7 +13919,7 @@
           </a:ln>
           <a:extLst>
             <a:ext uri="{C572A759-6A51-4108-AA02-DFA0A04FC94B}">
-              <ma14:wrappingTextBoxFlag xmlns:ma14="http://schemas.microsoft.com/office/mac/drawingml/2011/main" xmlns:a14="http://schemas.microsoft.com/office/drawing/2010/main" xmlns:m="http://schemas.openxmlformats.org/officeDocument/2006/math" xmlns="" val="1"/>
+              <ma14:wrappingTextBoxFlag xmlns="" xmlns:m="http://schemas.openxmlformats.org/officeDocument/2006/math" xmlns:a14="http://schemas.microsoft.com/office/drawing/2010/main" xmlns:ma14="http://schemas.microsoft.com/office/mac/drawingml/2011/main" val="1"/>
             </a:ext>
           </a:extLst>
         </p:spPr>
@@ -13983,7 +13983,7 @@
           </a:ln>
           <a:extLst>
             <a:ext uri="{C572A759-6A51-4108-AA02-DFA0A04FC94B}">
-              <ma14:wrappingTextBoxFlag xmlns:ma14="http://schemas.microsoft.com/office/mac/drawingml/2011/main" xmlns:a14="http://schemas.microsoft.com/office/drawing/2010/main" xmlns:m="http://schemas.openxmlformats.org/officeDocument/2006/math" xmlns="" val="1"/>
+              <ma14:wrappingTextBoxFlag xmlns="" xmlns:m="http://schemas.openxmlformats.org/officeDocument/2006/math" xmlns:a14="http://schemas.microsoft.com/office/drawing/2010/main" xmlns:ma14="http://schemas.microsoft.com/office/mac/drawingml/2011/main" val="1"/>
             </a:ext>
           </a:extLst>
         </p:spPr>
@@ -14027,7 +14027,7 @@
           </a:ln>
           <a:extLst>
             <a:ext uri="{C572A759-6A51-4108-AA02-DFA0A04FC94B}">
-              <ma14:wrappingTextBoxFlag xmlns:ma14="http://schemas.microsoft.com/office/mac/drawingml/2011/main" xmlns:a14="http://schemas.microsoft.com/office/drawing/2010/main" xmlns:m="http://schemas.openxmlformats.org/officeDocument/2006/math" xmlns="" val="1"/>
+              <ma14:wrappingTextBoxFlag xmlns="" xmlns:m="http://schemas.openxmlformats.org/officeDocument/2006/math" xmlns:a14="http://schemas.microsoft.com/office/drawing/2010/main" xmlns:ma14="http://schemas.microsoft.com/office/mac/drawingml/2011/main" val="1"/>
             </a:ext>
           </a:extLst>
         </p:spPr>
@@ -14071,7 +14071,7 @@
           </a:ln>
           <a:extLst>
             <a:ext uri="{C572A759-6A51-4108-AA02-DFA0A04FC94B}">
-              <ma14:wrappingTextBoxFlag xmlns:ma14="http://schemas.microsoft.com/office/mac/drawingml/2011/main" xmlns:a14="http://schemas.microsoft.com/office/drawing/2010/main" xmlns:m="http://schemas.openxmlformats.org/officeDocument/2006/math" xmlns="" val="1"/>
+              <ma14:wrappingTextBoxFlag xmlns="" xmlns:m="http://schemas.openxmlformats.org/officeDocument/2006/math" xmlns:a14="http://schemas.microsoft.com/office/drawing/2010/main" xmlns:ma14="http://schemas.microsoft.com/office/mac/drawingml/2011/main" val="1"/>
             </a:ext>
           </a:extLst>
         </p:spPr>
@@ -14123,7 +14123,7 @@
           </a:ln>
           <a:extLst>
             <a:ext uri="{C572A759-6A51-4108-AA02-DFA0A04FC94B}">
-              <ma14:wrappingTextBoxFlag xmlns:ma14="http://schemas.microsoft.com/office/mac/drawingml/2011/main" xmlns:a14="http://schemas.microsoft.com/office/drawing/2010/main" xmlns:m="http://schemas.openxmlformats.org/officeDocument/2006/math" xmlns="" val="1"/>
+              <ma14:wrappingTextBoxFlag xmlns="" xmlns:m="http://schemas.openxmlformats.org/officeDocument/2006/math" xmlns:a14="http://schemas.microsoft.com/office/drawing/2010/main" xmlns:ma14="http://schemas.microsoft.com/office/mac/drawingml/2011/main" val="1"/>
             </a:ext>
           </a:extLst>
         </p:spPr>
@@ -14990,7 +14990,7 @@
           </a:ln>
           <a:extLst>
             <a:ext uri="{C572A759-6A51-4108-AA02-DFA0A04FC94B}">
-              <ma14:wrappingTextBoxFlag xmlns:ma14="http://schemas.microsoft.com/office/mac/drawingml/2011/main" xmlns:a14="http://schemas.microsoft.com/office/drawing/2010/main" xmlns:m="http://schemas.openxmlformats.org/officeDocument/2006/math" xmlns="" val="1"/>
+              <ma14:wrappingTextBoxFlag xmlns="" xmlns:m="http://schemas.openxmlformats.org/officeDocument/2006/math" xmlns:a14="http://schemas.microsoft.com/office/drawing/2010/main" xmlns:ma14="http://schemas.microsoft.com/office/mac/drawingml/2011/main" val="1"/>
             </a:ext>
           </a:extLst>
         </p:spPr>
@@ -15134,7 +15134,7 @@
           </a:ln>
           <a:extLst>
             <a:ext uri="{C572A759-6A51-4108-AA02-DFA0A04FC94B}">
-              <ma14:wrappingTextBoxFlag xmlns:ma14="http://schemas.microsoft.com/office/mac/drawingml/2011/main" xmlns:a14="http://schemas.microsoft.com/office/drawing/2010/main" xmlns:m="http://schemas.openxmlformats.org/officeDocument/2006/math" xmlns="" val="1"/>
+              <ma14:wrappingTextBoxFlag xmlns="" xmlns:m="http://schemas.openxmlformats.org/officeDocument/2006/math" xmlns:a14="http://schemas.microsoft.com/office/drawing/2010/main" xmlns:ma14="http://schemas.microsoft.com/office/mac/drawingml/2011/main" val="1"/>
             </a:ext>
           </a:extLst>
         </p:spPr>
@@ -15187,7 +15187,7 @@
           </a:ln>
           <a:extLst>
             <a:ext uri="{C572A759-6A51-4108-AA02-DFA0A04FC94B}">
-              <ma14:wrappingTextBoxFlag xmlns:ma14="http://schemas.microsoft.com/office/mac/drawingml/2011/main" xmlns:a14="http://schemas.microsoft.com/office/drawing/2010/main" xmlns:m="http://schemas.openxmlformats.org/officeDocument/2006/math" xmlns="" val="1"/>
+              <ma14:wrappingTextBoxFlag xmlns="" xmlns:m="http://schemas.openxmlformats.org/officeDocument/2006/math" xmlns:a14="http://schemas.microsoft.com/office/drawing/2010/main" xmlns:ma14="http://schemas.microsoft.com/office/mac/drawingml/2011/main" val="1"/>
             </a:ext>
           </a:extLst>
         </p:spPr>
@@ -15237,7 +15237,7 @@
           </a:ln>
           <a:extLst>
             <a:ext uri="{C572A759-6A51-4108-AA02-DFA0A04FC94B}">
-              <ma14:wrappingTextBoxFlag xmlns:ma14="http://schemas.microsoft.com/office/mac/drawingml/2011/main" xmlns:a14="http://schemas.microsoft.com/office/drawing/2010/main" xmlns:m="http://schemas.openxmlformats.org/officeDocument/2006/math" xmlns="" val="1"/>
+              <ma14:wrappingTextBoxFlag xmlns="" xmlns:m="http://schemas.openxmlformats.org/officeDocument/2006/math" xmlns:a14="http://schemas.microsoft.com/office/drawing/2010/main" xmlns:ma14="http://schemas.microsoft.com/office/mac/drawingml/2011/main" val="1"/>
             </a:ext>
           </a:extLst>
         </p:spPr>
@@ -15287,7 +15287,7 @@
           </a:ln>
           <a:extLst>
             <a:ext uri="{C572A759-6A51-4108-AA02-DFA0A04FC94B}">
-              <ma14:wrappingTextBoxFlag xmlns:ma14="http://schemas.microsoft.com/office/mac/drawingml/2011/main" xmlns:a14="http://schemas.microsoft.com/office/drawing/2010/main" xmlns:m="http://schemas.openxmlformats.org/officeDocument/2006/math" xmlns="" val="1"/>
+              <ma14:wrappingTextBoxFlag xmlns="" xmlns:m="http://schemas.openxmlformats.org/officeDocument/2006/math" xmlns:a14="http://schemas.microsoft.com/office/drawing/2010/main" xmlns:ma14="http://schemas.microsoft.com/office/mac/drawingml/2011/main" val="1"/>
             </a:ext>
           </a:extLst>
         </p:spPr>
@@ -15337,7 +15337,7 @@
           </a:ln>
           <a:extLst>
             <a:ext uri="{C572A759-6A51-4108-AA02-DFA0A04FC94B}">
-              <ma14:wrappingTextBoxFlag xmlns:ma14="http://schemas.microsoft.com/office/mac/drawingml/2011/main" xmlns:a14="http://schemas.microsoft.com/office/drawing/2010/main" xmlns:m="http://schemas.openxmlformats.org/officeDocument/2006/math" xmlns="" val="1"/>
+              <ma14:wrappingTextBoxFlag xmlns="" xmlns:m="http://schemas.openxmlformats.org/officeDocument/2006/math" xmlns:a14="http://schemas.microsoft.com/office/drawing/2010/main" xmlns:ma14="http://schemas.microsoft.com/office/mac/drawingml/2011/main" val="1"/>
             </a:ext>
           </a:extLst>
         </p:spPr>
@@ -15387,7 +15387,7 @@
           </a:ln>
           <a:extLst>
             <a:ext uri="{C572A759-6A51-4108-AA02-DFA0A04FC94B}">
-              <ma14:wrappingTextBoxFlag xmlns:ma14="http://schemas.microsoft.com/office/mac/drawingml/2011/main" xmlns:a14="http://schemas.microsoft.com/office/drawing/2010/main" xmlns:m="http://schemas.openxmlformats.org/officeDocument/2006/math" xmlns="" val="1"/>
+              <ma14:wrappingTextBoxFlag xmlns="" xmlns:m="http://schemas.openxmlformats.org/officeDocument/2006/math" xmlns:a14="http://schemas.microsoft.com/office/drawing/2010/main" xmlns:ma14="http://schemas.microsoft.com/office/mac/drawingml/2011/main" val="1"/>
             </a:ext>
           </a:extLst>
         </p:spPr>
@@ -15440,7 +15440,7 @@
           </a:ln>
           <a:extLst>
             <a:ext uri="{C572A759-6A51-4108-AA02-DFA0A04FC94B}">
-              <ma14:wrappingTextBoxFlag xmlns:ma14="http://schemas.microsoft.com/office/mac/drawingml/2011/main" xmlns:a14="http://schemas.microsoft.com/office/drawing/2010/main" xmlns:m="http://schemas.openxmlformats.org/officeDocument/2006/math" xmlns="" val="1"/>
+              <ma14:wrappingTextBoxFlag xmlns="" xmlns:m="http://schemas.openxmlformats.org/officeDocument/2006/math" xmlns:a14="http://schemas.microsoft.com/office/drawing/2010/main" xmlns:ma14="http://schemas.microsoft.com/office/mac/drawingml/2011/main" val="1"/>
             </a:ext>
           </a:extLst>
         </p:spPr>
@@ -15482,7 +15482,7 @@
           </a:ln>
           <a:extLst>
             <a:ext uri="{C572A759-6A51-4108-AA02-DFA0A04FC94B}">
-              <ma14:wrappingTextBoxFlag xmlns:ma14="http://schemas.microsoft.com/office/mac/drawingml/2011/main" xmlns:a14="http://schemas.microsoft.com/office/drawing/2010/main" xmlns:m="http://schemas.openxmlformats.org/officeDocument/2006/math" xmlns="" val="1"/>
+              <ma14:wrappingTextBoxFlag xmlns="" xmlns:m="http://schemas.openxmlformats.org/officeDocument/2006/math" xmlns:a14="http://schemas.microsoft.com/office/drawing/2010/main" xmlns:ma14="http://schemas.microsoft.com/office/mac/drawingml/2011/main" val="1"/>
             </a:ext>
           </a:extLst>
         </p:spPr>
@@ -15529,7 +15529,7 @@
           </a:ln>
           <a:extLst>
             <a:ext uri="{C572A759-6A51-4108-AA02-DFA0A04FC94B}">
-              <ma14:wrappingTextBoxFlag xmlns:ma14="http://schemas.microsoft.com/office/mac/drawingml/2011/main" xmlns:a14="http://schemas.microsoft.com/office/drawing/2010/main" xmlns:m="http://schemas.openxmlformats.org/officeDocument/2006/math" xmlns="" val="1"/>
+              <ma14:wrappingTextBoxFlag xmlns="" xmlns:m="http://schemas.openxmlformats.org/officeDocument/2006/math" xmlns:a14="http://schemas.microsoft.com/office/drawing/2010/main" xmlns:ma14="http://schemas.microsoft.com/office/mac/drawingml/2011/main" val="1"/>
             </a:ext>
           </a:extLst>
         </p:spPr>
@@ -15576,7 +15576,7 @@
           </a:ln>
           <a:extLst>
             <a:ext uri="{C572A759-6A51-4108-AA02-DFA0A04FC94B}">
-              <ma14:wrappingTextBoxFlag xmlns:ma14="http://schemas.microsoft.com/office/mac/drawingml/2011/main" xmlns:a14="http://schemas.microsoft.com/office/drawing/2010/main" xmlns:m="http://schemas.openxmlformats.org/officeDocument/2006/math" xmlns="" val="1"/>
+              <ma14:wrappingTextBoxFlag xmlns="" xmlns:m="http://schemas.openxmlformats.org/officeDocument/2006/math" xmlns:a14="http://schemas.microsoft.com/office/drawing/2010/main" xmlns:ma14="http://schemas.microsoft.com/office/mac/drawingml/2011/main" val="1"/>
             </a:ext>
           </a:extLst>
         </p:spPr>
@@ -15623,7 +15623,7 @@
           </a:ln>
           <a:extLst>
             <a:ext uri="{C572A759-6A51-4108-AA02-DFA0A04FC94B}">
-              <ma14:wrappingTextBoxFlag xmlns:ma14="http://schemas.microsoft.com/office/mac/drawingml/2011/main" xmlns:a14="http://schemas.microsoft.com/office/drawing/2010/main" xmlns:m="http://schemas.openxmlformats.org/officeDocument/2006/math" xmlns="" val="1"/>
+              <ma14:wrappingTextBoxFlag xmlns="" xmlns:m="http://schemas.openxmlformats.org/officeDocument/2006/math" xmlns:a14="http://schemas.microsoft.com/office/drawing/2010/main" xmlns:ma14="http://schemas.microsoft.com/office/mac/drawingml/2011/main" val="1"/>
             </a:ext>
           </a:extLst>
         </p:spPr>
@@ -15681,7 +15681,7 @@
           </a:ln>
           <a:extLst>
             <a:ext uri="{C572A759-6A51-4108-AA02-DFA0A04FC94B}">
-              <ma14:wrappingTextBoxFlag xmlns:ma14="http://schemas.microsoft.com/office/mac/drawingml/2011/main" xmlns:a14="http://schemas.microsoft.com/office/drawing/2010/main" xmlns:m="http://schemas.openxmlformats.org/officeDocument/2006/math" xmlns="" val="1"/>
+              <ma14:wrappingTextBoxFlag xmlns="" xmlns:m="http://schemas.openxmlformats.org/officeDocument/2006/math" xmlns:a14="http://schemas.microsoft.com/office/drawing/2010/main" xmlns:ma14="http://schemas.microsoft.com/office/mac/drawingml/2011/main" val="1"/>
             </a:ext>
           </a:extLst>
         </p:spPr>
@@ -15734,7 +15734,7 @@
           </a:ln>
           <a:extLst>
             <a:ext uri="{C572A759-6A51-4108-AA02-DFA0A04FC94B}">
-              <ma14:wrappingTextBoxFlag xmlns:ma14="http://schemas.microsoft.com/office/mac/drawingml/2011/main" xmlns:a14="http://schemas.microsoft.com/office/drawing/2010/main" xmlns:m="http://schemas.openxmlformats.org/officeDocument/2006/math" xmlns="" val="1"/>
+              <ma14:wrappingTextBoxFlag xmlns="" xmlns:m="http://schemas.openxmlformats.org/officeDocument/2006/math" xmlns:a14="http://schemas.microsoft.com/office/drawing/2010/main" xmlns:ma14="http://schemas.microsoft.com/office/mac/drawingml/2011/main" val="1"/>
             </a:ext>
           </a:extLst>
         </p:spPr>
@@ -15787,7 +15787,7 @@
           </a:ln>
           <a:extLst>
             <a:ext uri="{C572A759-6A51-4108-AA02-DFA0A04FC94B}">
-              <ma14:wrappingTextBoxFlag xmlns:ma14="http://schemas.microsoft.com/office/mac/drawingml/2011/main" xmlns:a14="http://schemas.microsoft.com/office/drawing/2010/main" xmlns:m="http://schemas.openxmlformats.org/officeDocument/2006/math" xmlns="" val="1"/>
+              <ma14:wrappingTextBoxFlag xmlns="" xmlns:m="http://schemas.openxmlformats.org/officeDocument/2006/math" xmlns:a14="http://schemas.microsoft.com/office/drawing/2010/main" xmlns:ma14="http://schemas.microsoft.com/office/mac/drawingml/2011/main" val="1"/>
             </a:ext>
           </a:extLst>
         </p:spPr>
@@ -15840,7 +15840,7 @@
           </a:ln>
           <a:extLst>
             <a:ext uri="{C572A759-6A51-4108-AA02-DFA0A04FC94B}">
-              <ma14:wrappingTextBoxFlag xmlns:ma14="http://schemas.microsoft.com/office/mac/drawingml/2011/main" xmlns:a14="http://schemas.microsoft.com/office/drawing/2010/main" xmlns:m="http://schemas.openxmlformats.org/officeDocument/2006/math" xmlns="" val="1"/>
+              <ma14:wrappingTextBoxFlag xmlns="" xmlns:m="http://schemas.openxmlformats.org/officeDocument/2006/math" xmlns:a14="http://schemas.microsoft.com/office/drawing/2010/main" xmlns:ma14="http://schemas.microsoft.com/office/mac/drawingml/2011/main" val="1"/>
             </a:ext>
           </a:extLst>
         </p:spPr>
@@ -15890,7 +15890,7 @@
           </a:ln>
           <a:extLst>
             <a:ext uri="{C572A759-6A51-4108-AA02-DFA0A04FC94B}">
-              <ma14:wrappingTextBoxFlag xmlns:ma14="http://schemas.microsoft.com/office/mac/drawingml/2011/main" xmlns:a14="http://schemas.microsoft.com/office/drawing/2010/main" xmlns:m="http://schemas.openxmlformats.org/officeDocument/2006/math" xmlns="" val="1"/>
+              <ma14:wrappingTextBoxFlag xmlns="" xmlns:m="http://schemas.openxmlformats.org/officeDocument/2006/math" xmlns:a14="http://schemas.microsoft.com/office/drawing/2010/main" xmlns:ma14="http://schemas.microsoft.com/office/mac/drawingml/2011/main" val="1"/>
             </a:ext>
           </a:extLst>
         </p:spPr>
@@ -15932,7 +15932,7 @@
           </a:ln>
           <a:extLst>
             <a:ext uri="{C572A759-6A51-4108-AA02-DFA0A04FC94B}">
-              <ma14:wrappingTextBoxFlag xmlns:ma14="http://schemas.microsoft.com/office/mac/drawingml/2011/main" xmlns:a14="http://schemas.microsoft.com/office/drawing/2010/main" xmlns:m="http://schemas.openxmlformats.org/officeDocument/2006/math" xmlns="" val="1"/>
+              <ma14:wrappingTextBoxFlag xmlns="" xmlns:m="http://schemas.openxmlformats.org/officeDocument/2006/math" xmlns:a14="http://schemas.microsoft.com/office/drawing/2010/main" xmlns:ma14="http://schemas.microsoft.com/office/mac/drawingml/2011/main" val="1"/>
             </a:ext>
           </a:extLst>
         </p:spPr>
@@ -15979,7 +15979,7 @@
           </a:ln>
           <a:extLst>
             <a:ext uri="{C572A759-6A51-4108-AA02-DFA0A04FC94B}">
-              <ma14:wrappingTextBoxFlag xmlns:ma14="http://schemas.microsoft.com/office/mac/drawingml/2011/main" xmlns:a14="http://schemas.microsoft.com/office/drawing/2010/main" xmlns:m="http://schemas.openxmlformats.org/officeDocument/2006/math" xmlns="" val="1"/>
+              <ma14:wrappingTextBoxFlag xmlns="" xmlns:m="http://schemas.openxmlformats.org/officeDocument/2006/math" xmlns:a14="http://schemas.microsoft.com/office/drawing/2010/main" xmlns:ma14="http://schemas.microsoft.com/office/mac/drawingml/2011/main" val="1"/>
             </a:ext>
           </a:extLst>
         </p:spPr>
@@ -16026,7 +16026,7 @@
           </a:ln>
           <a:extLst>
             <a:ext uri="{C572A759-6A51-4108-AA02-DFA0A04FC94B}">
-              <ma14:wrappingTextBoxFlag xmlns:ma14="http://schemas.microsoft.com/office/mac/drawingml/2011/main" xmlns:a14="http://schemas.microsoft.com/office/drawing/2010/main" xmlns:m="http://schemas.openxmlformats.org/officeDocument/2006/math" xmlns="" val="1"/>
+              <ma14:wrappingTextBoxFlag xmlns="" xmlns:m="http://schemas.openxmlformats.org/officeDocument/2006/math" xmlns:a14="http://schemas.microsoft.com/office/drawing/2010/main" xmlns:ma14="http://schemas.microsoft.com/office/mac/drawingml/2011/main" val="1"/>
             </a:ext>
           </a:extLst>
         </p:spPr>
@@ -16073,7 +16073,7 @@
           </a:ln>
           <a:extLst>
             <a:ext uri="{C572A759-6A51-4108-AA02-DFA0A04FC94B}">
-              <ma14:wrappingTextBoxFlag xmlns:ma14="http://schemas.microsoft.com/office/mac/drawingml/2011/main" xmlns:a14="http://schemas.microsoft.com/office/drawing/2010/main" xmlns:m="http://schemas.openxmlformats.org/officeDocument/2006/math" xmlns="" val="1"/>
+              <ma14:wrappingTextBoxFlag xmlns="" xmlns:m="http://schemas.openxmlformats.org/officeDocument/2006/math" xmlns:a14="http://schemas.microsoft.com/office/drawing/2010/main" xmlns:ma14="http://schemas.microsoft.com/office/mac/drawingml/2011/main" val="1"/>
             </a:ext>
           </a:extLst>
         </p:spPr>
@@ -16120,7 +16120,7 @@
           </a:ln>
           <a:extLst>
             <a:ext uri="{C572A759-6A51-4108-AA02-DFA0A04FC94B}">
-              <ma14:wrappingTextBoxFlag xmlns:ma14="http://schemas.microsoft.com/office/mac/drawingml/2011/main" xmlns:a14="http://schemas.microsoft.com/office/drawing/2010/main" xmlns:m="http://schemas.openxmlformats.org/officeDocument/2006/math" xmlns="" val="1"/>
+              <ma14:wrappingTextBoxFlag xmlns="" xmlns:m="http://schemas.openxmlformats.org/officeDocument/2006/math" xmlns:a14="http://schemas.microsoft.com/office/drawing/2010/main" xmlns:ma14="http://schemas.microsoft.com/office/mac/drawingml/2011/main" val="1"/>
             </a:ext>
           </a:extLst>
         </p:spPr>
@@ -16167,7 +16167,7 @@
           </a:ln>
           <a:extLst>
             <a:ext uri="{C572A759-6A51-4108-AA02-DFA0A04FC94B}">
-              <ma14:wrappingTextBoxFlag xmlns:ma14="http://schemas.microsoft.com/office/mac/drawingml/2011/main" xmlns:a14="http://schemas.microsoft.com/office/drawing/2010/main" xmlns:m="http://schemas.openxmlformats.org/officeDocument/2006/math" xmlns="" val="1"/>
+              <ma14:wrappingTextBoxFlag xmlns="" xmlns:m="http://schemas.openxmlformats.org/officeDocument/2006/math" xmlns:a14="http://schemas.microsoft.com/office/drawing/2010/main" xmlns:ma14="http://schemas.microsoft.com/office/mac/drawingml/2011/main" val="1"/>
             </a:ext>
           </a:extLst>
         </p:spPr>
@@ -16214,7 +16214,7 @@
           </a:ln>
           <a:extLst>
             <a:ext uri="{C572A759-6A51-4108-AA02-DFA0A04FC94B}">
-              <ma14:wrappingTextBoxFlag xmlns:ma14="http://schemas.microsoft.com/office/mac/drawingml/2011/main" xmlns:a14="http://schemas.microsoft.com/office/drawing/2010/main" xmlns:m="http://schemas.openxmlformats.org/officeDocument/2006/math" xmlns="" val="1"/>
+              <ma14:wrappingTextBoxFlag xmlns="" xmlns:m="http://schemas.openxmlformats.org/officeDocument/2006/math" xmlns:a14="http://schemas.microsoft.com/office/drawing/2010/main" xmlns:ma14="http://schemas.microsoft.com/office/mac/drawingml/2011/main" val="1"/>
             </a:ext>
           </a:extLst>
         </p:spPr>
@@ -16261,7 +16261,7 @@
           </a:ln>
           <a:extLst>
             <a:ext uri="{C572A759-6A51-4108-AA02-DFA0A04FC94B}">
-              <ma14:wrappingTextBoxFlag xmlns:ma14="http://schemas.microsoft.com/office/mac/drawingml/2011/main" xmlns:a14="http://schemas.microsoft.com/office/drawing/2010/main" xmlns:m="http://schemas.openxmlformats.org/officeDocument/2006/math" xmlns="" val="1"/>
+              <ma14:wrappingTextBoxFlag xmlns="" xmlns:m="http://schemas.openxmlformats.org/officeDocument/2006/math" xmlns:a14="http://schemas.microsoft.com/office/drawing/2010/main" xmlns:ma14="http://schemas.microsoft.com/office/mac/drawingml/2011/main" val="1"/>
             </a:ext>
           </a:extLst>
         </p:spPr>
@@ -16308,7 +16308,7 @@
           </a:ln>
           <a:extLst>
             <a:ext uri="{C572A759-6A51-4108-AA02-DFA0A04FC94B}">
-              <ma14:wrappingTextBoxFlag xmlns:ma14="http://schemas.microsoft.com/office/mac/drawingml/2011/main" xmlns:a14="http://schemas.microsoft.com/office/drawing/2010/main" xmlns:m="http://schemas.openxmlformats.org/officeDocument/2006/math" xmlns="" val="1"/>
+              <ma14:wrappingTextBoxFlag xmlns="" xmlns:m="http://schemas.openxmlformats.org/officeDocument/2006/math" xmlns:a14="http://schemas.microsoft.com/office/drawing/2010/main" xmlns:ma14="http://schemas.microsoft.com/office/mac/drawingml/2011/main" val="1"/>
             </a:ext>
           </a:extLst>
         </p:spPr>
@@ -16347,7 +16347,7 @@
           </a:ln>
           <a:extLst>
             <a:ext uri="{C572A759-6A51-4108-AA02-DFA0A04FC94B}">
-              <ma14:wrappingTextBoxFlag xmlns:ma14="http://schemas.microsoft.com/office/mac/drawingml/2011/main" xmlns:a14="http://schemas.microsoft.com/office/drawing/2010/main" xmlns:m="http://schemas.openxmlformats.org/officeDocument/2006/math" xmlns="" val="1"/>
+              <ma14:wrappingTextBoxFlag xmlns="" xmlns:m="http://schemas.openxmlformats.org/officeDocument/2006/math" xmlns:a14="http://schemas.microsoft.com/office/drawing/2010/main" xmlns:ma14="http://schemas.microsoft.com/office/mac/drawingml/2011/main" val="1"/>
             </a:ext>
           </a:extLst>
         </p:spPr>
@@ -16442,7 +16442,7 @@
           </a:ln>
           <a:extLst>
             <a:ext uri="{C572A759-6A51-4108-AA02-DFA0A04FC94B}">
-              <ma14:wrappingTextBoxFlag xmlns:ma14="http://schemas.microsoft.com/office/mac/drawingml/2011/main" xmlns:a14="http://schemas.microsoft.com/office/drawing/2010/main" xmlns:m="http://schemas.openxmlformats.org/officeDocument/2006/math" xmlns="" val="1"/>
+              <ma14:wrappingTextBoxFlag xmlns="" xmlns:m="http://schemas.openxmlformats.org/officeDocument/2006/math" xmlns:a14="http://schemas.microsoft.com/office/drawing/2010/main" xmlns:ma14="http://schemas.microsoft.com/office/mac/drawingml/2011/main" val="1"/>
             </a:ext>
           </a:extLst>
         </p:spPr>
@@ -17230,7 +17230,7 @@
           </a:ln>
           <a:extLst>
             <a:ext uri="{C572A759-6A51-4108-AA02-DFA0A04FC94B}">
-              <ma14:wrappingTextBoxFlag xmlns:ma14="http://schemas.microsoft.com/office/mac/drawingml/2011/main" xmlns:a14="http://schemas.microsoft.com/office/drawing/2010/main" xmlns:m="http://schemas.openxmlformats.org/officeDocument/2006/math" xmlns="" val="1"/>
+              <ma14:wrappingTextBoxFlag xmlns="" xmlns:m="http://schemas.openxmlformats.org/officeDocument/2006/math" xmlns:a14="http://schemas.microsoft.com/office/drawing/2010/main" xmlns:ma14="http://schemas.microsoft.com/office/mac/drawingml/2011/main" val="1"/>
             </a:ext>
           </a:extLst>
         </p:spPr>
@@ -17280,7 +17280,7 @@
           </a:ln>
           <a:extLst>
             <a:ext uri="{C572A759-6A51-4108-AA02-DFA0A04FC94B}">
-              <ma14:wrappingTextBoxFlag xmlns:ma14="http://schemas.microsoft.com/office/mac/drawingml/2011/main" xmlns:a14="http://schemas.microsoft.com/office/drawing/2010/main" xmlns:m="http://schemas.openxmlformats.org/officeDocument/2006/math" xmlns="" val="1"/>
+              <ma14:wrappingTextBoxFlag xmlns="" xmlns:m="http://schemas.openxmlformats.org/officeDocument/2006/math" xmlns:a14="http://schemas.microsoft.com/office/drawing/2010/main" xmlns:ma14="http://schemas.microsoft.com/office/mac/drawingml/2011/main" val="1"/>
             </a:ext>
           </a:extLst>
         </p:spPr>
@@ -17671,7 +17671,7 @@
           </a:ln>
           <a:extLst>
             <a:ext uri="{C572A759-6A51-4108-AA02-DFA0A04FC94B}">
-              <ma14:wrappingTextBoxFlag xmlns:ma14="http://schemas.microsoft.com/office/mac/drawingml/2011/main" xmlns:a14="http://schemas.microsoft.com/office/drawing/2010/main" xmlns:m="http://schemas.openxmlformats.org/officeDocument/2006/math" xmlns="" val="1"/>
+              <ma14:wrappingTextBoxFlag xmlns="" xmlns:m="http://schemas.openxmlformats.org/officeDocument/2006/math" xmlns:a14="http://schemas.microsoft.com/office/drawing/2010/main" xmlns:ma14="http://schemas.microsoft.com/office/mac/drawingml/2011/main" val="1"/>
             </a:ext>
           </a:extLst>
         </p:spPr>
@@ -17742,7 +17742,7 @@
       </p:grpSpPr>
       <p:sp>
         <p:nvSpPr>
-          <p:cNvPr id="399" name="Demo: Finding a Median"/>
+          <p:cNvPr id="402" name="Today's Outline"/>
           <p:cNvSpPr txBox="1">
             <a:spLocks noGrp="1"/>
           </p:cNvSpPr>
@@ -17768,14 +17768,14 @@
           </a:lstStyle>
           <a:p>
             <a:r>
-              <a:t>Demo: Finding a Median</a:t>
-            </a:r>
-          </a:p>
-        </p:txBody>
-      </p:sp>
-      <p:sp>
-        <p:nvSpPr>
-          <p:cNvPr id="400" name="Goal: write a function to find the median of a list of numbers…"/>
+              <a:t>Today's Outline</a:t>
+            </a:r>
+          </a:p>
+        </p:txBody>
+      </p:sp>
+      <p:sp>
+        <p:nvSpPr>
+          <p:cNvPr id="403" name="From Strings to Lists…"/>
           <p:cNvSpPr txBox="1">
             <a:spLocks noGrp="1"/>
           </p:cNvSpPr>
@@ -17795,6 +17795,53 @@
         <p:txBody>
           <a:bodyPr anchor="t"/>
           <a:lstStyle/>
+          <a:p>
+            <a:pPr marL="0" indent="0">
+              <a:buSzTx/>
+              <a:buNone/>
+            </a:pPr>
+            <a:r>
+              <a:rPr dirty="0"/>
+              <a:t>From Strings to Lists</a:t>
+            </a:r>
+          </a:p>
+          <a:p>
+            <a:pPr marL="0" indent="0">
+              <a:buSzTx/>
+              <a:buNone/>
+            </a:pPr>
+            <a:r>
+              <a:rPr dirty="0"/>
+              <a:t>More Sequence Capabilities</a:t>
+            </a:r>
+          </a:p>
+          <a:p>
+            <a:pPr marL="0" lvl="5" indent="0">
+              <a:buSzTx/>
+              <a:buNone/>
+            </a:pPr>
+            <a:r>
+              <a:rPr dirty="0">
+                <a:latin typeface="Calibri" panose="020F0502020204030204" pitchFamily="34" charset="0"/>
+                <a:cs typeface="Calibri" panose="020F0502020204030204" pitchFamily="34" charset="0"/>
+              </a:rPr>
+              <a:t>Difference</a:t>
+            </a:r>
+            <a:r>
+              <a:rPr dirty="0"/>
+              <a:t> 1: Flexibility of Types</a:t>
+            </a:r>
+          </a:p>
+          <a:p>
+            <a:pPr marL="0" lvl="5" indent="0">
+              <a:buSzTx/>
+              <a:buNone/>
+            </a:pPr>
+            <a:r>
+              <a:rPr dirty="0"/>
+              <a:t>Difference 2: Mutability</a:t>
+            </a:r>
+          </a:p>
           <a:p>
             <a:pPr marL="0" lvl="5" indent="0">
               <a:buSzTx/>
@@ -17810,194 +17857,8 @@
               </a:defRPr>
             </a:pPr>
             <a:r>
-              <a:rPr dirty="0">
-                <a:latin typeface="Calibri" panose="020F0502020204030204" pitchFamily="34" charset="0"/>
-                <a:cs typeface="Calibri" panose="020F0502020204030204" pitchFamily="34" charset="0"/>
-              </a:rPr>
-              <a:t>Goal: write a function to find the median of a list of numbers</a:t>
-            </a:r>
-          </a:p>
-          <a:p>
-            <a:pPr marL="0" lvl="5" indent="0">
-              <a:buSzTx/>
-              <a:buNone/>
-            </a:pPr>
-            <a:r>
-              <a:rPr b="1" dirty="0">
-                <a:latin typeface="Calibri" panose="020F0502020204030204" pitchFamily="34" charset="0"/>
-                <a:cs typeface="Calibri" panose="020F0502020204030204" pitchFamily="34" charset="0"/>
-              </a:rPr>
-              <a:t>Input</a:t>
-            </a:r>
-            <a:r>
-              <a:rPr dirty="0">
-                <a:latin typeface="Calibri" panose="020F0502020204030204" pitchFamily="34" charset="0"/>
-                <a:cs typeface="Calibri" panose="020F0502020204030204" pitchFamily="34" charset="0"/>
-              </a:rPr>
-              <a:t>:</a:t>
-            </a:r>
-          </a:p>
-          <a:p>
-            <a:pPr marL="635000" indent="-444500">
-              <a:spcBef>
-                <a:spcPts val="0"/>
-              </a:spcBef>
-              <a:defRPr sz="2800"/>
-            </a:pPr>
-            <a:r>
-              <a:rPr dirty="0">
-                <a:latin typeface="Calibri" panose="020F0502020204030204" pitchFamily="34" charset="0"/>
-                <a:cs typeface="Calibri" panose="020F0502020204030204" pitchFamily="34" charset="0"/>
-              </a:rPr>
-              <a:t>Python list containing floats</a:t>
-            </a:r>
-          </a:p>
-          <a:p>
-            <a:pPr marL="0" lvl="5" indent="0">
-              <a:buSzTx/>
-              <a:buNone/>
-            </a:pPr>
-            <a:r>
-              <a:rPr b="1" dirty="0">
-                <a:latin typeface="Calibri" panose="020F0502020204030204" pitchFamily="34" charset="0"/>
-                <a:cs typeface="Calibri" panose="020F0502020204030204" pitchFamily="34" charset="0"/>
-              </a:rPr>
-              <a:t>Output</a:t>
-            </a:r>
-            <a:r>
-              <a:rPr dirty="0">
-                <a:latin typeface="Calibri" panose="020F0502020204030204" pitchFamily="34" charset="0"/>
-                <a:cs typeface="Calibri" panose="020F0502020204030204" pitchFamily="34" charset="0"/>
-              </a:rPr>
-              <a:t>:</a:t>
-            </a:r>
-          </a:p>
-          <a:p>
-            <a:pPr marL="635000" indent="-444500">
-              <a:spcBef>
-                <a:spcPts val="0"/>
-              </a:spcBef>
-              <a:defRPr sz="2800"/>
-            </a:pPr>
-            <a:r>
-              <a:rPr dirty="0">
-                <a:latin typeface="Calibri" panose="020F0502020204030204" pitchFamily="34" charset="0"/>
-                <a:cs typeface="Calibri" panose="020F0502020204030204" pitchFamily="34" charset="0"/>
-              </a:rPr>
-              <a:t>The median</a:t>
-            </a:r>
-          </a:p>
-          <a:p>
-            <a:pPr marL="0" lvl="5" indent="0">
-              <a:buSzTx/>
-              <a:buNone/>
-            </a:pPr>
-            <a:r>
-              <a:rPr b="1" dirty="0">
-                <a:latin typeface="Calibri" panose="020F0502020204030204" pitchFamily="34" charset="0"/>
-                <a:cs typeface="Calibri" panose="020F0502020204030204" pitchFamily="34" charset="0"/>
-              </a:rPr>
-              <a:t>Example</a:t>
-            </a:r>
-            <a:r>
-              <a:rPr dirty="0">
-                <a:latin typeface="Calibri" panose="020F0502020204030204" pitchFamily="34" charset="0"/>
-                <a:cs typeface="Calibri" panose="020F0502020204030204" pitchFamily="34" charset="0"/>
-              </a:rPr>
-              <a:t>:</a:t>
-            </a:r>
-            <a:br>
-              <a:rPr dirty="0">
-                <a:latin typeface="Calibri" panose="020F0502020204030204" pitchFamily="34" charset="0"/>
-                <a:cs typeface="Calibri" panose="020F0502020204030204" pitchFamily="34" charset="0"/>
-              </a:rPr>
-            </a:br>
-            <a:r>
-              <a:rPr sz="2200" dirty="0">
-                <a:latin typeface="Calibri" panose="020F0502020204030204" pitchFamily="34" charset="0"/>
-                <a:cs typeface="Calibri" panose="020F0502020204030204" pitchFamily="34" charset="0"/>
-              </a:rPr>
-              <a:t>&gt;&gt;&gt; </a:t>
-            </a:r>
-            <a:r>
-              <a:rPr sz="2200" dirty="0" err="1">
-                <a:latin typeface="Calibri" panose="020F0502020204030204" pitchFamily="34" charset="0"/>
-                <a:cs typeface="Calibri" panose="020F0502020204030204" pitchFamily="34" charset="0"/>
-              </a:rPr>
-              <a:t>nums</a:t>
-            </a:r>
-            <a:r>
-              <a:rPr sz="2200" dirty="0">
-                <a:latin typeface="Calibri" panose="020F0502020204030204" pitchFamily="34" charset="0"/>
-                <a:cs typeface="Calibri" panose="020F0502020204030204" pitchFamily="34" charset="0"/>
-              </a:rPr>
-              <a:t> = [1,5,2,9,8]</a:t>
-            </a:r>
-            <a:br>
-              <a:rPr sz="2200" dirty="0">
-                <a:latin typeface="Calibri" panose="020F0502020204030204" pitchFamily="34" charset="0"/>
-                <a:cs typeface="Calibri" panose="020F0502020204030204" pitchFamily="34" charset="0"/>
-              </a:rPr>
-            </a:br>
-            <a:r>
-              <a:rPr sz="2200" dirty="0">
-                <a:latin typeface="Calibri" panose="020F0502020204030204" pitchFamily="34" charset="0"/>
-                <a:cs typeface="Calibri" panose="020F0502020204030204" pitchFamily="34" charset="0"/>
-              </a:rPr>
-              <a:t>&gt;&gt;&gt; median(</a:t>
-            </a:r>
-            <a:r>
-              <a:rPr sz="2200" dirty="0" err="1">
-                <a:latin typeface="Calibri" panose="020F0502020204030204" pitchFamily="34" charset="0"/>
-                <a:cs typeface="Calibri" panose="020F0502020204030204" pitchFamily="34" charset="0"/>
-              </a:rPr>
-              <a:t>nums</a:t>
-            </a:r>
-            <a:r>
-              <a:rPr sz="2200" dirty="0">
-                <a:latin typeface="Calibri" panose="020F0502020204030204" pitchFamily="34" charset="0"/>
-                <a:cs typeface="Calibri" panose="020F0502020204030204" pitchFamily="34" charset="0"/>
-              </a:rPr>
-              <a:t>)</a:t>
-            </a:r>
-            <a:br>
-              <a:rPr sz="2200" dirty="0">
-                <a:latin typeface="Calibri" panose="020F0502020204030204" pitchFamily="34" charset="0"/>
-                <a:cs typeface="Calibri" panose="020F0502020204030204" pitchFamily="34" charset="0"/>
-              </a:rPr>
-            </a:br>
-            <a:r>
-              <a:rPr sz="2200" dirty="0">
-                <a:latin typeface="Calibri" panose="020F0502020204030204" pitchFamily="34" charset="0"/>
-                <a:cs typeface="Calibri" panose="020F0502020204030204" pitchFamily="34" charset="0"/>
-              </a:rPr>
-              <a:t>5</a:t>
-            </a:r>
-            <a:br>
-              <a:rPr sz="2200" dirty="0">
-                <a:latin typeface="Calibri" panose="020F0502020204030204" pitchFamily="34" charset="0"/>
-                <a:cs typeface="Calibri" panose="020F0502020204030204" pitchFamily="34" charset="0"/>
-              </a:rPr>
-            </a:br>
-            <a:r>
-              <a:rPr sz="2200" dirty="0">
-                <a:latin typeface="Calibri" panose="020F0502020204030204" pitchFamily="34" charset="0"/>
-                <a:cs typeface="Calibri" panose="020F0502020204030204" pitchFamily="34" charset="0"/>
-              </a:rPr>
-              <a:t>&gt;&gt;&gt; median([1, 20, 30, 100])</a:t>
-            </a:r>
-            <a:br>
-              <a:rPr sz="2200" dirty="0">
-                <a:latin typeface="Calibri" panose="020F0502020204030204" pitchFamily="34" charset="0"/>
-                <a:cs typeface="Calibri" panose="020F0502020204030204" pitchFamily="34" charset="0"/>
-              </a:rPr>
-            </a:br>
-            <a:r>
-              <a:rPr sz="2200" dirty="0">
-                <a:latin typeface="Calibri" panose="020F0502020204030204" pitchFamily="34" charset="0"/>
-                <a:cs typeface="Calibri" panose="020F0502020204030204" pitchFamily="34" charset="0"/>
-              </a:rPr>
-              <a:t>25</a:t>
+              <a:rPr dirty="0"/>
+              <a:t>Transforming between Strings and Lists</a:t>
             </a:r>
           </a:p>
         </p:txBody>
@@ -18030,7 +17891,7 @@
       </p:grpSpPr>
       <p:sp>
         <p:nvSpPr>
-          <p:cNvPr id="402" name="Today's Outline"/>
+          <p:cNvPr id="405" name="split method"/>
           <p:cNvSpPr txBox="1">
             <a:spLocks noGrp="1"/>
           </p:cNvSpPr>
@@ -18056,85 +17917,50 @@
           </a:lstStyle>
           <a:p>
             <a:r>
-              <a:t>Today's Outline</a:t>
-            </a:r>
-          </a:p>
-        </p:txBody>
-      </p:sp>
-      <p:sp>
-        <p:nvSpPr>
-          <p:cNvPr id="403" name="From Strings to Lists…"/>
-          <p:cNvSpPr txBox="1">
-            <a:spLocks noGrp="1"/>
-          </p:cNvSpPr>
-          <p:nvPr>
-            <p:ph type="body" idx="1"/>
-          </p:nvPr>
-        </p:nvSpPr>
-        <p:spPr>
-          <a:xfrm>
-            <a:off x="952500" y="1587896"/>
-            <a:ext cx="11099800" cy="7289404"/>
-          </a:xfrm>
-          <a:prstGeom prst="rect">
-            <a:avLst/>
-          </a:prstGeom>
-        </p:spPr>
-        <p:txBody>
-          <a:bodyPr anchor="t"/>
+              <a:t>split method</a:t>
+            </a:r>
+          </a:p>
+        </p:txBody>
+      </p:sp>
+      <p:sp>
+        <p:nvSpPr>
+          <p:cNvPr id="406" name="S = &quot;a quick brown fox&quot;…"/>
+          <p:cNvSpPr txBox="1"/>
+          <p:nvPr/>
+        </p:nvSpPr>
+        <p:spPr>
+          <a:xfrm>
+            <a:off x="2055415" y="2089149"/>
+            <a:ext cx="8893970" cy="1574801"/>
+          </a:xfrm>
+          <a:prstGeom prst="rect">
+            <a:avLst/>
+          </a:prstGeom>
+          <a:ln w="12700">
+            <a:miter lim="400000"/>
+          </a:ln>
+          <a:extLst>
+            <a:ext uri="{C572A759-6A51-4108-AA02-DFA0A04FC94B}">
+              <ma14:wrappingTextBoxFlag xmlns="" xmlns:m="http://schemas.openxmlformats.org/officeDocument/2006/math" xmlns:a14="http://schemas.microsoft.com/office/drawing/2010/main" xmlns:ma14="http://schemas.microsoft.com/office/mac/drawingml/2011/main" val="1"/>
+            </a:ext>
+          </a:extLst>
+        </p:spPr>
+        <p:txBody>
+          <a:bodyPr wrap="none" lIns="50800" tIns="50800" rIns="50800" bIns="50800" anchor="ctr">
+            <a:spAutoFit/>
+          </a:bodyPr>
           <a:lstStyle/>
           <a:p>
-            <a:pPr marL="0" indent="0">
-              <a:buSzTx/>
-              <a:buNone/>
-            </a:pPr>
-            <a:r>
-              <a:rPr dirty="0"/>
-              <a:t>From Strings to Lists</a:t>
-            </a:r>
-          </a:p>
-          <a:p>
-            <a:pPr marL="0" indent="0">
-              <a:buSzTx/>
-              <a:buNone/>
-            </a:pPr>
-            <a:r>
-              <a:rPr dirty="0"/>
-              <a:t>More Sequence Capabilities</a:t>
-            </a:r>
-          </a:p>
-          <a:p>
-            <a:pPr marL="0" lvl="5" indent="0">
-              <a:buSzTx/>
-              <a:buNone/>
-            </a:pPr>
-            <a:r>
-              <a:rPr dirty="0">
-                <a:latin typeface="Calibri" panose="020F0502020204030204" pitchFamily="34" charset="0"/>
-                <a:cs typeface="Calibri" panose="020F0502020204030204" pitchFamily="34" charset="0"/>
-              </a:rPr>
-              <a:t>Difference</a:t>
-            </a:r>
-            <a:r>
-              <a:rPr dirty="0"/>
-              <a:t> 1: Flexibility of Types</a:t>
-            </a:r>
-          </a:p>
-          <a:p>
-            <a:pPr marL="0" lvl="5" indent="0">
-              <a:buSzTx/>
-              <a:buNone/>
-            </a:pPr>
-            <a:r>
-              <a:rPr dirty="0"/>
-              <a:t>Difference 2: Mutability</a:t>
-            </a:r>
-          </a:p>
-          <a:p>
-            <a:pPr marL="0" lvl="5" indent="0">
-              <a:buSzTx/>
-              <a:buNone/>
-              <a:defRPr>
+            <a:pPr algn="l">
+              <a:defRPr sz="4800" b="0">
+                <a:latin typeface="Courier"/>
+                <a:ea typeface="Courier"/>
+                <a:cs typeface="Courier"/>
+                <a:sym typeface="Courier"/>
+              </a:defRPr>
+            </a:pPr>
+            <a:r>
+              <a:rPr>
                 <a:solidFill>
                   <a:schemeClr val="accent5">
                     <a:hueOff val="-82419"/>
@@ -18142,11 +17968,243 @@
                     <a:lumOff val="-16343"/>
                   </a:schemeClr>
                 </a:solidFill>
-              </a:defRPr>
-            </a:pPr>
-            <a:r>
-              <a:rPr dirty="0"/>
-              <a:t>Transforming between Strings and Lists</a:t>
+              </a:rPr>
+              <a:t>S</a:t>
+            </a:r>
+            <a:r>
+              <a:t> = "a quick brown fox"</a:t>
+            </a:r>
+          </a:p>
+          <a:p>
+            <a:pPr algn="l">
+              <a:defRPr sz="4800" b="0">
+                <a:latin typeface="Courier"/>
+                <a:ea typeface="Courier"/>
+                <a:cs typeface="Courier"/>
+                <a:sym typeface="Courier"/>
+              </a:defRPr>
+            </a:pPr>
+            <a:r>
+              <a:rPr>
+                <a:solidFill>
+                  <a:schemeClr val="accent2">
+                    <a:hueOff val="167855"/>
+                    <a:satOff val="17755"/>
+                    <a:lumOff val="-16671"/>
+                  </a:schemeClr>
+                </a:solidFill>
+              </a:rPr>
+              <a:t>L</a:t>
+            </a:r>
+            <a:r>
+              <a:t> = </a:t>
+            </a:r>
+            <a:r>
+              <a:rPr>
+                <a:solidFill>
+                  <a:schemeClr val="accent5">
+                    <a:hueOff val="-82419"/>
+                    <a:satOff val="-9513"/>
+                    <a:lumOff val="-16343"/>
+                  </a:schemeClr>
+                </a:solidFill>
+              </a:rPr>
+              <a:t>S</a:t>
+            </a:r>
+            <a:r>
+              <a:t>.split(" ")</a:t>
+            </a:r>
+          </a:p>
+        </p:txBody>
+      </p:sp>
+      <p:sp>
+        <p:nvSpPr>
+          <p:cNvPr id="407" name="&quot;a quick brown fox&quot;"/>
+          <p:cNvSpPr txBox="1"/>
+          <p:nvPr/>
+        </p:nvSpPr>
+        <p:spPr>
+          <a:xfrm>
+            <a:off x="235917" y="5619750"/>
+            <a:ext cx="4168801" cy="533401"/>
+          </a:xfrm>
+          <a:prstGeom prst="rect">
+            <a:avLst/>
+          </a:prstGeom>
+          <a:ln w="12700">
+            <a:miter lim="400000"/>
+          </a:ln>
+          <a:extLst>
+            <a:ext uri="{C572A759-6A51-4108-AA02-DFA0A04FC94B}">
+              <ma14:wrappingTextBoxFlag xmlns="" xmlns:m="http://schemas.openxmlformats.org/officeDocument/2006/math" xmlns:a14="http://schemas.microsoft.com/office/drawing/2010/main" xmlns:ma14="http://schemas.microsoft.com/office/mac/drawingml/2011/main" val="1"/>
+            </a:ext>
+          </a:extLst>
+        </p:spPr>
+        <p:txBody>
+          <a:bodyPr wrap="none" lIns="50800" tIns="50800" rIns="50800" bIns="50800" anchor="ctr">
+            <a:spAutoFit/>
+          </a:bodyPr>
+          <a:lstStyle>
+            <a:lvl1pPr algn="l">
+              <a:defRPr sz="2800" b="0">
+                <a:solidFill>
+                  <a:schemeClr val="accent5">
+                    <a:hueOff val="-82419"/>
+                    <a:satOff val="-9513"/>
+                    <a:lumOff val="-16343"/>
+                  </a:schemeClr>
+                </a:solidFill>
+                <a:latin typeface="Courier"/>
+                <a:ea typeface="Courier"/>
+                <a:cs typeface="Courier"/>
+                <a:sym typeface="Courier"/>
+              </a:defRPr>
+            </a:lvl1pPr>
+          </a:lstStyle>
+          <a:p>
+            <a:r>
+              <a:t>"a quick brown fox"</a:t>
+            </a:r>
+          </a:p>
+        </p:txBody>
+      </p:sp>
+      <p:sp>
+        <p:nvSpPr>
+          <p:cNvPr id="408" name="Arrow"/>
+          <p:cNvSpPr/>
+          <p:nvPr/>
+        </p:nvSpPr>
+        <p:spPr>
+          <a:xfrm>
+            <a:off x="4461643" y="5251450"/>
+            <a:ext cx="1627239" cy="1270000"/>
+          </a:xfrm>
+          <a:prstGeom prst="rightArrow">
+            <a:avLst>
+              <a:gd name="adj1" fmla="val 32000"/>
+              <a:gd name="adj2" fmla="val 64000"/>
+            </a:avLst>
+          </a:prstGeom>
+          <a:solidFill>
+            <a:srgbClr val="5E5E5E"/>
+          </a:solidFill>
+          <a:ln w="12700">
+            <a:miter lim="400000"/>
+          </a:ln>
+        </p:spPr>
+        <p:txBody>
+          <a:bodyPr lIns="50800" tIns="50800" rIns="50800" bIns="50800" anchor="ctr"/>
+          <a:lstStyle/>
+          <a:p>
+            <a:pPr>
+              <a:defRPr sz="2200" b="0">
+                <a:solidFill>
+                  <a:srgbClr val="FFFFFF"/>
+                </a:solidFill>
+                <a:latin typeface="+mn-lt"/>
+                <a:ea typeface="+mn-ea"/>
+                <a:cs typeface="+mn-cs"/>
+                <a:sym typeface="Gill Sans SemiBold"/>
+              </a:defRPr>
+            </a:pPr>
+            <a:endParaRPr/>
+          </a:p>
+        </p:txBody>
+      </p:sp>
+      <p:sp>
+        <p:nvSpPr>
+          <p:cNvPr id="409" name="[&quot;a&quot;, &quot;quick&quot;, &quot;brown&quot;, &quot;fox&quot;]"/>
+          <p:cNvSpPr txBox="1"/>
+          <p:nvPr/>
+        </p:nvSpPr>
+        <p:spPr>
+          <a:xfrm>
+            <a:off x="6252740" y="5619750"/>
+            <a:ext cx="6516143" cy="533401"/>
+          </a:xfrm>
+          <a:prstGeom prst="rect">
+            <a:avLst/>
+          </a:prstGeom>
+          <a:ln w="12700">
+            <a:miter lim="400000"/>
+          </a:ln>
+          <a:extLst>
+            <a:ext uri="{C572A759-6A51-4108-AA02-DFA0A04FC94B}">
+              <ma14:wrappingTextBoxFlag xmlns="" xmlns:m="http://schemas.openxmlformats.org/officeDocument/2006/math" xmlns:a14="http://schemas.microsoft.com/office/drawing/2010/main" xmlns:ma14="http://schemas.microsoft.com/office/mac/drawingml/2011/main" val="1"/>
+            </a:ext>
+          </a:extLst>
+        </p:spPr>
+        <p:txBody>
+          <a:bodyPr wrap="none" lIns="50800" tIns="50800" rIns="50800" bIns="50800" anchor="ctr">
+            <a:spAutoFit/>
+          </a:bodyPr>
+          <a:lstStyle>
+            <a:lvl1pPr algn="l">
+              <a:defRPr sz="2800" b="0">
+                <a:solidFill>
+                  <a:schemeClr val="accent2">
+                    <a:hueOff val="167855"/>
+                    <a:satOff val="17755"/>
+                    <a:lumOff val="-16671"/>
+                  </a:schemeClr>
+                </a:solidFill>
+                <a:latin typeface="Courier"/>
+                <a:ea typeface="Courier"/>
+                <a:cs typeface="Courier"/>
+                <a:sym typeface="Courier"/>
+              </a:defRPr>
+            </a:lvl1pPr>
+          </a:lstStyle>
+          <a:p>
+            <a:r>
+              <a:t>["a", "quick", "brown", "fox"]</a:t>
+            </a:r>
+          </a:p>
+        </p:txBody>
+      </p:sp>
+      <p:sp>
+        <p:nvSpPr>
+          <p:cNvPr id="410" name="separator"/>
+          <p:cNvSpPr txBox="1"/>
+          <p:nvPr/>
+        </p:nvSpPr>
+        <p:spPr>
+          <a:xfrm>
+            <a:off x="6460052" y="3936999"/>
+            <a:ext cx="1202296" cy="419101"/>
+          </a:xfrm>
+          <a:prstGeom prst="rect">
+            <a:avLst/>
+          </a:prstGeom>
+          <a:ln w="12700">
+            <a:miter lim="400000"/>
+          </a:ln>
+          <a:extLst>
+            <a:ext uri="{C572A759-6A51-4108-AA02-DFA0A04FC94B}">
+              <ma14:wrappingTextBoxFlag xmlns="" xmlns:m="http://schemas.openxmlformats.org/officeDocument/2006/math" xmlns:a14="http://schemas.microsoft.com/office/drawing/2010/main" xmlns:ma14="http://schemas.microsoft.com/office/mac/drawingml/2011/main" val="1"/>
+            </a:ext>
+          </a:extLst>
+        </p:spPr>
+        <p:txBody>
+          <a:bodyPr wrap="none" lIns="50800" tIns="50800" rIns="50800" bIns="50800" anchor="ctr">
+            <a:spAutoFit/>
+          </a:bodyPr>
+          <a:lstStyle>
+            <a:lvl1pPr>
+              <a:defRPr sz="2200" b="0">
+                <a:solidFill>
+                  <a:schemeClr val="accent5">
+                    <a:hueOff val="-82419"/>
+                    <a:satOff val="-9513"/>
+                    <a:lumOff val="-16343"/>
+                  </a:schemeClr>
+                </a:solidFill>
+              </a:defRPr>
+            </a:lvl1pPr>
+          </a:lstStyle>
+          <a:p>
+            <a:r>
+              <a:t>separator</a:t>
             </a:r>
           </a:p>
         </p:txBody>
@@ -18179,7 +18237,7 @@
       </p:grpSpPr>
       <p:sp>
         <p:nvSpPr>
-          <p:cNvPr id="405" name="split method"/>
+          <p:cNvPr id="412" name="join method"/>
           <p:cNvSpPr txBox="1">
             <a:spLocks noGrp="1"/>
           </p:cNvSpPr>
@@ -18205,21 +18263,21 @@
           </a:lstStyle>
           <a:p>
             <a:r>
-              <a:t>split method</a:t>
-            </a:r>
-          </a:p>
-        </p:txBody>
-      </p:sp>
-      <p:sp>
-        <p:nvSpPr>
-          <p:cNvPr id="406" name="S = &quot;a quick brown fox&quot;…"/>
+              <a:t>join method</a:t>
+            </a:r>
+          </a:p>
+        </p:txBody>
+      </p:sp>
+      <p:sp>
+        <p:nvSpPr>
+          <p:cNvPr id="413" name="L = [&quot;M&quot;, &quot;SS&quot;, &quot;SS&quot;, &quot;PP&quot;, &quot;&quot;]…"/>
           <p:cNvSpPr txBox="1"/>
           <p:nvPr/>
         </p:nvSpPr>
         <p:spPr>
           <a:xfrm>
-            <a:off x="2055415" y="2089149"/>
-            <a:ext cx="8893970" cy="1574801"/>
+            <a:off x="912415" y="2241549"/>
+            <a:ext cx="11820526" cy="1574801"/>
           </a:xfrm>
           <a:prstGeom prst="rect">
             <a:avLst/>
@@ -18229,7 +18287,7 @@
           </a:ln>
           <a:extLst>
             <a:ext uri="{C572A759-6A51-4108-AA02-DFA0A04FC94B}">
-              <ma14:wrappingTextBoxFlag xmlns:ma14="http://schemas.microsoft.com/office/mac/drawingml/2011/main" xmlns:a14="http://schemas.microsoft.com/office/drawing/2010/main" xmlns:m="http://schemas.openxmlformats.org/officeDocument/2006/math" xmlns="" val="1"/>
+              <ma14:wrappingTextBoxFlag xmlns="" xmlns:m="http://schemas.openxmlformats.org/officeDocument/2006/math" xmlns:a14="http://schemas.microsoft.com/office/drawing/2010/main" xmlns:ma14="http://schemas.microsoft.com/office/mac/drawingml/2011/main" val="1"/>
             </a:ext>
           </a:extLst>
         </p:spPr>
@@ -18238,6 +18296,31 @@
             <a:spAutoFit/>
           </a:bodyPr>
           <a:lstStyle/>
+          <a:p>
+            <a:pPr algn="l">
+              <a:defRPr sz="4800" b="0">
+                <a:latin typeface="Courier"/>
+                <a:ea typeface="Courier"/>
+                <a:cs typeface="Courier"/>
+                <a:sym typeface="Courier"/>
+              </a:defRPr>
+            </a:pPr>
+            <a:r>
+              <a:rPr>
+                <a:solidFill>
+                  <a:schemeClr val="accent2">
+                    <a:hueOff val="167855"/>
+                    <a:satOff val="17755"/>
+                    <a:lumOff val="-16671"/>
+                  </a:schemeClr>
+                </a:solidFill>
+              </a:rPr>
+              <a:t>L</a:t>
+            </a:r>
+            <a:r>
+              <a:t> = ["M", "SS", "SS", "PP", ""]</a:t>
+            </a:r>
+          </a:p>
           <a:p>
             <a:pPr algn="l">
               <a:defRPr sz="4800" b="0">
@@ -18260,18 +18343,8 @@
               <a:t>S</a:t>
             </a:r>
             <a:r>
-              <a:t> = "a quick brown fox"</a:t>
-            </a:r>
-          </a:p>
-          <a:p>
-            <a:pPr algn="l">
-              <a:defRPr sz="4800" b="0">
-                <a:latin typeface="Courier"/>
-                <a:ea typeface="Courier"/>
-                <a:cs typeface="Courier"/>
-                <a:sym typeface="Courier"/>
-              </a:defRPr>
-            </a:pPr>
+              <a:t> = "I".join(</a:t>
+            </a:r>
             <a:r>
               <a:rPr>
                 <a:solidFill>
@@ -18285,36 +18358,64 @@
               <a:t>L</a:t>
             </a:r>
             <a:r>
-              <a:t> = </a:t>
-            </a:r>
-            <a:r>
-              <a:rPr>
+              <a:t>)</a:t>
+            </a:r>
+          </a:p>
+        </p:txBody>
+      </p:sp>
+      <p:sp>
+        <p:nvSpPr>
+          <p:cNvPr id="414" name="Arrow"/>
+          <p:cNvSpPr/>
+          <p:nvPr/>
+        </p:nvSpPr>
+        <p:spPr>
+          <a:xfrm>
+            <a:off x="6430143" y="5314950"/>
+            <a:ext cx="1627239" cy="1270000"/>
+          </a:xfrm>
+          <a:prstGeom prst="rightArrow">
+            <a:avLst>
+              <a:gd name="adj1" fmla="val 32000"/>
+              <a:gd name="adj2" fmla="val 64000"/>
+            </a:avLst>
+          </a:prstGeom>
+          <a:solidFill>
+            <a:srgbClr val="5E5E5E"/>
+          </a:solidFill>
+          <a:ln w="12700">
+            <a:miter lim="400000"/>
+          </a:ln>
+        </p:spPr>
+        <p:txBody>
+          <a:bodyPr lIns="50800" tIns="50800" rIns="50800" bIns="50800" anchor="ctr"/>
+          <a:lstStyle/>
+          <a:p>
+            <a:pPr>
+              <a:defRPr sz="2200" b="0">
                 <a:solidFill>
-                  <a:schemeClr val="accent5">
-                    <a:hueOff val="-82419"/>
-                    <a:satOff val="-9513"/>
-                    <a:lumOff val="-16343"/>
-                  </a:schemeClr>
+                  <a:srgbClr val="FFFFFF"/>
                 </a:solidFill>
-              </a:rPr>
-              <a:t>S</a:t>
-            </a:r>
-            <a:r>
-              <a:t>.split(" ")</a:t>
-            </a:r>
-          </a:p>
-        </p:txBody>
-      </p:sp>
-      <p:sp>
-        <p:nvSpPr>
-          <p:cNvPr id="407" name="&quot;a quick brown fox&quot;"/>
+                <a:latin typeface="+mn-lt"/>
+                <a:ea typeface="+mn-ea"/>
+                <a:cs typeface="+mn-cs"/>
+                <a:sym typeface="Gill Sans SemiBold"/>
+              </a:defRPr>
+            </a:pPr>
+            <a:endParaRPr/>
+          </a:p>
+        </p:txBody>
+      </p:sp>
+      <p:sp>
+        <p:nvSpPr>
+          <p:cNvPr id="415" name="[&quot;M&quot;, &quot;SS&quot;, &quot;SS&quot;, &quot;PP&quot;, &quot;&quot;]"/>
           <p:cNvSpPr txBox="1"/>
           <p:nvPr/>
         </p:nvSpPr>
         <p:spPr>
           <a:xfrm>
-            <a:off x="235917" y="5619750"/>
-            <a:ext cx="4168801" cy="533401"/>
+            <a:off x="334540" y="5619750"/>
+            <a:ext cx="5875959" cy="533401"/>
           </a:xfrm>
           <a:prstGeom prst="rect">
             <a:avLst/>
@@ -18324,7 +18425,58 @@
           </a:ln>
           <a:extLst>
             <a:ext uri="{C572A759-6A51-4108-AA02-DFA0A04FC94B}">
-              <ma14:wrappingTextBoxFlag xmlns:ma14="http://schemas.microsoft.com/office/mac/drawingml/2011/main" xmlns:a14="http://schemas.microsoft.com/office/drawing/2010/main" xmlns:m="http://schemas.openxmlformats.org/officeDocument/2006/math" xmlns="" val="1"/>
+              <ma14:wrappingTextBoxFlag xmlns="" xmlns:m="http://schemas.openxmlformats.org/officeDocument/2006/math" xmlns:a14="http://schemas.microsoft.com/office/drawing/2010/main" xmlns:ma14="http://schemas.microsoft.com/office/mac/drawingml/2011/main" val="1"/>
+            </a:ext>
+          </a:extLst>
+        </p:spPr>
+        <p:txBody>
+          <a:bodyPr wrap="none" lIns="50800" tIns="50800" rIns="50800" bIns="50800" anchor="ctr">
+            <a:spAutoFit/>
+          </a:bodyPr>
+          <a:lstStyle>
+            <a:lvl1pPr algn="l">
+              <a:defRPr sz="2800" b="0">
+                <a:solidFill>
+                  <a:schemeClr val="accent2">
+                    <a:hueOff val="167855"/>
+                    <a:satOff val="17755"/>
+                    <a:lumOff val="-16671"/>
+                  </a:schemeClr>
+                </a:solidFill>
+                <a:latin typeface="Courier"/>
+                <a:ea typeface="Courier"/>
+                <a:cs typeface="Courier"/>
+                <a:sym typeface="Courier"/>
+              </a:defRPr>
+            </a:lvl1pPr>
+          </a:lstStyle>
+          <a:p>
+            <a:r>
+              <a:t>["M", "SS", "SS", "PP", ""]</a:t>
+            </a:r>
+          </a:p>
+        </p:txBody>
+      </p:sp>
+      <p:sp>
+        <p:nvSpPr>
+          <p:cNvPr id="416" name="????"/>
+          <p:cNvSpPr txBox="1"/>
+          <p:nvPr/>
+        </p:nvSpPr>
+        <p:spPr>
+          <a:xfrm>
+            <a:off x="8277026" y="5683250"/>
+            <a:ext cx="967880" cy="533401"/>
+          </a:xfrm>
+          <a:prstGeom prst="rect">
+            <a:avLst/>
+          </a:prstGeom>
+          <a:ln w="12700">
+            <a:miter lim="400000"/>
+          </a:ln>
+          <a:extLst>
+            <a:ext uri="{C572A759-6A51-4108-AA02-DFA0A04FC94B}">
+              <ma14:wrappingTextBoxFlag xmlns="" xmlns:m="http://schemas.openxmlformats.org/officeDocument/2006/math" xmlns:a14="http://schemas.microsoft.com/office/drawing/2010/main" xmlns:ma14="http://schemas.microsoft.com/office/mac/drawingml/2011/main" val="1"/>
             </a:ext>
           </a:extLst>
         </p:spPr>
@@ -18351,64 +18503,21 @@
           </a:lstStyle>
           <a:p>
             <a:r>
-              <a:t>"a quick brown fox"</a:t>
-            </a:r>
-          </a:p>
-        </p:txBody>
-      </p:sp>
-      <p:sp>
-        <p:nvSpPr>
-          <p:cNvPr id="408" name="Arrow"/>
-          <p:cNvSpPr/>
-          <p:nvPr/>
-        </p:nvSpPr>
-        <p:spPr>
-          <a:xfrm>
-            <a:off x="4461643" y="5251450"/>
-            <a:ext cx="1627239" cy="1270000"/>
-          </a:xfrm>
-          <a:prstGeom prst="rightArrow">
-            <a:avLst>
-              <a:gd name="adj1" fmla="val 32000"/>
-              <a:gd name="adj2" fmla="val 64000"/>
-            </a:avLst>
-          </a:prstGeom>
-          <a:solidFill>
-            <a:srgbClr val="5E5E5E"/>
-          </a:solidFill>
-          <a:ln w="12700">
-            <a:miter lim="400000"/>
-          </a:ln>
-        </p:spPr>
-        <p:txBody>
-          <a:bodyPr lIns="50800" tIns="50800" rIns="50800" bIns="50800" anchor="ctr"/>
-          <a:lstStyle/>
-          <a:p>
-            <a:pPr>
-              <a:defRPr sz="2200" b="0">
-                <a:solidFill>
-                  <a:srgbClr val="FFFFFF"/>
-                </a:solidFill>
-                <a:latin typeface="+mn-lt"/>
-                <a:ea typeface="+mn-ea"/>
-                <a:cs typeface="+mn-cs"/>
-                <a:sym typeface="Gill Sans SemiBold"/>
-              </a:defRPr>
-            </a:pPr>
-            <a:endParaRPr/>
-          </a:p>
-        </p:txBody>
-      </p:sp>
-      <p:sp>
-        <p:nvSpPr>
-          <p:cNvPr id="409" name="[&quot;a&quot;, &quot;quick&quot;, &quot;brown&quot;, &quot;fox&quot;]"/>
+              <a:t>????</a:t>
+            </a:r>
+          </a:p>
+        </p:txBody>
+      </p:sp>
+      <p:sp>
+        <p:nvSpPr>
+          <p:cNvPr id="417" name="separator"/>
           <p:cNvSpPr txBox="1"/>
           <p:nvPr/>
         </p:nvSpPr>
         <p:spPr>
           <a:xfrm>
-            <a:off x="6252740" y="5619750"/>
-            <a:ext cx="6516143" cy="533401"/>
+            <a:off x="2446852" y="3911599"/>
+            <a:ext cx="1202296" cy="419101"/>
           </a:xfrm>
           <a:prstGeom prst="rect">
             <a:avLst/>
@@ -18418,58 +18527,7 @@
           </a:ln>
           <a:extLst>
             <a:ext uri="{C572A759-6A51-4108-AA02-DFA0A04FC94B}">
-              <ma14:wrappingTextBoxFlag xmlns:ma14="http://schemas.microsoft.com/office/mac/drawingml/2011/main" xmlns:a14="http://schemas.microsoft.com/office/drawing/2010/main" xmlns:m="http://schemas.openxmlformats.org/officeDocument/2006/math" xmlns="" val="1"/>
-            </a:ext>
-          </a:extLst>
-        </p:spPr>
-        <p:txBody>
-          <a:bodyPr wrap="none" lIns="50800" tIns="50800" rIns="50800" bIns="50800" anchor="ctr">
-            <a:spAutoFit/>
-          </a:bodyPr>
-          <a:lstStyle>
-            <a:lvl1pPr algn="l">
-              <a:defRPr sz="2800" b="0">
-                <a:solidFill>
-                  <a:schemeClr val="accent2">
-                    <a:hueOff val="167855"/>
-                    <a:satOff val="17755"/>
-                    <a:lumOff val="-16671"/>
-                  </a:schemeClr>
-                </a:solidFill>
-                <a:latin typeface="Courier"/>
-                <a:ea typeface="Courier"/>
-                <a:cs typeface="Courier"/>
-                <a:sym typeface="Courier"/>
-              </a:defRPr>
-            </a:lvl1pPr>
-          </a:lstStyle>
-          <a:p>
-            <a:r>
-              <a:t>["a", "quick", "brown", "fox"]</a:t>
-            </a:r>
-          </a:p>
-        </p:txBody>
-      </p:sp>
-      <p:sp>
-        <p:nvSpPr>
-          <p:cNvPr id="410" name="separator"/>
-          <p:cNvSpPr txBox="1"/>
-          <p:nvPr/>
-        </p:nvSpPr>
-        <p:spPr>
-          <a:xfrm>
-            <a:off x="6460052" y="3936999"/>
-            <a:ext cx="1202296" cy="419101"/>
-          </a:xfrm>
-          <a:prstGeom prst="rect">
-            <a:avLst/>
-          </a:prstGeom>
-          <a:ln w="12700">
-            <a:miter lim="400000"/>
-          </a:ln>
-          <a:extLst>
-            <a:ext uri="{C572A759-6A51-4108-AA02-DFA0A04FC94B}">
-              <ma14:wrappingTextBoxFlag xmlns:ma14="http://schemas.microsoft.com/office/mac/drawingml/2011/main" xmlns:a14="http://schemas.microsoft.com/office/drawing/2010/main" xmlns:m="http://schemas.openxmlformats.org/officeDocument/2006/math" xmlns="" val="1"/>
+              <ma14:wrappingTextBoxFlag xmlns="" xmlns:m="http://schemas.openxmlformats.org/officeDocument/2006/math" xmlns:a14="http://schemas.microsoft.com/office/drawing/2010/main" xmlns:ma14="http://schemas.microsoft.com/office/mac/drawingml/2011/main" val="1"/>
             </a:ext>
           </a:extLst>
         </p:spPr>
@@ -18493,6 +18551,87 @@
           <a:p>
             <a:r>
               <a:t>separator</a:t>
+            </a:r>
+          </a:p>
+        </p:txBody>
+      </p:sp>
+      <p:pic>
+        <p:nvPicPr>
+          <p:cNvPr id="418" name="Image" descr="Image"/>
+          <p:cNvPicPr>
+            <a:picLocks noChangeAspect="1"/>
+          </p:cNvPicPr>
+          <p:nvPr/>
+        </p:nvPicPr>
+        <p:blipFill>
+          <a:blip r:embed="rId2"/>
+          <a:stretch>
+            <a:fillRect/>
+          </a:stretch>
+        </p:blipFill>
+        <p:spPr>
+          <a:xfrm>
+            <a:off x="7954195" y="6532171"/>
+            <a:ext cx="4723635" cy="2749303"/>
+          </a:xfrm>
+          <a:prstGeom prst="rect">
+            <a:avLst/>
+          </a:prstGeom>
+          <a:ln w="12700">
+            <a:miter lim="400000"/>
+          </a:ln>
+        </p:spPr>
+      </p:pic>
+      <p:sp>
+        <p:nvSpPr>
+          <p:cNvPr id="419" name="http://www.city-data.com/picfilesc/picc25424.php"/>
+          <p:cNvSpPr txBox="1"/>
+          <p:nvPr/>
+        </p:nvSpPr>
+        <p:spPr>
+          <a:xfrm>
+            <a:off x="8733783" y="9303822"/>
+            <a:ext cx="3164459" cy="279401"/>
+          </a:xfrm>
+          <a:prstGeom prst="rect">
+            <a:avLst/>
+          </a:prstGeom>
+          <a:ln w="12700">
+            <a:miter lim="400000"/>
+          </a:ln>
+          <a:extLst>
+            <a:ext uri="{C572A759-6A51-4108-AA02-DFA0A04FC94B}">
+              <ma14:wrappingTextBoxFlag xmlns="" xmlns:m="http://schemas.openxmlformats.org/officeDocument/2006/math" xmlns:a14="http://schemas.microsoft.com/office/drawing/2010/main" xmlns:ma14="http://schemas.microsoft.com/office/mac/drawingml/2011/main" val="1"/>
+            </a:ext>
+          </a:extLst>
+        </p:spPr>
+        <p:txBody>
+          <a:bodyPr wrap="none" lIns="50800" tIns="50800" rIns="50800" bIns="50800" anchor="ctr">
+            <a:spAutoFit/>
+          </a:bodyPr>
+          <a:lstStyle>
+            <a:lvl1pPr algn="l" defTabSz="457200">
+              <a:lnSpc>
+                <a:spcPts val="2800"/>
+              </a:lnSpc>
+              <a:defRPr sz="1200" b="0" u="sng">
+                <a:solidFill>
+                  <a:srgbClr val="0000EE"/>
+                </a:solidFill>
+                <a:latin typeface="Times"/>
+                <a:ea typeface="Times"/>
+                <a:cs typeface="Times"/>
+                <a:sym typeface="Times"/>
+                <a:hlinkClick r:id="rId3"/>
+              </a:defRPr>
+            </a:lvl1pPr>
+          </a:lstStyle>
+          <a:p>
+            <a:r>
+              <a:rPr>
+                <a:hlinkClick r:id="rId3"/>
+              </a:rPr>
+              <a:t>http://www.city-data.com/picfilesc/picc25424.php</a:t>
             </a:r>
           </a:p>
         </p:txBody>
@@ -18525,7 +18664,7 @@
       </p:grpSpPr>
       <p:sp>
         <p:nvSpPr>
-          <p:cNvPr id="412" name="join method"/>
+          <p:cNvPr id="421" name="join method"/>
           <p:cNvSpPr txBox="1">
             <a:spLocks noGrp="1"/>
           </p:cNvSpPr>
@@ -18558,7 +18697,7 @@
       </p:sp>
       <p:sp>
         <p:nvSpPr>
-          <p:cNvPr id="413" name="L = [&quot;M&quot;, &quot;SS&quot;, &quot;SS&quot;, &quot;PP&quot;, &quot;&quot;]…"/>
+          <p:cNvPr id="422" name="L = [&quot;M&quot;, &quot;SS&quot;, &quot;SS&quot;, &quot;PP&quot;, &quot;&quot;]…"/>
           <p:cNvSpPr txBox="1"/>
           <p:nvPr/>
         </p:nvSpPr>
@@ -18575,7 +18714,7 @@
           </a:ln>
           <a:extLst>
             <a:ext uri="{C572A759-6A51-4108-AA02-DFA0A04FC94B}">
-              <ma14:wrappingTextBoxFlag xmlns:ma14="http://schemas.microsoft.com/office/mac/drawingml/2011/main" xmlns:a14="http://schemas.microsoft.com/office/drawing/2010/main" xmlns:m="http://schemas.openxmlformats.org/officeDocument/2006/math" xmlns="" val="1"/>
+              <ma14:wrappingTextBoxFlag xmlns="" xmlns:m="http://schemas.openxmlformats.org/officeDocument/2006/math" xmlns:a14="http://schemas.microsoft.com/office/drawing/2010/main" xmlns:ma14="http://schemas.microsoft.com/office/mac/drawingml/2011/main" val="1"/>
             </a:ext>
           </a:extLst>
         </p:spPr>
@@ -18653,7 +18792,7 @@
       </p:sp>
       <p:sp>
         <p:nvSpPr>
-          <p:cNvPr id="414" name="Arrow"/>
+          <p:cNvPr id="423" name="Arrow"/>
           <p:cNvSpPr/>
           <p:nvPr/>
         </p:nvSpPr>
@@ -18696,7 +18835,7 @@
       </p:sp>
       <p:sp>
         <p:nvSpPr>
-          <p:cNvPr id="415" name="[&quot;M&quot;, &quot;SS&quot;, &quot;SS&quot;, &quot;PP&quot;, &quot;&quot;]"/>
+          <p:cNvPr id="424" name="[&quot;M&quot;, &quot;SS&quot;, &quot;SS&quot;, &quot;PP&quot;, &quot;&quot;]"/>
           <p:cNvSpPr txBox="1"/>
           <p:nvPr/>
         </p:nvSpPr>
@@ -18713,7 +18852,7 @@
           </a:ln>
           <a:extLst>
             <a:ext uri="{C572A759-6A51-4108-AA02-DFA0A04FC94B}">
-              <ma14:wrappingTextBoxFlag xmlns:ma14="http://schemas.microsoft.com/office/mac/drawingml/2011/main" xmlns:a14="http://schemas.microsoft.com/office/drawing/2010/main" xmlns:m="http://schemas.openxmlformats.org/officeDocument/2006/math" xmlns="" val="1"/>
+              <ma14:wrappingTextBoxFlag xmlns="" xmlns:m="http://schemas.openxmlformats.org/officeDocument/2006/math" xmlns:a14="http://schemas.microsoft.com/office/drawing/2010/main" xmlns:ma14="http://schemas.microsoft.com/office/mac/drawingml/2011/main" val="1"/>
             </a:ext>
           </a:extLst>
         </p:spPr>
@@ -18747,14 +18886,14 @@
       </p:sp>
       <p:sp>
         <p:nvSpPr>
-          <p:cNvPr id="416" name="????"/>
+          <p:cNvPr id="425" name="separator"/>
           <p:cNvSpPr txBox="1"/>
           <p:nvPr/>
         </p:nvSpPr>
         <p:spPr>
           <a:xfrm>
-            <a:off x="8277026" y="5683250"/>
-            <a:ext cx="967880" cy="533401"/>
+            <a:off x="2446852" y="3911599"/>
+            <a:ext cx="1202296" cy="419101"/>
           </a:xfrm>
           <a:prstGeom prst="rect">
             <a:avLst/>
@@ -18764,7 +18903,54 @@
           </a:ln>
           <a:extLst>
             <a:ext uri="{C572A759-6A51-4108-AA02-DFA0A04FC94B}">
-              <ma14:wrappingTextBoxFlag xmlns:ma14="http://schemas.microsoft.com/office/mac/drawingml/2011/main" xmlns:a14="http://schemas.microsoft.com/office/drawing/2010/main" xmlns:m="http://schemas.openxmlformats.org/officeDocument/2006/math" xmlns="" val="1"/>
+              <ma14:wrappingTextBoxFlag xmlns="" xmlns:m="http://schemas.openxmlformats.org/officeDocument/2006/math" xmlns:a14="http://schemas.microsoft.com/office/drawing/2010/main" xmlns:ma14="http://schemas.microsoft.com/office/mac/drawingml/2011/main" val="1"/>
+            </a:ext>
+          </a:extLst>
+        </p:spPr>
+        <p:txBody>
+          <a:bodyPr wrap="none" lIns="50800" tIns="50800" rIns="50800" bIns="50800" anchor="ctr">
+            <a:spAutoFit/>
+          </a:bodyPr>
+          <a:lstStyle>
+            <a:lvl1pPr>
+              <a:defRPr sz="2200" b="0">
+                <a:solidFill>
+                  <a:schemeClr val="accent5">
+                    <a:hueOff val="-82419"/>
+                    <a:satOff val="-9513"/>
+                    <a:lumOff val="-16343"/>
+                  </a:schemeClr>
+                </a:solidFill>
+              </a:defRPr>
+            </a:lvl1pPr>
+          </a:lstStyle>
+          <a:p>
+            <a:r>
+              <a:t>separator</a:t>
+            </a:r>
+          </a:p>
+        </p:txBody>
+      </p:sp>
+      <p:sp>
+        <p:nvSpPr>
+          <p:cNvPr id="426" name="MISSISSIPPI"/>
+          <p:cNvSpPr txBox="1"/>
+          <p:nvPr/>
+        </p:nvSpPr>
+        <p:spPr>
+          <a:xfrm>
+            <a:off x="8277026" y="5683250"/>
+            <a:ext cx="2461643" cy="533401"/>
+          </a:xfrm>
+          <a:prstGeom prst="rect">
+            <a:avLst/>
+          </a:prstGeom>
+          <a:ln w="12700">
+            <a:miter lim="400000"/>
+          </a:ln>
+          <a:extLst>
+            <a:ext uri="{C572A759-6A51-4108-AA02-DFA0A04FC94B}">
+              <ma14:wrappingTextBoxFlag xmlns="" xmlns:m="http://schemas.openxmlformats.org/officeDocument/2006/math" xmlns:a14="http://schemas.microsoft.com/office/drawing/2010/main" xmlns:ma14="http://schemas.microsoft.com/office/mac/drawingml/2011/main" val="1"/>
             </a:ext>
           </a:extLst>
         </p:spPr>
@@ -18791,61 +18977,14 @@
           </a:lstStyle>
           <a:p>
             <a:r>
-              <a:t>????</a:t>
-            </a:r>
-          </a:p>
-        </p:txBody>
-      </p:sp>
-      <p:sp>
-        <p:nvSpPr>
-          <p:cNvPr id="417" name="separator"/>
-          <p:cNvSpPr txBox="1"/>
-          <p:nvPr/>
-        </p:nvSpPr>
-        <p:spPr>
-          <a:xfrm>
-            <a:off x="2446852" y="3911599"/>
-            <a:ext cx="1202296" cy="419101"/>
-          </a:xfrm>
-          <a:prstGeom prst="rect">
-            <a:avLst/>
-          </a:prstGeom>
-          <a:ln w="12700">
-            <a:miter lim="400000"/>
-          </a:ln>
-          <a:extLst>
-            <a:ext uri="{C572A759-6A51-4108-AA02-DFA0A04FC94B}">
-              <ma14:wrappingTextBoxFlag xmlns:ma14="http://schemas.microsoft.com/office/mac/drawingml/2011/main" xmlns:a14="http://schemas.microsoft.com/office/drawing/2010/main" xmlns:m="http://schemas.openxmlformats.org/officeDocument/2006/math" xmlns="" val="1"/>
-            </a:ext>
-          </a:extLst>
-        </p:spPr>
-        <p:txBody>
-          <a:bodyPr wrap="none" lIns="50800" tIns="50800" rIns="50800" bIns="50800" anchor="ctr">
-            <a:spAutoFit/>
-          </a:bodyPr>
-          <a:lstStyle>
-            <a:lvl1pPr>
-              <a:defRPr sz="2200" b="0">
-                <a:solidFill>
-                  <a:schemeClr val="accent5">
-                    <a:hueOff val="-82419"/>
-                    <a:satOff val="-9513"/>
-                    <a:lumOff val="-16343"/>
-                  </a:schemeClr>
-                </a:solidFill>
-              </a:defRPr>
-            </a:lvl1pPr>
-          </a:lstStyle>
-          <a:p>
-            <a:r>
-              <a:t>separator</a:t>
+              <a:t>MISSISSIPPI</a:t>
             </a:r>
           </a:p>
         </p:txBody>
       </p:sp>
       <p:pic>
         <p:nvPicPr>
-          <p:cNvPr id="418" name="Image" descr="Image"/>
+          <p:cNvPr id="427" name="Image" descr="Image"/>
           <p:cNvPicPr>
             <a:picLocks noChangeAspect="1"/>
           </p:cNvPicPr>
@@ -18872,7 +19011,7 @@
       </p:pic>
       <p:sp>
         <p:nvSpPr>
-          <p:cNvPr id="419" name="http://www.city-data.com/picfilesc/picc25424.php"/>
+          <p:cNvPr id="428" name="http://www.city-data.com/picfilesc/picc25424.php"/>
           <p:cNvSpPr txBox="1"/>
           <p:nvPr/>
         </p:nvSpPr>
@@ -18889,7 +19028,7 @@
           </a:ln>
           <a:extLst>
             <a:ext uri="{C572A759-6A51-4108-AA02-DFA0A04FC94B}">
-              <ma14:wrappingTextBoxFlag xmlns:ma14="http://schemas.microsoft.com/office/mac/drawingml/2011/main" xmlns:a14="http://schemas.microsoft.com/office/drawing/2010/main" xmlns:m="http://schemas.openxmlformats.org/officeDocument/2006/math" xmlns="" val="1"/>
+              <ma14:wrappingTextBoxFlag xmlns="" xmlns:m="http://schemas.openxmlformats.org/officeDocument/2006/math" xmlns:a14="http://schemas.microsoft.com/office/drawing/2010/main" xmlns:ma14="http://schemas.microsoft.com/office/mac/drawingml/2011/main" val="1"/>
             </a:ext>
           </a:extLst>
         </p:spPr>
@@ -18952,7 +19091,7 @@
       </p:grpSpPr>
       <p:sp>
         <p:nvSpPr>
-          <p:cNvPr id="421" name="join method"/>
+          <p:cNvPr id="430" name="join method"/>
           <p:cNvSpPr txBox="1">
             <a:spLocks noGrp="1"/>
           </p:cNvSpPr>
@@ -18985,7 +19124,7 @@
       </p:sp>
       <p:sp>
         <p:nvSpPr>
-          <p:cNvPr id="422" name="L = [&quot;M&quot;, &quot;SS&quot;, &quot;SS&quot;, &quot;PP&quot;, &quot;&quot;]…"/>
+          <p:cNvPr id="431" name="L = [&quot;M&quot;, &quot;SS&quot;, &quot;SS&quot;, &quot;PP&quot;, &quot;&quot;]…"/>
           <p:cNvSpPr txBox="1"/>
           <p:nvPr/>
         </p:nvSpPr>
@@ -19002,7 +19141,7 @@
           </a:ln>
           <a:extLst>
             <a:ext uri="{C572A759-6A51-4108-AA02-DFA0A04FC94B}">
-              <ma14:wrappingTextBoxFlag xmlns:ma14="http://schemas.microsoft.com/office/mac/drawingml/2011/main" xmlns:a14="http://schemas.microsoft.com/office/drawing/2010/main" xmlns:m="http://schemas.openxmlformats.org/officeDocument/2006/math" xmlns="" val="1"/>
+              <ma14:wrappingTextBoxFlag xmlns="" xmlns:m="http://schemas.openxmlformats.org/officeDocument/2006/math" xmlns:a14="http://schemas.microsoft.com/office/drawing/2010/main" xmlns:ma14="http://schemas.microsoft.com/office/mac/drawingml/2011/main" val="1"/>
             </a:ext>
           </a:extLst>
         </p:spPr>
@@ -19080,7 +19219,7 @@
       </p:sp>
       <p:sp>
         <p:nvSpPr>
-          <p:cNvPr id="423" name="Arrow"/>
+          <p:cNvPr id="432" name="Arrow"/>
           <p:cNvSpPr/>
           <p:nvPr/>
         </p:nvSpPr>
@@ -19123,7 +19262,7 @@
       </p:sp>
       <p:sp>
         <p:nvSpPr>
-          <p:cNvPr id="424" name="[&quot;M&quot;, &quot;SS&quot;, &quot;SS&quot;, &quot;PP&quot;, &quot;&quot;]"/>
+          <p:cNvPr id="433" name="[&quot;M&quot;, &quot;SS&quot;, &quot;SS&quot;, &quot;PP&quot;, &quot;&quot;]"/>
           <p:cNvSpPr txBox="1"/>
           <p:nvPr/>
         </p:nvSpPr>
@@ -19140,7 +19279,7 @@
           </a:ln>
           <a:extLst>
             <a:ext uri="{C572A759-6A51-4108-AA02-DFA0A04FC94B}">
-              <ma14:wrappingTextBoxFlag xmlns:ma14="http://schemas.microsoft.com/office/mac/drawingml/2011/main" xmlns:a14="http://schemas.microsoft.com/office/drawing/2010/main" xmlns:m="http://schemas.openxmlformats.org/officeDocument/2006/math" xmlns="" val="1"/>
+              <ma14:wrappingTextBoxFlag xmlns="" xmlns:m="http://schemas.openxmlformats.org/officeDocument/2006/math" xmlns:a14="http://schemas.microsoft.com/office/drawing/2010/main" xmlns:ma14="http://schemas.microsoft.com/office/mac/drawingml/2011/main" val="1"/>
             </a:ext>
           </a:extLst>
         </p:spPr>
@@ -19174,14 +19313,14 @@
       </p:sp>
       <p:sp>
         <p:nvSpPr>
-          <p:cNvPr id="425" name="separator"/>
+          <p:cNvPr id="434" name="MISSISSIPPI"/>
           <p:cNvSpPr txBox="1"/>
           <p:nvPr/>
         </p:nvSpPr>
         <p:spPr>
           <a:xfrm>
-            <a:off x="2446852" y="3911599"/>
-            <a:ext cx="1202296" cy="419101"/>
+            <a:off x="8277026" y="5683250"/>
+            <a:ext cx="2461643" cy="533401"/>
           </a:xfrm>
           <a:prstGeom prst="rect">
             <a:avLst/>
@@ -19191,54 +19330,7 @@
           </a:ln>
           <a:extLst>
             <a:ext uri="{C572A759-6A51-4108-AA02-DFA0A04FC94B}">
-              <ma14:wrappingTextBoxFlag xmlns:ma14="http://schemas.microsoft.com/office/mac/drawingml/2011/main" xmlns:a14="http://schemas.microsoft.com/office/drawing/2010/main" xmlns:m="http://schemas.openxmlformats.org/officeDocument/2006/math" xmlns="" val="1"/>
-            </a:ext>
-          </a:extLst>
-        </p:spPr>
-        <p:txBody>
-          <a:bodyPr wrap="none" lIns="50800" tIns="50800" rIns="50800" bIns="50800" anchor="ctr">
-            <a:spAutoFit/>
-          </a:bodyPr>
-          <a:lstStyle>
-            <a:lvl1pPr>
-              <a:defRPr sz="2200" b="0">
-                <a:solidFill>
-                  <a:schemeClr val="accent5">
-                    <a:hueOff val="-82419"/>
-                    <a:satOff val="-9513"/>
-                    <a:lumOff val="-16343"/>
-                  </a:schemeClr>
-                </a:solidFill>
-              </a:defRPr>
-            </a:lvl1pPr>
-          </a:lstStyle>
-          <a:p>
-            <a:r>
-              <a:t>separator</a:t>
-            </a:r>
-          </a:p>
-        </p:txBody>
-      </p:sp>
-      <p:sp>
-        <p:nvSpPr>
-          <p:cNvPr id="426" name="MISSISSIPPI"/>
-          <p:cNvSpPr txBox="1"/>
-          <p:nvPr/>
-        </p:nvSpPr>
-        <p:spPr>
-          <a:xfrm>
-            <a:off x="8277026" y="5683250"/>
-            <a:ext cx="2461643" cy="533401"/>
-          </a:xfrm>
-          <a:prstGeom prst="rect">
-            <a:avLst/>
-          </a:prstGeom>
-          <a:ln w="12700">
-            <a:miter lim="400000"/>
-          </a:ln>
-          <a:extLst>
-            <a:ext uri="{C572A759-6A51-4108-AA02-DFA0A04FC94B}">
-              <ma14:wrappingTextBoxFlag xmlns:ma14="http://schemas.microsoft.com/office/mac/drawingml/2011/main" xmlns:a14="http://schemas.microsoft.com/office/drawing/2010/main" xmlns:m="http://schemas.openxmlformats.org/officeDocument/2006/math" xmlns="" val="1"/>
+              <ma14:wrappingTextBoxFlag xmlns="" xmlns:m="http://schemas.openxmlformats.org/officeDocument/2006/math" xmlns:a14="http://schemas.microsoft.com/office/drawing/2010/main" xmlns:ma14="http://schemas.microsoft.com/office/mac/drawingml/2011/main" val="1"/>
             </a:ext>
           </a:extLst>
         </p:spPr>
@@ -19270,9 +19362,143 @@
           </a:p>
         </p:txBody>
       </p:sp>
+      <p:sp>
+        <p:nvSpPr>
+          <p:cNvPr id="435" name="Rectangle"/>
+          <p:cNvSpPr/>
+          <p:nvPr/>
+        </p:nvSpPr>
+        <p:spPr>
+          <a:xfrm>
+            <a:off x="10515600" y="2241550"/>
+            <a:ext cx="1494086" cy="972543"/>
+          </a:xfrm>
+          <a:prstGeom prst="rect">
+            <a:avLst/>
+          </a:prstGeom>
+          <a:ln w="25400">
+            <a:solidFill>
+              <a:srgbClr val="FF2600"/>
+            </a:solidFill>
+            <a:miter lim="400000"/>
+          </a:ln>
+        </p:spPr>
+        <p:txBody>
+          <a:bodyPr lIns="50800" tIns="50800" rIns="50800" bIns="50800" anchor="ctr"/>
+          <a:lstStyle/>
+          <a:p>
+            <a:pPr>
+              <a:defRPr sz="2200" b="0">
+                <a:solidFill>
+                  <a:srgbClr val="FFFFFF"/>
+                </a:solidFill>
+                <a:latin typeface="+mn-lt"/>
+                <a:ea typeface="+mn-ea"/>
+                <a:cs typeface="+mn-cs"/>
+                <a:sym typeface="Gill Sans SemiBold"/>
+              </a:defRPr>
+            </a:pPr>
+            <a:endParaRPr/>
+          </a:p>
+        </p:txBody>
+      </p:sp>
+      <p:sp>
+        <p:nvSpPr>
+          <p:cNvPr id="436" name="what if removed?"/>
+          <p:cNvSpPr txBox="1"/>
+          <p:nvPr/>
+        </p:nvSpPr>
+        <p:spPr>
+          <a:xfrm>
+            <a:off x="10239939" y="3210247"/>
+            <a:ext cx="2045408" cy="419101"/>
+          </a:xfrm>
+          <a:prstGeom prst="rect">
+            <a:avLst/>
+          </a:prstGeom>
+          <a:ln w="12700">
+            <a:miter lim="400000"/>
+          </a:ln>
+          <a:extLst>
+            <a:ext uri="{C572A759-6A51-4108-AA02-DFA0A04FC94B}">
+              <ma14:wrappingTextBoxFlag xmlns="" xmlns:m="http://schemas.openxmlformats.org/officeDocument/2006/math" xmlns:a14="http://schemas.microsoft.com/office/drawing/2010/main" xmlns:ma14="http://schemas.microsoft.com/office/mac/drawingml/2011/main" val="1"/>
+            </a:ext>
+          </a:extLst>
+        </p:spPr>
+        <p:txBody>
+          <a:bodyPr wrap="none" lIns="50800" tIns="50800" rIns="50800" bIns="50800" anchor="ctr">
+            <a:spAutoFit/>
+          </a:bodyPr>
+          <a:lstStyle>
+            <a:lvl1pPr>
+              <a:defRPr sz="2200" b="0">
+                <a:solidFill>
+                  <a:schemeClr val="accent5">
+                    <a:hueOff val="-82419"/>
+                    <a:satOff val="-9513"/>
+                    <a:lumOff val="-16343"/>
+                  </a:schemeClr>
+                </a:solidFill>
+              </a:defRPr>
+            </a:lvl1pPr>
+          </a:lstStyle>
+          <a:p>
+            <a:r>
+              <a:t>what if removed?</a:t>
+            </a:r>
+          </a:p>
+        </p:txBody>
+      </p:sp>
+      <p:sp>
+        <p:nvSpPr>
+          <p:cNvPr id="437" name="separator"/>
+          <p:cNvSpPr txBox="1"/>
+          <p:nvPr/>
+        </p:nvSpPr>
+        <p:spPr>
+          <a:xfrm>
+            <a:off x="2446852" y="3911599"/>
+            <a:ext cx="1202296" cy="419101"/>
+          </a:xfrm>
+          <a:prstGeom prst="rect">
+            <a:avLst/>
+          </a:prstGeom>
+          <a:ln w="12700">
+            <a:miter lim="400000"/>
+          </a:ln>
+          <a:extLst>
+            <a:ext uri="{C572A759-6A51-4108-AA02-DFA0A04FC94B}">
+              <ma14:wrappingTextBoxFlag xmlns="" xmlns:m="http://schemas.openxmlformats.org/officeDocument/2006/math" xmlns:a14="http://schemas.microsoft.com/office/drawing/2010/main" xmlns:ma14="http://schemas.microsoft.com/office/mac/drawingml/2011/main" val="1"/>
+            </a:ext>
+          </a:extLst>
+        </p:spPr>
+        <p:txBody>
+          <a:bodyPr wrap="none" lIns="50800" tIns="50800" rIns="50800" bIns="50800" anchor="ctr">
+            <a:spAutoFit/>
+          </a:bodyPr>
+          <a:lstStyle>
+            <a:lvl1pPr>
+              <a:defRPr sz="2200" b="0">
+                <a:solidFill>
+                  <a:schemeClr val="accent5">
+                    <a:hueOff val="-82419"/>
+                    <a:satOff val="-9513"/>
+                    <a:lumOff val="-16343"/>
+                  </a:schemeClr>
+                </a:solidFill>
+              </a:defRPr>
+            </a:lvl1pPr>
+          </a:lstStyle>
+          <a:p>
+            <a:r>
+              <a:t>separator</a:t>
+            </a:r>
+          </a:p>
+        </p:txBody>
+      </p:sp>
       <p:pic>
         <p:nvPicPr>
-          <p:cNvPr id="427" name="Image" descr="Image"/>
+          <p:cNvPr id="438" name="Image" descr="Image"/>
           <p:cNvPicPr>
             <a:picLocks noChangeAspect="1"/>
           </p:cNvPicPr>
@@ -19299,7 +19525,7 @@
       </p:pic>
       <p:sp>
         <p:nvSpPr>
-          <p:cNvPr id="428" name="http://www.city-data.com/picfilesc/picc25424.php"/>
+          <p:cNvPr id="439" name="http://www.city-data.com/picfilesc/picc25424.php"/>
           <p:cNvSpPr txBox="1"/>
           <p:nvPr/>
         </p:nvSpPr>
@@ -19316,7 +19542,7 @@
           </a:ln>
           <a:extLst>
             <a:ext uri="{C572A759-6A51-4108-AA02-DFA0A04FC94B}">
-              <ma14:wrappingTextBoxFlag xmlns:ma14="http://schemas.microsoft.com/office/mac/drawingml/2011/main" xmlns:a14="http://schemas.microsoft.com/office/drawing/2010/main" xmlns:m="http://schemas.openxmlformats.org/officeDocument/2006/math" xmlns="" val="1"/>
+              <ma14:wrappingTextBoxFlag xmlns="" xmlns:m="http://schemas.openxmlformats.org/officeDocument/2006/math" xmlns:a14="http://schemas.microsoft.com/office/drawing/2010/main" xmlns:ma14="http://schemas.microsoft.com/office/mac/drawingml/2011/main" val="1"/>
             </a:ext>
           </a:extLst>
         </p:spPr>
@@ -19379,7 +19605,7 @@
       </p:grpSpPr>
       <p:sp>
         <p:nvSpPr>
-          <p:cNvPr id="430" name="join method"/>
+          <p:cNvPr id="441" name="join method"/>
           <p:cNvSpPr txBox="1">
             <a:spLocks noGrp="1"/>
           </p:cNvSpPr>
@@ -19412,14 +19638,14 @@
       </p:sp>
       <p:sp>
         <p:nvSpPr>
-          <p:cNvPr id="431" name="L = [&quot;M&quot;, &quot;SS&quot;, &quot;SS&quot;, &quot;PP&quot;, &quot;&quot;]…"/>
+          <p:cNvPr id="442" name="L = [&quot;M&quot;, &quot;SS&quot;, &quot;SS&quot;, &quot;PP&quot;]…"/>
           <p:cNvSpPr txBox="1"/>
           <p:nvPr/>
         </p:nvSpPr>
         <p:spPr>
           <a:xfrm>
             <a:off x="912415" y="2241549"/>
-            <a:ext cx="11820526" cy="1574801"/>
+            <a:ext cx="10357248" cy="1574801"/>
           </a:xfrm>
           <a:prstGeom prst="rect">
             <a:avLst/>
@@ -19429,7 +19655,7 @@
           </a:ln>
           <a:extLst>
             <a:ext uri="{C572A759-6A51-4108-AA02-DFA0A04FC94B}">
-              <ma14:wrappingTextBoxFlag xmlns:ma14="http://schemas.microsoft.com/office/mac/drawingml/2011/main" xmlns:a14="http://schemas.microsoft.com/office/drawing/2010/main" xmlns:m="http://schemas.openxmlformats.org/officeDocument/2006/math" xmlns="" val="1"/>
+              <ma14:wrappingTextBoxFlag xmlns="" xmlns:m="http://schemas.openxmlformats.org/officeDocument/2006/math" xmlns:a14="http://schemas.microsoft.com/office/drawing/2010/main" xmlns:ma14="http://schemas.microsoft.com/office/mac/drawingml/2011/main" val="1"/>
             </a:ext>
           </a:extLst>
         </p:spPr>
@@ -19460,7 +19686,7 @@
               <a:t>L</a:t>
             </a:r>
             <a:r>
-              <a:t> = ["M", "SS", "SS", "PP", ""]</a:t>
+              <a:t> = ["M", "SS", "SS", "PP"]</a:t>
             </a:r>
           </a:p>
           <a:p>
@@ -19507,7 +19733,7 @@
       </p:sp>
       <p:sp>
         <p:nvSpPr>
-          <p:cNvPr id="432" name="Arrow"/>
+          <p:cNvPr id="443" name="Arrow"/>
           <p:cNvSpPr/>
           <p:nvPr/>
         </p:nvSpPr>
@@ -19550,7 +19776,7 @@
       </p:sp>
       <p:sp>
         <p:nvSpPr>
-          <p:cNvPr id="433" name="[&quot;M&quot;, &quot;SS&quot;, &quot;SS&quot;, &quot;PP&quot;, &quot;&quot;]"/>
+          <p:cNvPr id="444" name="[&quot;M&quot;, &quot;SS&quot;, &quot;SS&quot;, &quot;PP&quot;, &quot;&quot;]"/>
           <p:cNvSpPr txBox="1"/>
           <p:nvPr/>
         </p:nvSpPr>
@@ -19567,7 +19793,7 @@
           </a:ln>
           <a:extLst>
             <a:ext uri="{C572A759-6A51-4108-AA02-DFA0A04FC94B}">
-              <ma14:wrappingTextBoxFlag xmlns:ma14="http://schemas.microsoft.com/office/mac/drawingml/2011/main" xmlns:a14="http://schemas.microsoft.com/office/drawing/2010/main" xmlns:m="http://schemas.openxmlformats.org/officeDocument/2006/math" xmlns="" val="1"/>
+              <ma14:wrappingTextBoxFlag xmlns="" xmlns:m="http://schemas.openxmlformats.org/officeDocument/2006/math" xmlns:a14="http://schemas.microsoft.com/office/drawing/2010/main" xmlns:ma14="http://schemas.microsoft.com/office/mac/drawingml/2011/main" val="1"/>
             </a:ext>
           </a:extLst>
         </p:spPr>
@@ -19601,14 +19827,14 @@
       </p:sp>
       <p:sp>
         <p:nvSpPr>
-          <p:cNvPr id="434" name="MISSISSIPPI"/>
+          <p:cNvPr id="445" name="MISSISSIPP"/>
           <p:cNvSpPr txBox="1"/>
           <p:nvPr/>
         </p:nvSpPr>
         <p:spPr>
           <a:xfrm>
             <a:off x="8277026" y="5683250"/>
-            <a:ext cx="2461643" cy="533401"/>
+            <a:ext cx="2248248" cy="533401"/>
           </a:xfrm>
           <a:prstGeom prst="rect">
             <a:avLst/>
@@ -19618,7 +19844,7 @@
           </a:ln>
           <a:extLst>
             <a:ext uri="{C572A759-6A51-4108-AA02-DFA0A04FC94B}">
-              <ma14:wrappingTextBoxFlag xmlns:ma14="http://schemas.microsoft.com/office/mac/drawingml/2011/main" xmlns:a14="http://schemas.microsoft.com/office/drawing/2010/main" xmlns:m="http://schemas.openxmlformats.org/officeDocument/2006/math" xmlns="" val="1"/>
+              <ma14:wrappingTextBoxFlag xmlns="" xmlns:m="http://schemas.openxmlformats.org/officeDocument/2006/math" xmlns:a14="http://schemas.microsoft.com/office/drawing/2010/main" xmlns:ma14="http://schemas.microsoft.com/office/mac/drawingml/2011/main" val="1"/>
             </a:ext>
           </a:extLst>
         </p:spPr>
@@ -19645,61 +19871,21 @@
           </a:lstStyle>
           <a:p>
             <a:r>
-              <a:t>MISSISSIPPI</a:t>
-            </a:r>
-          </a:p>
-        </p:txBody>
-      </p:sp>
-      <p:sp>
-        <p:nvSpPr>
-          <p:cNvPr id="435" name="Rectangle"/>
-          <p:cNvSpPr/>
-          <p:nvPr/>
-        </p:nvSpPr>
-        <p:spPr>
-          <a:xfrm>
-            <a:off x="10515600" y="2241550"/>
-            <a:ext cx="1494086" cy="972543"/>
-          </a:xfrm>
-          <a:prstGeom prst="rect">
-            <a:avLst/>
-          </a:prstGeom>
-          <a:ln w="25400">
-            <a:solidFill>
-              <a:srgbClr val="FF2600"/>
-            </a:solidFill>
-            <a:miter lim="400000"/>
-          </a:ln>
-        </p:spPr>
-        <p:txBody>
-          <a:bodyPr lIns="50800" tIns="50800" rIns="50800" bIns="50800" anchor="ctr"/>
-          <a:lstStyle/>
-          <a:p>
-            <a:pPr>
-              <a:defRPr sz="2200" b="0">
-                <a:solidFill>
-                  <a:srgbClr val="FFFFFF"/>
-                </a:solidFill>
-                <a:latin typeface="+mn-lt"/>
-                <a:ea typeface="+mn-ea"/>
-                <a:cs typeface="+mn-cs"/>
-                <a:sym typeface="Gill Sans SemiBold"/>
-              </a:defRPr>
-            </a:pPr>
-            <a:endParaRPr/>
-          </a:p>
-        </p:txBody>
-      </p:sp>
-      <p:sp>
-        <p:nvSpPr>
-          <p:cNvPr id="436" name="what if removed?"/>
+              <a:t>MISSISSIPP</a:t>
+            </a:r>
+          </a:p>
+        </p:txBody>
+      </p:sp>
+      <p:sp>
+        <p:nvSpPr>
+          <p:cNvPr id="446" name="separator"/>
           <p:cNvSpPr txBox="1"/>
           <p:nvPr/>
         </p:nvSpPr>
         <p:spPr>
           <a:xfrm>
-            <a:off x="10239939" y="3210247"/>
-            <a:ext cx="2045408" cy="419101"/>
+            <a:off x="2446852" y="3911599"/>
+            <a:ext cx="1202296" cy="419101"/>
           </a:xfrm>
           <a:prstGeom prst="rect">
             <a:avLst/>
@@ -19709,7 +19895,7 @@
           </a:ln>
           <a:extLst>
             <a:ext uri="{C572A759-6A51-4108-AA02-DFA0A04FC94B}">
-              <ma14:wrappingTextBoxFlag xmlns:ma14="http://schemas.microsoft.com/office/mac/drawingml/2011/main" xmlns:a14="http://schemas.microsoft.com/office/drawing/2010/main" xmlns:m="http://schemas.openxmlformats.org/officeDocument/2006/math" xmlns="" val="1"/>
+              <ma14:wrappingTextBoxFlag xmlns="" xmlns:m="http://schemas.openxmlformats.org/officeDocument/2006/math" xmlns:a14="http://schemas.microsoft.com/office/drawing/2010/main" xmlns:ma14="http://schemas.microsoft.com/office/mac/drawingml/2011/main" val="1"/>
             </a:ext>
           </a:extLst>
         </p:spPr>
@@ -19732,53 +19918,6 @@
           </a:lstStyle>
           <a:p>
             <a:r>
-              <a:t>what if removed?</a:t>
-            </a:r>
-          </a:p>
-        </p:txBody>
-      </p:sp>
-      <p:sp>
-        <p:nvSpPr>
-          <p:cNvPr id="437" name="separator"/>
-          <p:cNvSpPr txBox="1"/>
-          <p:nvPr/>
-        </p:nvSpPr>
-        <p:spPr>
-          <a:xfrm>
-            <a:off x="2446852" y="3911599"/>
-            <a:ext cx="1202296" cy="419101"/>
-          </a:xfrm>
-          <a:prstGeom prst="rect">
-            <a:avLst/>
-          </a:prstGeom>
-          <a:ln w="12700">
-            <a:miter lim="400000"/>
-          </a:ln>
-          <a:extLst>
-            <a:ext uri="{C572A759-6A51-4108-AA02-DFA0A04FC94B}">
-              <ma14:wrappingTextBoxFlag xmlns:ma14="http://schemas.microsoft.com/office/mac/drawingml/2011/main" xmlns:a14="http://schemas.microsoft.com/office/drawing/2010/main" xmlns:m="http://schemas.openxmlformats.org/officeDocument/2006/math" xmlns="" val="1"/>
-            </a:ext>
-          </a:extLst>
-        </p:spPr>
-        <p:txBody>
-          <a:bodyPr wrap="none" lIns="50800" tIns="50800" rIns="50800" bIns="50800" anchor="ctr">
-            <a:spAutoFit/>
-          </a:bodyPr>
-          <a:lstStyle>
-            <a:lvl1pPr>
-              <a:defRPr sz="2200" b="0">
-                <a:solidFill>
-                  <a:schemeClr val="accent5">
-                    <a:hueOff val="-82419"/>
-                    <a:satOff val="-9513"/>
-                    <a:lumOff val="-16343"/>
-                  </a:schemeClr>
-                </a:solidFill>
-              </a:defRPr>
-            </a:lvl1pPr>
-          </a:lstStyle>
-          <a:p>
-            <a:r>
               <a:t>separator</a:t>
             </a:r>
           </a:p>
@@ -19786,7 +19925,7 @@
       </p:sp>
       <p:pic>
         <p:nvPicPr>
-          <p:cNvPr id="438" name="Image" descr="Image"/>
+          <p:cNvPr id="447" name="Image" descr="Image"/>
           <p:cNvPicPr>
             <a:picLocks noChangeAspect="1"/>
           </p:cNvPicPr>
@@ -19813,7 +19952,7 @@
       </p:pic>
       <p:sp>
         <p:nvSpPr>
-          <p:cNvPr id="439" name="http://www.city-data.com/picfilesc/picc25424.php"/>
+          <p:cNvPr id="448" name="http://www.city-data.com/picfilesc/picc25424.php"/>
           <p:cNvSpPr txBox="1"/>
           <p:nvPr/>
         </p:nvSpPr>
@@ -19830,7 +19969,7 @@
           </a:ln>
           <a:extLst>
             <a:ext uri="{C572A759-6A51-4108-AA02-DFA0A04FC94B}">
-              <ma14:wrappingTextBoxFlag xmlns:ma14="http://schemas.microsoft.com/office/mac/drawingml/2011/main" xmlns:a14="http://schemas.microsoft.com/office/drawing/2010/main" xmlns:m="http://schemas.openxmlformats.org/officeDocument/2006/math" xmlns="" val="1"/>
+              <ma14:wrappingTextBoxFlag xmlns="" xmlns:m="http://schemas.openxmlformats.org/officeDocument/2006/math" xmlns:a14="http://schemas.microsoft.com/office/drawing/2010/main" xmlns:ma14="http://schemas.microsoft.com/office/mac/drawingml/2011/main" val="1"/>
             </a:ext>
           </a:extLst>
         </p:spPr>
@@ -19893,7 +20032,7 @@
       </p:grpSpPr>
       <p:sp>
         <p:nvSpPr>
-          <p:cNvPr id="441" name="join method"/>
+          <p:cNvPr id="450" name="Demo: Censoring Profanity"/>
           <p:cNvSpPr txBox="1">
             <a:spLocks noGrp="1"/>
           </p:cNvSpPr>
@@ -19919,75 +20058,131 @@
           </a:lstStyle>
           <a:p>
             <a:r>
-              <a:t>join method</a:t>
-            </a:r>
-          </a:p>
-        </p:txBody>
-      </p:sp>
-      <p:sp>
-        <p:nvSpPr>
-          <p:cNvPr id="442" name="L = [&quot;M&quot;, &quot;SS&quot;, &quot;SS&quot;, &quot;PP&quot;]…"/>
-          <p:cNvSpPr txBox="1"/>
-          <p:nvPr/>
-        </p:nvSpPr>
-        <p:spPr>
-          <a:xfrm>
-            <a:off x="912415" y="2241549"/>
-            <a:ext cx="10357248" cy="1574801"/>
-          </a:xfrm>
-          <a:prstGeom prst="rect">
-            <a:avLst/>
-          </a:prstGeom>
-          <a:ln w="12700">
-            <a:miter lim="400000"/>
-          </a:ln>
-          <a:extLst>
-            <a:ext uri="{C572A759-6A51-4108-AA02-DFA0A04FC94B}">
-              <ma14:wrappingTextBoxFlag xmlns:ma14="http://schemas.microsoft.com/office/mac/drawingml/2011/main" xmlns:a14="http://schemas.microsoft.com/office/drawing/2010/main" xmlns:m="http://schemas.openxmlformats.org/officeDocument/2006/math" xmlns="" val="1"/>
-            </a:ext>
-          </a:extLst>
-        </p:spPr>
-        <p:txBody>
-          <a:bodyPr wrap="none" lIns="50800" tIns="50800" rIns="50800" bIns="50800" anchor="ctr">
-            <a:spAutoFit/>
-          </a:bodyPr>
+              <a:t>Demo: Censoring Profanity</a:t>
+            </a:r>
+          </a:p>
+        </p:txBody>
+      </p:sp>
+      <p:sp>
+        <p:nvSpPr>
+          <p:cNvPr id="451" name="Goal: write a function to replace curse words with stars…"/>
+          <p:cNvSpPr txBox="1">
+            <a:spLocks noGrp="1"/>
+          </p:cNvSpPr>
+          <p:nvPr>
+            <p:ph type="body" idx="1"/>
+          </p:nvPr>
+        </p:nvSpPr>
+        <p:spPr>
+          <a:xfrm>
+            <a:off x="952500" y="1587896"/>
+            <a:ext cx="11099800" cy="7289404"/>
+          </a:xfrm>
+          <a:prstGeom prst="rect">
+            <a:avLst/>
+          </a:prstGeom>
+        </p:spPr>
+        <p:txBody>
+          <a:bodyPr anchor="t"/>
           <a:lstStyle/>
           <a:p>
-            <a:pPr algn="l">
-              <a:defRPr sz="4800" b="0">
-                <a:latin typeface="Courier"/>
-                <a:ea typeface="Courier"/>
-                <a:cs typeface="Courier"/>
-                <a:sym typeface="Courier"/>
-              </a:defRPr>
-            </a:pPr>
-            <a:r>
-              <a:rPr>
+            <a:pPr marL="0" lvl="5" indent="0">
+              <a:buSzTx/>
+              <a:buNone/>
+              <a:defRPr>
                 <a:solidFill>
-                  <a:schemeClr val="accent2">
-                    <a:hueOff val="167855"/>
-                    <a:satOff val="17755"/>
-                    <a:lumOff val="-16671"/>
+                  <a:schemeClr val="accent5">
+                    <a:hueOff val="-82419"/>
+                    <a:satOff val="-9513"/>
+                    <a:lumOff val="-16343"/>
                   </a:schemeClr>
                 </a:solidFill>
-              </a:rPr>
-              <a:t>L</a:t>
-            </a:r>
-            <a:r>
-              <a:t> = ["M", "SS", "SS", "PP"]</a:t>
-            </a:r>
-          </a:p>
-          <a:p>
-            <a:pPr algn="l">
-              <a:defRPr sz="4800" b="0">
-                <a:latin typeface="Courier"/>
-                <a:ea typeface="Courier"/>
-                <a:cs typeface="Courier"/>
-                <a:sym typeface="Courier"/>
-              </a:defRPr>
-            </a:pPr>
-            <a:r>
-              <a:rPr>
+              </a:defRPr>
+            </a:pPr>
+            <a:r>
+              <a:rPr dirty="0"/>
+              <a:t>Goal: write a function to replace curse words with stars</a:t>
+            </a:r>
+          </a:p>
+          <a:p>
+            <a:pPr marL="0" lvl="5" indent="0">
+              <a:buSzTx/>
+              <a:buNone/>
+            </a:pPr>
+            <a:r>
+              <a:rPr dirty="0"/>
+              <a:t>Input:</a:t>
+            </a:r>
+          </a:p>
+          <a:p>
+            <a:pPr marL="635000" indent="-444500">
+              <a:spcBef>
+                <a:spcPts val="0"/>
+              </a:spcBef>
+              <a:defRPr sz="2800"/>
+            </a:pPr>
+            <a:r>
+              <a:rPr dirty="0"/>
+              <a:t>A profane string</a:t>
+            </a:r>
+          </a:p>
+          <a:p>
+            <a:pPr marL="0" lvl="5" indent="0">
+              <a:buSzTx/>
+              <a:buNone/>
+            </a:pPr>
+            <a:r>
+              <a:rPr dirty="0"/>
+              <a:t>Output:</a:t>
+            </a:r>
+          </a:p>
+          <a:p>
+            <a:pPr marL="635000" indent="-444500">
+              <a:spcBef>
+                <a:spcPts val="0"/>
+              </a:spcBef>
+              <a:defRPr sz="2800"/>
+            </a:pPr>
+            <a:r>
+              <a:rPr dirty="0"/>
+              <a:t>A sanitized string</a:t>
+            </a:r>
+          </a:p>
+          <a:p>
+            <a:pPr marL="0" lvl="5" indent="0">
+              <a:buSzTx/>
+              <a:buNone/>
+            </a:pPr>
+            <a:r>
+              <a:rPr dirty="0"/>
+              <a:t>Example:</a:t>
+            </a:r>
+            <a:br>
+              <a:rPr dirty="0"/>
+            </a:br>
+            <a:br>
+              <a:rPr sz="2200" dirty="0"/>
+            </a:br>
+            <a:r>
+              <a:rPr sz="2800" dirty="0"/>
+              <a:t>&gt;&gt;&gt; censor(“OMG this class is so fun”)</a:t>
+            </a:r>
+            <a:br>
+              <a:rPr sz="2800" dirty="0"/>
+            </a:br>
+            <a:r>
+              <a:rPr sz="2800" dirty="0"/>
+              <a:t>‘*** this class is so fun’</a:t>
+            </a:r>
+            <a:br>
+              <a:rPr sz="2800" dirty="0"/>
+            </a:br>
+            <a:r>
+              <a:rPr lang="en-US" sz="2800" dirty="0"/>
+              <a:t>&gt;&gt;&gt; censor(“the </a:t>
+            </a:r>
+            <a:r>
+              <a:rPr lang="en-US" sz="2800" dirty="0">
                 <a:solidFill>
                   <a:schemeClr val="accent5">
                     <a:hueOff val="-82419"/>
@@ -19996,153 +20191,14 @@
                   </a:schemeClr>
                 </a:solidFill>
               </a:rPr>
-              <a:t>S</a:t>
-            </a:r>
-            <a:r>
-              <a:t> = "I".join(</a:t>
-            </a:r>
-            <a:r>
-              <a:rPr>
-                <a:solidFill>
-                  <a:schemeClr val="accent2">
-                    <a:hueOff val="167855"/>
-                    <a:satOff val="17755"/>
-                    <a:lumOff val="-16671"/>
-                  </a:schemeClr>
-                </a:solidFill>
-              </a:rPr>
-              <a:t>L</a:t>
-            </a:r>
-            <a:r>
-              <a:t>)</a:t>
-            </a:r>
-          </a:p>
-        </p:txBody>
-      </p:sp>
-      <p:sp>
-        <p:nvSpPr>
-          <p:cNvPr id="443" name="Arrow"/>
-          <p:cNvSpPr/>
-          <p:nvPr/>
-        </p:nvSpPr>
-        <p:spPr>
-          <a:xfrm>
-            <a:off x="6430143" y="5314950"/>
-            <a:ext cx="1627239" cy="1270000"/>
-          </a:xfrm>
-          <a:prstGeom prst="rightArrow">
-            <a:avLst>
-              <a:gd name="adj1" fmla="val 32000"/>
-              <a:gd name="adj2" fmla="val 64000"/>
-            </a:avLst>
-          </a:prstGeom>
-          <a:solidFill>
-            <a:srgbClr val="5E5E5E"/>
-          </a:solidFill>
-          <a:ln w="12700">
-            <a:miter lim="400000"/>
-          </a:ln>
-        </p:spPr>
-        <p:txBody>
-          <a:bodyPr lIns="50800" tIns="50800" rIns="50800" bIns="50800" anchor="ctr"/>
-          <a:lstStyle/>
-          <a:p>
-            <a:pPr>
-              <a:defRPr sz="2200" b="0">
-                <a:solidFill>
-                  <a:srgbClr val="FFFFFF"/>
-                </a:solidFill>
-                <a:latin typeface="+mn-lt"/>
-                <a:ea typeface="+mn-ea"/>
-                <a:cs typeface="+mn-cs"/>
-                <a:sym typeface="Gill Sans SemiBold"/>
-              </a:defRPr>
-            </a:pPr>
-            <a:endParaRPr/>
-          </a:p>
-        </p:txBody>
-      </p:sp>
-      <p:sp>
-        <p:nvSpPr>
-          <p:cNvPr id="444" name="[&quot;M&quot;, &quot;SS&quot;, &quot;SS&quot;, &quot;PP&quot;, &quot;&quot;]"/>
-          <p:cNvSpPr txBox="1"/>
-          <p:nvPr/>
-        </p:nvSpPr>
-        <p:spPr>
-          <a:xfrm>
-            <a:off x="334540" y="5619750"/>
-            <a:ext cx="5875959" cy="533401"/>
-          </a:xfrm>
-          <a:prstGeom prst="rect">
-            <a:avLst/>
-          </a:prstGeom>
-          <a:ln w="12700">
-            <a:miter lim="400000"/>
-          </a:ln>
-          <a:extLst>
-            <a:ext uri="{C572A759-6A51-4108-AA02-DFA0A04FC94B}">
-              <ma14:wrappingTextBoxFlag xmlns:ma14="http://schemas.microsoft.com/office/mac/drawingml/2011/main" xmlns:a14="http://schemas.microsoft.com/office/drawing/2010/main" xmlns:m="http://schemas.openxmlformats.org/officeDocument/2006/math" xmlns="" val="1"/>
-            </a:ext>
-          </a:extLst>
-        </p:spPr>
-        <p:txBody>
-          <a:bodyPr wrap="none" lIns="50800" tIns="50800" rIns="50800" bIns="50800" anchor="ctr">
-            <a:spAutoFit/>
-          </a:bodyPr>
-          <a:lstStyle>
-            <a:lvl1pPr algn="l">
-              <a:defRPr sz="2800" b="0">
-                <a:solidFill>
-                  <a:schemeClr val="accent2">
-                    <a:hueOff val="167855"/>
-                    <a:satOff val="17755"/>
-                    <a:lumOff val="-16671"/>
-                  </a:schemeClr>
-                </a:solidFill>
-                <a:latin typeface="Courier"/>
-                <a:ea typeface="Courier"/>
-                <a:cs typeface="Courier"/>
-                <a:sym typeface="Courier"/>
-              </a:defRPr>
-            </a:lvl1pPr>
-          </a:lstStyle>
-          <a:p>
-            <a:r>
-              <a:t>["M", "SS", "SS", "PP", ""]</a:t>
-            </a:r>
-          </a:p>
-        </p:txBody>
-      </p:sp>
-      <p:sp>
-        <p:nvSpPr>
-          <p:cNvPr id="445" name="MISSISSIPP"/>
-          <p:cNvSpPr txBox="1"/>
-          <p:nvPr/>
-        </p:nvSpPr>
-        <p:spPr>
-          <a:xfrm>
-            <a:off x="8277026" y="5683250"/>
-            <a:ext cx="2248248" cy="533401"/>
-          </a:xfrm>
-          <a:prstGeom prst="rect">
-            <a:avLst/>
-          </a:prstGeom>
-          <a:ln w="12700">
-            <a:miter lim="400000"/>
-          </a:ln>
-          <a:extLst>
-            <a:ext uri="{C572A759-6A51-4108-AA02-DFA0A04FC94B}">
-              <ma14:wrappingTextBoxFlag xmlns:ma14="http://schemas.microsoft.com/office/mac/drawingml/2011/main" xmlns:a14="http://schemas.microsoft.com/office/drawing/2010/main" xmlns:m="http://schemas.openxmlformats.org/officeDocument/2006/math" xmlns="" val="1"/>
-            </a:ext>
-          </a:extLst>
-        </p:spPr>
-        <p:txBody>
-          <a:bodyPr wrap="none" lIns="50800" tIns="50800" rIns="50800" bIns="50800" anchor="ctr">
-            <a:spAutoFit/>
-          </a:bodyPr>
-          <a:lstStyle>
-            <a:lvl1pPr algn="l">
-              <a:defRPr sz="2800" b="0">
+              <a:t>midterm</a:t>
+            </a:r>
+            <a:r>
+              <a:rPr lang="en-US" sz="2800" dirty="0"/>
+              <a:t> was </a:t>
+            </a:r>
+            <a:r>
+              <a:rPr lang="en-US" sz="2800" dirty="0">
                 <a:solidFill>
                   <a:schemeClr val="accent5">
                     <a:hueOff val="-82419"/>
@@ -20150,144 +20206,19 @@
                     <a:lumOff val="-16343"/>
                   </a:schemeClr>
                 </a:solidFill>
-                <a:latin typeface="Courier"/>
-                <a:ea typeface="Courier"/>
-                <a:cs typeface="Courier"/>
-                <a:sym typeface="Courier"/>
-              </a:defRPr>
-            </a:lvl1pPr>
-          </a:lstStyle>
-          <a:p>
-            <a:r>
-              <a:t>MISSISSIPP</a:t>
-            </a:r>
-          </a:p>
-        </p:txBody>
-      </p:sp>
-      <p:sp>
-        <p:nvSpPr>
-          <p:cNvPr id="446" name="separator"/>
-          <p:cNvSpPr txBox="1"/>
-          <p:nvPr/>
-        </p:nvSpPr>
-        <p:spPr>
-          <a:xfrm>
-            <a:off x="2446852" y="3911599"/>
-            <a:ext cx="1202296" cy="419101"/>
-          </a:xfrm>
-          <a:prstGeom prst="rect">
-            <a:avLst/>
-          </a:prstGeom>
-          <a:ln w="12700">
-            <a:miter lim="400000"/>
-          </a:ln>
-          <a:extLst>
-            <a:ext uri="{C572A759-6A51-4108-AA02-DFA0A04FC94B}">
-              <ma14:wrappingTextBoxFlag xmlns:ma14="http://schemas.microsoft.com/office/mac/drawingml/2011/main" xmlns:a14="http://schemas.microsoft.com/office/drawing/2010/main" xmlns:m="http://schemas.openxmlformats.org/officeDocument/2006/math" xmlns="" val="1"/>
-            </a:ext>
-          </a:extLst>
-        </p:spPr>
-        <p:txBody>
-          <a:bodyPr wrap="none" lIns="50800" tIns="50800" rIns="50800" bIns="50800" anchor="ctr">
-            <a:spAutoFit/>
-          </a:bodyPr>
-          <a:lstStyle>
-            <a:lvl1pPr>
-              <a:defRPr sz="2200" b="0">
-                <a:solidFill>
-                  <a:schemeClr val="accent5">
-                    <a:hueOff val="-82419"/>
-                    <a:satOff val="-9513"/>
-                    <a:lumOff val="-16343"/>
-                  </a:schemeClr>
-                </a:solidFill>
-              </a:defRPr>
-            </a:lvl1pPr>
-          </a:lstStyle>
-          <a:p>
-            <a:r>
-              <a:t>separator</a:t>
-            </a:r>
-          </a:p>
-        </p:txBody>
-      </p:sp>
-      <p:pic>
-        <p:nvPicPr>
-          <p:cNvPr id="447" name="Image" descr="Image"/>
-          <p:cNvPicPr>
-            <a:picLocks noChangeAspect="1"/>
-          </p:cNvPicPr>
-          <p:nvPr/>
-        </p:nvPicPr>
-        <p:blipFill>
-          <a:blip r:embed="rId2"/>
-          <a:stretch>
-            <a:fillRect/>
-          </a:stretch>
-        </p:blipFill>
-        <p:spPr>
-          <a:xfrm>
-            <a:off x="7954195" y="6532171"/>
-            <a:ext cx="4723635" cy="2749303"/>
-          </a:xfrm>
-          <a:prstGeom prst="rect">
-            <a:avLst/>
-          </a:prstGeom>
-          <a:ln w="12700">
-            <a:miter lim="400000"/>
-          </a:ln>
-        </p:spPr>
-      </p:pic>
-      <p:sp>
-        <p:nvSpPr>
-          <p:cNvPr id="448" name="http://www.city-data.com/picfilesc/picc25424.php"/>
-          <p:cNvSpPr txBox="1"/>
-          <p:nvPr/>
-        </p:nvSpPr>
-        <p:spPr>
-          <a:xfrm>
-            <a:off x="8733783" y="9303822"/>
-            <a:ext cx="3164459" cy="279401"/>
-          </a:xfrm>
-          <a:prstGeom prst="rect">
-            <a:avLst/>
-          </a:prstGeom>
-          <a:ln w="12700">
-            <a:miter lim="400000"/>
-          </a:ln>
-          <a:extLst>
-            <a:ext uri="{C572A759-6A51-4108-AA02-DFA0A04FC94B}">
-              <ma14:wrappingTextBoxFlag xmlns:ma14="http://schemas.microsoft.com/office/mac/drawingml/2011/main" xmlns:a14="http://schemas.microsoft.com/office/drawing/2010/main" xmlns:m="http://schemas.openxmlformats.org/officeDocument/2006/math" xmlns="" val="1"/>
-            </a:ext>
-          </a:extLst>
-        </p:spPr>
-        <p:txBody>
-          <a:bodyPr wrap="none" lIns="50800" tIns="50800" rIns="50800" bIns="50800" anchor="ctr">
-            <a:spAutoFit/>
-          </a:bodyPr>
-          <a:lstStyle>
-            <a:lvl1pPr algn="l" defTabSz="457200">
-              <a:lnSpc>
-                <a:spcPts val="2800"/>
-              </a:lnSpc>
-              <a:defRPr sz="1200" b="0" u="sng">
-                <a:solidFill>
-                  <a:srgbClr val="0000EE"/>
-                </a:solidFill>
-                <a:latin typeface="Times"/>
-                <a:ea typeface="Times"/>
-                <a:cs typeface="Times"/>
-                <a:sym typeface="Times"/>
-                <a:hlinkClick r:id="rId3"/>
-              </a:defRPr>
-            </a:lvl1pPr>
-          </a:lstStyle>
-          <a:p>
-            <a:r>
-              <a:rPr>
-                <a:hlinkClick r:id="rId3"/>
               </a:rPr>
-              <a:t>http://www.city-data.com/picfilesc/picc25424.php</a:t>
+              <a:t>darn</a:t>
+            </a:r>
+            <a:r>
+              <a:rPr lang="en-US" sz="2800" dirty="0"/>
+              <a:t> tough”)</a:t>
+            </a:r>
+            <a:br>
+              <a:rPr sz="2800" dirty="0"/>
+            </a:br>
+            <a:r>
+              <a:rPr sz="2800" dirty="0"/>
+              <a:t>‘the ******* was **** tough’</a:t>
             </a:r>
           </a:p>
         </p:txBody>
@@ -20320,7 +20251,7 @@
       </p:grpSpPr>
       <p:sp>
         <p:nvSpPr>
-          <p:cNvPr id="450" name="Demo: Censoring Profanity"/>
+          <p:cNvPr id="453" name="Demo: Censoring Profanity"/>
           <p:cNvSpPr txBox="1">
             <a:spLocks noGrp="1"/>
           </p:cNvSpPr>
@@ -20353,7 +20284,7 @@
       </p:sp>
       <p:sp>
         <p:nvSpPr>
-          <p:cNvPr id="451" name="Goal: write a function to replace curse words with stars…"/>
+          <p:cNvPr id="454" name="Goal: write a function to replace curse words with stars…"/>
           <p:cNvSpPr txBox="1">
             <a:spLocks noGrp="1"/>
           </p:cNvSpPr>
@@ -20453,225 +20384,6 @@
             </a:br>
             <a:r>
               <a:rPr sz="2800" dirty="0"/>
-              <a:t>&gt;&gt;&gt; censor(“OMG this class is so fun”)</a:t>
-            </a:r>
-            <a:br>
-              <a:rPr sz="2800" dirty="0"/>
-            </a:br>
-            <a:r>
-              <a:rPr sz="2800" dirty="0"/>
-              <a:t>‘*** this class is so fun’</a:t>
-            </a:r>
-            <a:br>
-              <a:rPr sz="2800" dirty="0"/>
-            </a:br>
-            <a:r>
-              <a:rPr lang="en-US" sz="2800" dirty="0"/>
-              <a:t>&gt;&gt;&gt; censor(“the </a:t>
-            </a:r>
-            <a:r>
-              <a:rPr lang="en-US" sz="2800" dirty="0">
-                <a:solidFill>
-                  <a:schemeClr val="accent5">
-                    <a:hueOff val="-82419"/>
-                    <a:satOff val="-9513"/>
-                    <a:lumOff val="-16343"/>
-                  </a:schemeClr>
-                </a:solidFill>
-              </a:rPr>
-              <a:t>midterm</a:t>
-            </a:r>
-            <a:r>
-              <a:rPr lang="en-US" sz="2800" dirty="0"/>
-              <a:t> was </a:t>
-            </a:r>
-            <a:r>
-              <a:rPr lang="en-US" sz="2800" dirty="0">
-                <a:solidFill>
-                  <a:schemeClr val="accent5">
-                    <a:hueOff val="-82419"/>
-                    <a:satOff val="-9513"/>
-                    <a:lumOff val="-16343"/>
-                  </a:schemeClr>
-                </a:solidFill>
-              </a:rPr>
-              <a:t>darn</a:t>
-            </a:r>
-            <a:r>
-              <a:rPr lang="en-US" sz="2800" dirty="0"/>
-              <a:t> tough”)</a:t>
-            </a:r>
-            <a:br>
-              <a:rPr sz="2800" dirty="0"/>
-            </a:br>
-            <a:r>
-              <a:rPr sz="2800" dirty="0"/>
-              <a:t>‘the ******* was **** tough’</a:t>
-            </a:r>
-          </a:p>
-        </p:txBody>
-      </p:sp>
-    </p:spTree>
-  </p:cSld>
-  <p:clrMapOvr>
-    <a:masterClrMapping/>
-  </p:clrMapOvr>
-  <p:transition spd="med"/>
-</p:sld>
-</file>
-
-<file path=ppt/slides/slide49.xml><?xml version="1.0" encoding="utf-8"?>
-<p:sld xmlns:a="http://schemas.openxmlformats.org/drawingml/2006/main" xmlns:r="http://schemas.openxmlformats.org/officeDocument/2006/relationships" xmlns:p="http://schemas.openxmlformats.org/presentationml/2006/main">
-  <p:cSld>
-    <p:spTree>
-      <p:nvGrpSpPr>
-        <p:cNvPr id="1" name=""/>
-        <p:cNvGrpSpPr/>
-        <p:nvPr/>
-      </p:nvGrpSpPr>
-      <p:grpSpPr>
-        <a:xfrm>
-          <a:off x="0" y="0"/>
-          <a:ext cx="0" cy="0"/>
-          <a:chOff x="0" y="0"/>
-          <a:chExt cx="0" cy="0"/>
-        </a:xfrm>
-      </p:grpSpPr>
-      <p:sp>
-        <p:nvSpPr>
-          <p:cNvPr id="453" name="Demo: Censoring Profanity"/>
-          <p:cNvSpPr txBox="1">
-            <a:spLocks noGrp="1"/>
-          </p:cNvSpPr>
-          <p:nvPr>
-            <p:ph type="title"/>
-          </p:nvPr>
-        </p:nvSpPr>
-        <p:spPr>
-          <a:xfrm>
-            <a:off x="952500" y="254000"/>
-            <a:ext cx="11099800" cy="902345"/>
-          </a:xfrm>
-          <a:prstGeom prst="rect">
-            <a:avLst/>
-          </a:prstGeom>
-        </p:spPr>
-        <p:txBody>
-          <a:bodyPr/>
-          <a:lstStyle>
-            <a:lvl1pPr algn="l">
-              <a:defRPr sz="4800"/>
-            </a:lvl1pPr>
-          </a:lstStyle>
-          <a:p>
-            <a:r>
-              <a:t>Demo: Censoring Profanity</a:t>
-            </a:r>
-          </a:p>
-        </p:txBody>
-      </p:sp>
-      <p:sp>
-        <p:nvSpPr>
-          <p:cNvPr id="454" name="Goal: write a function to replace curse words with stars…"/>
-          <p:cNvSpPr txBox="1">
-            <a:spLocks noGrp="1"/>
-          </p:cNvSpPr>
-          <p:nvPr>
-            <p:ph type="body" idx="1"/>
-          </p:nvPr>
-        </p:nvSpPr>
-        <p:spPr>
-          <a:xfrm>
-            <a:off x="952500" y="1587896"/>
-            <a:ext cx="11099800" cy="7289404"/>
-          </a:xfrm>
-          <a:prstGeom prst="rect">
-            <a:avLst/>
-          </a:prstGeom>
-        </p:spPr>
-        <p:txBody>
-          <a:bodyPr anchor="t"/>
-          <a:lstStyle/>
-          <a:p>
-            <a:pPr marL="0" lvl="5" indent="0">
-              <a:buSzTx/>
-              <a:buNone/>
-              <a:defRPr>
-                <a:solidFill>
-                  <a:schemeClr val="accent5">
-                    <a:hueOff val="-82419"/>
-                    <a:satOff val="-9513"/>
-                    <a:lumOff val="-16343"/>
-                  </a:schemeClr>
-                </a:solidFill>
-              </a:defRPr>
-            </a:pPr>
-            <a:r>
-              <a:rPr dirty="0"/>
-              <a:t>Goal: write a function to replace curse words with stars</a:t>
-            </a:r>
-          </a:p>
-          <a:p>
-            <a:pPr marL="0" lvl="5" indent="0">
-              <a:buSzTx/>
-              <a:buNone/>
-            </a:pPr>
-            <a:r>
-              <a:rPr dirty="0"/>
-              <a:t>Input:</a:t>
-            </a:r>
-          </a:p>
-          <a:p>
-            <a:pPr marL="635000" indent="-444500">
-              <a:spcBef>
-                <a:spcPts val="0"/>
-              </a:spcBef>
-              <a:defRPr sz="2800"/>
-            </a:pPr>
-            <a:r>
-              <a:rPr dirty="0"/>
-              <a:t>A profane string</a:t>
-            </a:r>
-          </a:p>
-          <a:p>
-            <a:pPr marL="0" lvl="5" indent="0">
-              <a:buSzTx/>
-              <a:buNone/>
-            </a:pPr>
-            <a:r>
-              <a:rPr dirty="0"/>
-              <a:t>Output:</a:t>
-            </a:r>
-          </a:p>
-          <a:p>
-            <a:pPr marL="635000" indent="-444500">
-              <a:spcBef>
-                <a:spcPts val="0"/>
-              </a:spcBef>
-              <a:defRPr sz="2800"/>
-            </a:pPr>
-            <a:r>
-              <a:rPr dirty="0"/>
-              <a:t>A sanitized string</a:t>
-            </a:r>
-          </a:p>
-          <a:p>
-            <a:pPr marL="0" lvl="5" indent="0">
-              <a:buSzTx/>
-              <a:buNone/>
-            </a:pPr>
-            <a:r>
-              <a:rPr dirty="0"/>
-              <a:t>Example:</a:t>
-            </a:r>
-            <a:br>
-              <a:rPr dirty="0"/>
-            </a:br>
-            <a:br>
-              <a:rPr sz="2200" dirty="0"/>
-            </a:br>
-            <a:r>
-              <a:rPr sz="2800" dirty="0"/>
               <a:t>&gt;&gt;&gt; censor(“</a:t>
             </a:r>
             <a:r>
@@ -20829,7 +20541,7 @@
           </a:ln>
           <a:extLst>
             <a:ext uri="{C572A759-6A51-4108-AA02-DFA0A04FC94B}">
-              <ma14:wrappingTextBoxFlag xmlns:ma14="http://schemas.microsoft.com/office/mac/drawingml/2011/main" xmlns:a14="http://schemas.microsoft.com/office/drawing/2010/main" xmlns:m="http://schemas.openxmlformats.org/officeDocument/2006/math" xmlns="" val="1"/>
+              <ma14:wrappingTextBoxFlag xmlns="" xmlns:m="http://schemas.openxmlformats.org/officeDocument/2006/math" xmlns:a14="http://schemas.microsoft.com/office/drawing/2010/main" xmlns:ma14="http://schemas.microsoft.com/office/mac/drawingml/2011/main" val="1"/>
             </a:ext>
           </a:extLst>
         </p:spPr>
@@ -21020,6 +20732,300 @@
 </p:sld>
 </file>
 
+<file path=ppt/slides/slide49.xml><?xml version="1.0" encoding="utf-8"?>
+<p:sld xmlns:a="http://schemas.openxmlformats.org/drawingml/2006/main" xmlns:r="http://schemas.openxmlformats.org/officeDocument/2006/relationships" xmlns:p="http://schemas.openxmlformats.org/presentationml/2006/main">
+  <p:cSld>
+    <p:spTree>
+      <p:nvGrpSpPr>
+        <p:cNvPr id="1" name=""/>
+        <p:cNvGrpSpPr/>
+        <p:nvPr/>
+      </p:nvGrpSpPr>
+      <p:grpSpPr>
+        <a:xfrm>
+          <a:off x="0" y="0"/>
+          <a:ext cx="0" cy="0"/>
+          <a:chOff x="0" y="0"/>
+          <a:chExt cx="0" cy="0"/>
+        </a:xfrm>
+      </p:grpSpPr>
+      <p:sp>
+        <p:nvSpPr>
+          <p:cNvPr id="399" name="Demo: Finding a Median"/>
+          <p:cNvSpPr txBox="1">
+            <a:spLocks noGrp="1"/>
+          </p:cNvSpPr>
+          <p:nvPr>
+            <p:ph type="title"/>
+          </p:nvPr>
+        </p:nvSpPr>
+        <p:spPr>
+          <a:xfrm>
+            <a:off x="952500" y="254000"/>
+            <a:ext cx="11099800" cy="902345"/>
+          </a:xfrm>
+          <a:prstGeom prst="rect">
+            <a:avLst/>
+          </a:prstGeom>
+        </p:spPr>
+        <p:txBody>
+          <a:bodyPr/>
+          <a:lstStyle>
+            <a:lvl1pPr algn="l">
+              <a:defRPr sz="4800"/>
+            </a:lvl1pPr>
+          </a:lstStyle>
+          <a:p>
+            <a:r>
+              <a:rPr dirty="0"/>
+              <a:t>Demo: Finding a Median</a:t>
+            </a:r>
+            <a:r>
+              <a:rPr lang="en-US" dirty="0"/>
+              <a:t> – Next lecture…</a:t>
+            </a:r>
+            <a:endParaRPr dirty="0"/>
+          </a:p>
+        </p:txBody>
+      </p:sp>
+      <p:sp>
+        <p:nvSpPr>
+          <p:cNvPr id="400" name="Goal: write a function to find the median of a list of numbers…"/>
+          <p:cNvSpPr txBox="1">
+            <a:spLocks noGrp="1"/>
+          </p:cNvSpPr>
+          <p:nvPr>
+            <p:ph type="body" idx="1"/>
+          </p:nvPr>
+        </p:nvSpPr>
+        <p:spPr>
+          <a:xfrm>
+            <a:off x="952500" y="1587896"/>
+            <a:ext cx="11099800" cy="7289404"/>
+          </a:xfrm>
+          <a:prstGeom prst="rect">
+            <a:avLst/>
+          </a:prstGeom>
+        </p:spPr>
+        <p:txBody>
+          <a:bodyPr anchor="t"/>
+          <a:lstStyle/>
+          <a:p>
+            <a:pPr marL="0" lvl="5" indent="0">
+              <a:buSzTx/>
+              <a:buNone/>
+              <a:defRPr>
+                <a:solidFill>
+                  <a:schemeClr val="accent5">
+                    <a:hueOff val="-82419"/>
+                    <a:satOff val="-9513"/>
+                    <a:lumOff val="-16343"/>
+                  </a:schemeClr>
+                </a:solidFill>
+              </a:defRPr>
+            </a:pPr>
+            <a:r>
+              <a:rPr dirty="0">
+                <a:latin typeface="Calibri" panose="020F0502020204030204" pitchFamily="34" charset="0"/>
+                <a:cs typeface="Calibri" panose="020F0502020204030204" pitchFamily="34" charset="0"/>
+              </a:rPr>
+              <a:t>Goal: write a function to find the median of a list of numbers</a:t>
+            </a:r>
+          </a:p>
+          <a:p>
+            <a:pPr marL="0" lvl="5" indent="0">
+              <a:buSzTx/>
+              <a:buNone/>
+            </a:pPr>
+            <a:r>
+              <a:rPr b="1" dirty="0">
+                <a:latin typeface="Calibri" panose="020F0502020204030204" pitchFamily="34" charset="0"/>
+                <a:cs typeface="Calibri" panose="020F0502020204030204" pitchFamily="34" charset="0"/>
+              </a:rPr>
+              <a:t>Input</a:t>
+            </a:r>
+            <a:r>
+              <a:rPr dirty="0">
+                <a:latin typeface="Calibri" panose="020F0502020204030204" pitchFamily="34" charset="0"/>
+                <a:cs typeface="Calibri" panose="020F0502020204030204" pitchFamily="34" charset="0"/>
+              </a:rPr>
+              <a:t>:</a:t>
+            </a:r>
+          </a:p>
+          <a:p>
+            <a:pPr marL="635000" indent="-444500">
+              <a:spcBef>
+                <a:spcPts val="0"/>
+              </a:spcBef>
+              <a:defRPr sz="2800"/>
+            </a:pPr>
+            <a:r>
+              <a:rPr dirty="0">
+                <a:latin typeface="Calibri" panose="020F0502020204030204" pitchFamily="34" charset="0"/>
+                <a:cs typeface="Calibri" panose="020F0502020204030204" pitchFamily="34" charset="0"/>
+              </a:rPr>
+              <a:t>Python list containing floats</a:t>
+            </a:r>
+          </a:p>
+          <a:p>
+            <a:pPr marL="0" lvl="5" indent="0">
+              <a:buSzTx/>
+              <a:buNone/>
+            </a:pPr>
+            <a:r>
+              <a:rPr b="1" dirty="0">
+                <a:latin typeface="Calibri" panose="020F0502020204030204" pitchFamily="34" charset="0"/>
+                <a:cs typeface="Calibri" panose="020F0502020204030204" pitchFamily="34" charset="0"/>
+              </a:rPr>
+              <a:t>Output</a:t>
+            </a:r>
+            <a:r>
+              <a:rPr dirty="0">
+                <a:latin typeface="Calibri" panose="020F0502020204030204" pitchFamily="34" charset="0"/>
+                <a:cs typeface="Calibri" panose="020F0502020204030204" pitchFamily="34" charset="0"/>
+              </a:rPr>
+              <a:t>:</a:t>
+            </a:r>
+          </a:p>
+          <a:p>
+            <a:pPr marL="635000" indent="-444500">
+              <a:spcBef>
+                <a:spcPts val="0"/>
+              </a:spcBef>
+              <a:defRPr sz="2800"/>
+            </a:pPr>
+            <a:r>
+              <a:rPr dirty="0">
+                <a:latin typeface="Calibri" panose="020F0502020204030204" pitchFamily="34" charset="0"/>
+                <a:cs typeface="Calibri" panose="020F0502020204030204" pitchFamily="34" charset="0"/>
+              </a:rPr>
+              <a:t>The median</a:t>
+            </a:r>
+          </a:p>
+          <a:p>
+            <a:pPr marL="0" lvl="5" indent="0">
+              <a:buSzTx/>
+              <a:buNone/>
+            </a:pPr>
+            <a:r>
+              <a:rPr b="1" dirty="0">
+                <a:latin typeface="Calibri" panose="020F0502020204030204" pitchFamily="34" charset="0"/>
+                <a:cs typeface="Calibri" panose="020F0502020204030204" pitchFamily="34" charset="0"/>
+              </a:rPr>
+              <a:t>Example</a:t>
+            </a:r>
+            <a:r>
+              <a:rPr dirty="0">
+                <a:latin typeface="Calibri" panose="020F0502020204030204" pitchFamily="34" charset="0"/>
+                <a:cs typeface="Calibri" panose="020F0502020204030204" pitchFamily="34" charset="0"/>
+              </a:rPr>
+              <a:t>:</a:t>
+            </a:r>
+            <a:br>
+              <a:rPr dirty="0">
+                <a:latin typeface="Calibri" panose="020F0502020204030204" pitchFamily="34" charset="0"/>
+                <a:cs typeface="Calibri" panose="020F0502020204030204" pitchFamily="34" charset="0"/>
+              </a:rPr>
+            </a:br>
+            <a:r>
+              <a:rPr sz="2200" dirty="0">
+                <a:latin typeface="Calibri" panose="020F0502020204030204" pitchFamily="34" charset="0"/>
+                <a:cs typeface="Calibri" panose="020F0502020204030204" pitchFamily="34" charset="0"/>
+              </a:rPr>
+              <a:t>&gt;&gt;&gt; </a:t>
+            </a:r>
+            <a:r>
+              <a:rPr sz="2200" dirty="0" err="1">
+                <a:latin typeface="Calibri" panose="020F0502020204030204" pitchFamily="34" charset="0"/>
+                <a:cs typeface="Calibri" panose="020F0502020204030204" pitchFamily="34" charset="0"/>
+              </a:rPr>
+              <a:t>nums</a:t>
+            </a:r>
+            <a:r>
+              <a:rPr sz="2200" dirty="0">
+                <a:latin typeface="Calibri" panose="020F0502020204030204" pitchFamily="34" charset="0"/>
+                <a:cs typeface="Calibri" panose="020F0502020204030204" pitchFamily="34" charset="0"/>
+              </a:rPr>
+              <a:t> = [1,5,2,9,8]</a:t>
+            </a:r>
+            <a:br>
+              <a:rPr sz="2200" dirty="0">
+                <a:latin typeface="Calibri" panose="020F0502020204030204" pitchFamily="34" charset="0"/>
+                <a:cs typeface="Calibri" panose="020F0502020204030204" pitchFamily="34" charset="0"/>
+              </a:rPr>
+            </a:br>
+            <a:r>
+              <a:rPr sz="2200" dirty="0">
+                <a:latin typeface="Calibri" panose="020F0502020204030204" pitchFamily="34" charset="0"/>
+                <a:cs typeface="Calibri" panose="020F0502020204030204" pitchFamily="34" charset="0"/>
+              </a:rPr>
+              <a:t>&gt;&gt;&gt; median(</a:t>
+            </a:r>
+            <a:r>
+              <a:rPr sz="2200" dirty="0" err="1">
+                <a:latin typeface="Calibri" panose="020F0502020204030204" pitchFamily="34" charset="0"/>
+                <a:cs typeface="Calibri" panose="020F0502020204030204" pitchFamily="34" charset="0"/>
+              </a:rPr>
+              <a:t>nums</a:t>
+            </a:r>
+            <a:r>
+              <a:rPr sz="2200" dirty="0">
+                <a:latin typeface="Calibri" panose="020F0502020204030204" pitchFamily="34" charset="0"/>
+                <a:cs typeface="Calibri" panose="020F0502020204030204" pitchFamily="34" charset="0"/>
+              </a:rPr>
+              <a:t>)</a:t>
+            </a:r>
+            <a:br>
+              <a:rPr sz="2200" dirty="0">
+                <a:latin typeface="Calibri" panose="020F0502020204030204" pitchFamily="34" charset="0"/>
+                <a:cs typeface="Calibri" panose="020F0502020204030204" pitchFamily="34" charset="0"/>
+              </a:rPr>
+            </a:br>
+            <a:r>
+              <a:rPr sz="2200" dirty="0">
+                <a:latin typeface="Calibri" panose="020F0502020204030204" pitchFamily="34" charset="0"/>
+                <a:cs typeface="Calibri" panose="020F0502020204030204" pitchFamily="34" charset="0"/>
+              </a:rPr>
+              <a:t>5</a:t>
+            </a:r>
+            <a:br>
+              <a:rPr sz="2200" dirty="0">
+                <a:latin typeface="Calibri" panose="020F0502020204030204" pitchFamily="34" charset="0"/>
+                <a:cs typeface="Calibri" panose="020F0502020204030204" pitchFamily="34" charset="0"/>
+              </a:rPr>
+            </a:br>
+            <a:r>
+              <a:rPr sz="2200" dirty="0">
+                <a:latin typeface="Calibri" panose="020F0502020204030204" pitchFamily="34" charset="0"/>
+                <a:cs typeface="Calibri" panose="020F0502020204030204" pitchFamily="34" charset="0"/>
+              </a:rPr>
+              <a:t>&gt;&gt;&gt; median([1, 20, 30, 100])</a:t>
+            </a:r>
+            <a:br>
+              <a:rPr sz="2200" dirty="0">
+                <a:latin typeface="Calibri" panose="020F0502020204030204" pitchFamily="34" charset="0"/>
+                <a:cs typeface="Calibri" panose="020F0502020204030204" pitchFamily="34" charset="0"/>
+              </a:rPr>
+            </a:br>
+            <a:r>
+              <a:rPr sz="2200" dirty="0">
+                <a:latin typeface="Calibri" panose="020F0502020204030204" pitchFamily="34" charset="0"/>
+                <a:cs typeface="Calibri" panose="020F0502020204030204" pitchFamily="34" charset="0"/>
+              </a:rPr>
+              <a:t>25</a:t>
+            </a:r>
+          </a:p>
+        </p:txBody>
+      </p:sp>
+    </p:spTree>
+  </p:cSld>
+  <p:clrMapOvr>
+    <a:masterClrMapping/>
+  </p:clrMapOvr>
+  <p:transition spd="med"/>
+</p:sld>
+</file>
+
 <file path=ppt/slides/slide5.xml><?xml version="1.0" encoding="utf-8"?>
 <p:sld xmlns:a="http://schemas.openxmlformats.org/drawingml/2006/main" xmlns:r="http://schemas.openxmlformats.org/officeDocument/2006/relationships" xmlns:p="http://schemas.openxmlformats.org/presentationml/2006/main">
   <p:cSld>
@@ -21107,7 +21113,7 @@
           </a:ln>
           <a:extLst>
             <a:ext uri="{C572A759-6A51-4108-AA02-DFA0A04FC94B}">
-              <ma14:wrappingTextBoxFlag xmlns:ma14="http://schemas.microsoft.com/office/mac/drawingml/2011/main" xmlns:a14="http://schemas.microsoft.com/office/drawing/2010/main" xmlns:m="http://schemas.openxmlformats.org/officeDocument/2006/math" xmlns="" val="1"/>
+              <ma14:wrappingTextBoxFlag xmlns="" xmlns:m="http://schemas.openxmlformats.org/officeDocument/2006/math" xmlns:a14="http://schemas.microsoft.com/office/drawing/2010/main" xmlns:ma14="http://schemas.microsoft.com/office/mac/drawingml/2011/main" val="1"/>
             </a:ext>
           </a:extLst>
         </p:spPr>
@@ -21151,7 +21157,7 @@
           </a:ln>
           <a:extLst>
             <a:ext uri="{C572A759-6A51-4108-AA02-DFA0A04FC94B}">
-              <ma14:wrappingTextBoxFlag xmlns:ma14="http://schemas.microsoft.com/office/mac/drawingml/2011/main" xmlns:a14="http://schemas.microsoft.com/office/drawing/2010/main" xmlns:m="http://schemas.openxmlformats.org/officeDocument/2006/math" xmlns="" val="1"/>
+              <ma14:wrappingTextBoxFlag xmlns="" xmlns:m="http://schemas.openxmlformats.org/officeDocument/2006/math" xmlns:a14="http://schemas.microsoft.com/office/drawing/2010/main" xmlns:ma14="http://schemas.microsoft.com/office/mac/drawingml/2011/main" val="1"/>
             </a:ext>
           </a:extLst>
         </p:spPr>
@@ -21469,7 +21475,7 @@
           </a:ln>
           <a:extLst>
             <a:ext uri="{C572A759-6A51-4108-AA02-DFA0A04FC94B}">
-              <ma14:wrappingTextBoxFlag xmlns:ma14="http://schemas.microsoft.com/office/mac/drawingml/2011/main" xmlns:a14="http://schemas.microsoft.com/office/drawing/2010/main" xmlns:m="http://schemas.openxmlformats.org/officeDocument/2006/math" xmlns="" val="1"/>
+              <ma14:wrappingTextBoxFlag xmlns="" xmlns:m="http://schemas.openxmlformats.org/officeDocument/2006/math" xmlns:a14="http://schemas.microsoft.com/office/drawing/2010/main" xmlns:ma14="http://schemas.microsoft.com/office/mac/drawingml/2011/main" val="1"/>
             </a:ext>
           </a:extLst>
         </p:spPr>
@@ -21525,7 +21531,7 @@
           </a:ln>
           <a:extLst>
             <a:ext uri="{C572A759-6A51-4108-AA02-DFA0A04FC94B}">
-              <ma14:wrappingTextBoxFlag xmlns:ma14="http://schemas.microsoft.com/office/mac/drawingml/2011/main" xmlns:a14="http://schemas.microsoft.com/office/drawing/2010/main" xmlns:m="http://schemas.openxmlformats.org/officeDocument/2006/math" xmlns="" val="1"/>
+              <ma14:wrappingTextBoxFlag xmlns="" xmlns:m="http://schemas.openxmlformats.org/officeDocument/2006/math" xmlns:a14="http://schemas.microsoft.com/office/drawing/2010/main" xmlns:ma14="http://schemas.microsoft.com/office/mac/drawingml/2011/main" val="1"/>
             </a:ext>
           </a:extLst>
         </p:spPr>
@@ -21681,7 +21687,7 @@
           </a:ln>
           <a:extLst>
             <a:ext uri="{C572A759-6A51-4108-AA02-DFA0A04FC94B}">
-              <ma14:wrappingTextBoxFlag xmlns:ma14="http://schemas.microsoft.com/office/mac/drawingml/2011/main" xmlns:a14="http://schemas.microsoft.com/office/drawing/2010/main" xmlns:m="http://schemas.openxmlformats.org/officeDocument/2006/math" xmlns="" val="1"/>
+              <ma14:wrappingTextBoxFlag xmlns="" xmlns:m="http://schemas.openxmlformats.org/officeDocument/2006/math" xmlns:a14="http://schemas.microsoft.com/office/drawing/2010/main" xmlns:ma14="http://schemas.microsoft.com/office/mac/drawingml/2011/main" val="1"/>
             </a:ext>
           </a:extLst>
         </p:spPr>
@@ -21750,7 +21756,7 @@
           </a:ln>
           <a:extLst>
             <a:ext uri="{C572A759-6A51-4108-AA02-DFA0A04FC94B}">
-              <ma14:wrappingTextBoxFlag xmlns:ma14="http://schemas.microsoft.com/office/mac/drawingml/2011/main" xmlns:a14="http://schemas.microsoft.com/office/drawing/2010/main" xmlns:m="http://schemas.openxmlformats.org/officeDocument/2006/math" xmlns="" val="1"/>
+              <ma14:wrappingTextBoxFlag xmlns="" xmlns:m="http://schemas.openxmlformats.org/officeDocument/2006/math" xmlns:a14="http://schemas.microsoft.com/office/drawing/2010/main" xmlns:ma14="http://schemas.microsoft.com/office/mac/drawingml/2011/main" val="1"/>
             </a:ext>
           </a:extLst>
         </p:spPr>
@@ -21906,7 +21912,7 @@
           </a:ln>
           <a:extLst>
             <a:ext uri="{C572A759-6A51-4108-AA02-DFA0A04FC94B}">
-              <ma14:wrappingTextBoxFlag xmlns:ma14="http://schemas.microsoft.com/office/mac/drawingml/2011/main" xmlns:a14="http://schemas.microsoft.com/office/drawing/2010/main" xmlns:m="http://schemas.openxmlformats.org/officeDocument/2006/math" xmlns="" val="1"/>
+              <ma14:wrappingTextBoxFlag xmlns="" xmlns:m="http://schemas.openxmlformats.org/officeDocument/2006/math" xmlns:a14="http://schemas.microsoft.com/office/drawing/2010/main" xmlns:ma14="http://schemas.microsoft.com/office/mac/drawingml/2011/main" val="1"/>
             </a:ext>
           </a:extLst>
         </p:spPr>
@@ -21988,7 +21994,7 @@
           </a:ln>
           <a:extLst>
             <a:ext uri="{C572A759-6A51-4108-AA02-DFA0A04FC94B}">
-              <ma14:wrappingTextBoxFlag xmlns:ma14="http://schemas.microsoft.com/office/mac/drawingml/2011/main" xmlns:a14="http://schemas.microsoft.com/office/drawing/2010/main" xmlns:m="http://schemas.openxmlformats.org/officeDocument/2006/math" xmlns="" val="1"/>
+              <ma14:wrappingTextBoxFlag xmlns="" xmlns:m="http://schemas.openxmlformats.org/officeDocument/2006/math" xmlns:a14="http://schemas.microsoft.com/office/drawing/2010/main" xmlns:ma14="http://schemas.microsoft.com/office/mac/drawingml/2011/main" val="1"/>
             </a:ext>
           </a:extLst>
         </p:spPr>
@@ -22144,7 +22150,7 @@
           </a:ln>
           <a:extLst>
             <a:ext uri="{C572A759-6A51-4108-AA02-DFA0A04FC94B}">
-              <ma14:wrappingTextBoxFlag xmlns:ma14="http://schemas.microsoft.com/office/mac/drawingml/2011/main" xmlns:a14="http://schemas.microsoft.com/office/drawing/2010/main" xmlns:m="http://schemas.openxmlformats.org/officeDocument/2006/math" xmlns="" val="1"/>
+              <ma14:wrappingTextBoxFlag xmlns="" xmlns:m="http://schemas.openxmlformats.org/officeDocument/2006/math" xmlns:a14="http://schemas.microsoft.com/office/drawing/2010/main" xmlns:ma14="http://schemas.microsoft.com/office/mac/drawingml/2011/main" val="1"/>
             </a:ext>
           </a:extLst>
         </p:spPr>
@@ -22239,7 +22245,7 @@
           </a:ln>
           <a:extLst>
             <a:ext uri="{C572A759-6A51-4108-AA02-DFA0A04FC94B}">
-              <ma14:wrappingTextBoxFlag xmlns:ma14="http://schemas.microsoft.com/office/mac/drawingml/2011/main" xmlns:a14="http://schemas.microsoft.com/office/drawing/2010/main" xmlns:m="http://schemas.openxmlformats.org/officeDocument/2006/math" xmlns="" val="1"/>
+              <ma14:wrappingTextBoxFlag xmlns="" xmlns:m="http://schemas.openxmlformats.org/officeDocument/2006/math" xmlns:a14="http://schemas.microsoft.com/office/drawing/2010/main" xmlns:ma14="http://schemas.microsoft.com/office/mac/drawingml/2011/main" val="1"/>
             </a:ext>
           </a:extLst>
         </p:spPr>

</xml_diff>